<commit_message>
Logical fix in the configuration model predictions
</commit_message>
<xml_diff>
--- a/Images/fig1a.pptx
+++ b/Images/fig1a.pptx
@@ -197,7 +197,7 @@
           <a:p>
             <a:fld id="{D34CEA9E-E5A5-49C8-A578-AF124664FEC0}" type="datetimeFigureOut">
               <a:rPr lang="en-US" smtClean="0"/>
-              <a:t>8/11/2021</a:t>
+              <a:t>8/20/2021</a:t>
             </a:fld>
             <a:endParaRPr lang="en-US"/>
           </a:p>
@@ -754,7 +754,7 @@
           <a:p>
             <a:fld id="{BA05AF01-4F0E-4718-A4C1-DFCBB47EE5F2}" type="datetimeFigureOut">
               <a:rPr lang="en-US" smtClean="0"/>
-              <a:t>8/11/2021</a:t>
+              <a:t>8/20/2021</a:t>
             </a:fld>
             <a:endParaRPr lang="en-US"/>
           </a:p>
@@ -924,7 +924,7 @@
           <a:p>
             <a:fld id="{BA05AF01-4F0E-4718-A4C1-DFCBB47EE5F2}" type="datetimeFigureOut">
               <a:rPr lang="en-US" smtClean="0"/>
-              <a:t>8/11/2021</a:t>
+              <a:t>8/20/2021</a:t>
             </a:fld>
             <a:endParaRPr lang="en-US"/>
           </a:p>
@@ -1104,7 +1104,7 @@
           <a:p>
             <a:fld id="{BA05AF01-4F0E-4718-A4C1-DFCBB47EE5F2}" type="datetimeFigureOut">
               <a:rPr lang="en-US" smtClean="0"/>
-              <a:t>8/11/2021</a:t>
+              <a:t>8/20/2021</a:t>
             </a:fld>
             <a:endParaRPr lang="en-US"/>
           </a:p>
@@ -1274,7 +1274,7 @@
           <a:p>
             <a:fld id="{BA05AF01-4F0E-4718-A4C1-DFCBB47EE5F2}" type="datetimeFigureOut">
               <a:rPr lang="en-US" smtClean="0"/>
-              <a:t>8/11/2021</a:t>
+              <a:t>8/20/2021</a:t>
             </a:fld>
             <a:endParaRPr lang="en-US"/>
           </a:p>
@@ -1518,7 +1518,7 @@
           <a:p>
             <a:fld id="{BA05AF01-4F0E-4718-A4C1-DFCBB47EE5F2}" type="datetimeFigureOut">
               <a:rPr lang="en-US" smtClean="0"/>
-              <a:t>8/11/2021</a:t>
+              <a:t>8/20/2021</a:t>
             </a:fld>
             <a:endParaRPr lang="en-US"/>
           </a:p>
@@ -1750,7 +1750,7 @@
           <a:p>
             <a:fld id="{BA05AF01-4F0E-4718-A4C1-DFCBB47EE5F2}" type="datetimeFigureOut">
               <a:rPr lang="en-US" smtClean="0"/>
-              <a:t>8/11/2021</a:t>
+              <a:t>8/20/2021</a:t>
             </a:fld>
             <a:endParaRPr lang="en-US"/>
           </a:p>
@@ -2117,7 +2117,7 @@
           <a:p>
             <a:fld id="{BA05AF01-4F0E-4718-A4C1-DFCBB47EE5F2}" type="datetimeFigureOut">
               <a:rPr lang="en-US" smtClean="0"/>
-              <a:t>8/11/2021</a:t>
+              <a:t>8/20/2021</a:t>
             </a:fld>
             <a:endParaRPr lang="en-US"/>
           </a:p>
@@ -2235,7 +2235,7 @@
           <a:p>
             <a:fld id="{BA05AF01-4F0E-4718-A4C1-DFCBB47EE5F2}" type="datetimeFigureOut">
               <a:rPr lang="en-US" smtClean="0"/>
-              <a:t>8/11/2021</a:t>
+              <a:t>8/20/2021</a:t>
             </a:fld>
             <a:endParaRPr lang="en-US"/>
           </a:p>
@@ -2330,7 +2330,7 @@
           <a:p>
             <a:fld id="{BA05AF01-4F0E-4718-A4C1-DFCBB47EE5F2}" type="datetimeFigureOut">
               <a:rPr lang="en-US" smtClean="0"/>
-              <a:t>8/11/2021</a:t>
+              <a:t>8/20/2021</a:t>
             </a:fld>
             <a:endParaRPr lang="en-US"/>
           </a:p>
@@ -2607,7 +2607,7 @@
           <a:p>
             <a:fld id="{BA05AF01-4F0E-4718-A4C1-DFCBB47EE5F2}" type="datetimeFigureOut">
               <a:rPr lang="en-US" smtClean="0"/>
-              <a:t>8/11/2021</a:t>
+              <a:t>8/20/2021</a:t>
             </a:fld>
             <a:endParaRPr lang="en-US"/>
           </a:p>
@@ -2864,7 +2864,7 @@
           <a:p>
             <a:fld id="{BA05AF01-4F0E-4718-A4C1-DFCBB47EE5F2}" type="datetimeFigureOut">
               <a:rPr lang="en-US" smtClean="0"/>
-              <a:t>8/11/2021</a:t>
+              <a:t>8/20/2021</a:t>
             </a:fld>
             <a:endParaRPr lang="en-US"/>
           </a:p>
@@ -3077,7 +3077,7 @@
           <a:p>
             <a:fld id="{BA05AF01-4F0E-4718-A4C1-DFCBB47EE5F2}" type="datetimeFigureOut">
               <a:rPr lang="en-US" smtClean="0"/>
-              <a:t>8/11/2021</a:t>
+              <a:t>8/20/2021</a:t>
             </a:fld>
             <a:endParaRPr lang="en-US"/>
           </a:p>
@@ -3628,6 +3628,7 @@
                 <a:effectLst/>
                 <a:latin typeface="Times New Roman" panose="02020603050405020304" pitchFamily="18" charset="0"/>
                 <a:ea typeface="Calibri" panose="020F0502020204030204" pitchFamily="34" charset="0"/>
+                <a:cs typeface="Times New Roman" panose="02020603050405020304" pitchFamily="18" charset="0"/>
               </a:rPr>
               <a:t>k</a:t>
             </a:r>
@@ -3636,8 +3637,18 @@
                 <a:effectLst/>
                 <a:latin typeface="Times New Roman" panose="02020603050405020304" pitchFamily="18" charset="0"/>
                 <a:ea typeface="Calibri" panose="020F0502020204030204" pitchFamily="34" charset="0"/>
-              </a:rPr>
-              <a:t>+</a:t>
+                <a:cs typeface="Times New Roman" panose="02020603050405020304" pitchFamily="18" charset="0"/>
+              </a:rPr>
+              <a:t>i</a:t>
+            </a:r>
+            <a:r>
+              <a:rPr lang="en-US" sz="3030" baseline="30000" dirty="0">
+                <a:effectLst/>
+                <a:latin typeface="Times New Roman" panose="02020603050405020304" pitchFamily="18" charset="0"/>
+                <a:ea typeface="Calibri" panose="020F0502020204030204" pitchFamily="34" charset="0"/>
+                <a:cs typeface="Times New Roman" panose="02020603050405020304" pitchFamily="18" charset="0"/>
+              </a:rPr>
+              <a:t>+ </a:t>
             </a:r>
             <a:r>
               <a:rPr lang="en-US" sz="3030" dirty="0">
@@ -3660,15 +3671,35 @@
                 <a:effectLst/>
                 <a:latin typeface="Times New Roman" panose="02020603050405020304" pitchFamily="18" charset="0"/>
                 <a:ea typeface="Calibri" panose="020F0502020204030204" pitchFamily="34" charset="0"/>
+                <a:cs typeface="Times New Roman" panose="02020603050405020304" pitchFamily="18" charset="0"/>
               </a:rPr>
               <a:t>k</a:t>
             </a:r>
             <a:r>
               <a:rPr lang="en-US" sz="3030" baseline="-25000" dirty="0">
+                <a:effectLst/>
                 <a:latin typeface="Times New Roman" panose="02020603050405020304" pitchFamily="18" charset="0"/>
                 <a:ea typeface="Calibri" panose="020F0502020204030204" pitchFamily="34" charset="0"/>
-              </a:rPr>
-              <a:t>- </a:t>
+                <a:cs typeface="Times New Roman" panose="02020603050405020304" pitchFamily="18" charset="0"/>
+              </a:rPr>
+              <a:t>i</a:t>
+            </a:r>
+            <a:r>
+              <a:rPr lang="en-US" sz="3030" baseline="30000" dirty="0">
+                <a:latin typeface="Times New Roman" panose="02020603050405020304" pitchFamily="18" charset="0"/>
+                <a:ea typeface="Calibri" panose="020F0502020204030204" pitchFamily="34" charset="0"/>
+                <a:cs typeface="Times New Roman" panose="02020603050405020304" pitchFamily="18" charset="0"/>
+              </a:rPr>
+              <a:t>-</a:t>
+            </a:r>
+            <a:r>
+              <a:rPr lang="en-US" sz="3030" baseline="30000" dirty="0">
+                <a:effectLst/>
+                <a:latin typeface="Times New Roman" panose="02020603050405020304" pitchFamily="18" charset="0"/>
+                <a:ea typeface="Calibri" panose="020F0502020204030204" pitchFamily="34" charset="0"/>
+                <a:cs typeface="Times New Roman" panose="02020603050405020304" pitchFamily="18" charset="0"/>
+              </a:rPr>
+              <a:t> </a:t>
             </a:r>
             <a:r>
               <a:rPr lang="en-US" sz="3031" dirty="0">
@@ -3679,6 +3710,32 @@
             </a:r>
           </a:p>
           <a:p>
+            <a:r>
+              <a:rPr lang="el-GR" sz="3030" dirty="0">
+                <a:effectLst/>
+                <a:latin typeface="Times New Roman" panose="02020603050405020304" pitchFamily="18" charset="0"/>
+                <a:ea typeface="Calibri" panose="020F0502020204030204" pitchFamily="34" charset="0"/>
+                <a:cs typeface="Times New Roman" panose="02020603050405020304" pitchFamily="18" charset="0"/>
+              </a:rPr>
+              <a:t>ρ</a:t>
+            </a:r>
+            <a:r>
+              <a:rPr lang="en-US" sz="3030" baseline="-25000" dirty="0">
+                <a:effectLst/>
+                <a:latin typeface="Times New Roman" panose="02020603050405020304" pitchFamily="18" charset="0"/>
+                <a:ea typeface="Calibri" panose="020F0502020204030204" pitchFamily="34" charset="0"/>
+                <a:cs typeface="Times New Roman" panose="02020603050405020304" pitchFamily="18" charset="0"/>
+              </a:rPr>
+              <a:t>i</a:t>
+            </a:r>
+            <a:r>
+              <a:rPr lang="en-US" sz="3030" baseline="-25000" dirty="0">
+                <a:latin typeface="Times New Roman" panose="02020603050405020304" pitchFamily="18" charset="0"/>
+                <a:ea typeface="Calibri" panose="020F0502020204030204" pitchFamily="34" charset="0"/>
+                <a:cs typeface="Times New Roman" panose="02020603050405020304" pitchFamily="18" charset="0"/>
+              </a:rPr>
+              <a:t> </a:t>
+            </a:r>
             <a:r>
               <a:rPr lang="el-GR" sz="3200" b="0" i="0" dirty="0">
                 <a:solidFill>
@@ -3688,7 +3745,7 @@
                 <a:latin typeface="Times New Roman" panose="02020603050405020304" pitchFamily="18" charset="0"/>
                 <a:cs typeface="Times New Roman" panose="02020603050405020304" pitchFamily="18" charset="0"/>
               </a:rPr>
-              <a:t>ρ </a:t>
+              <a:t> </a:t>
             </a:r>
             <a:r>
               <a:rPr lang="en-US" sz="3031" dirty="0">
@@ -5628,216 +5685,6 @@
       </p:sp>
       <p:sp>
         <p:nvSpPr>
-          <p:cNvPr id="41" name="TextBox 40">
-            <a:extLst>
-              <a:ext uri="{FF2B5EF4-FFF2-40B4-BE49-F238E27FC236}">
-                <a16:creationId xmlns:a16="http://schemas.microsoft.com/office/drawing/2014/main" id="{F24CC596-D39E-40BE-BDFD-E84C22C8FC8E}"/>
-              </a:ext>
-            </a:extLst>
-          </p:cNvPr>
-          <p:cNvSpPr txBox="1"/>
-          <p:nvPr/>
-        </p:nvSpPr>
-        <p:spPr>
-          <a:xfrm>
-            <a:off x="17567591" y="14060956"/>
-            <a:ext cx="2324964" cy="1517595"/>
-          </a:xfrm>
-          <a:prstGeom prst="rect">
-            <a:avLst/>
-          </a:prstGeom>
-          <a:noFill/>
-        </p:spPr>
-        <p:txBody>
-          <a:bodyPr wrap="square" rtlCol="0">
-            <a:spAutoFit/>
-          </a:bodyPr>
-          <a:lstStyle/>
-          <a:p>
-            <a:r>
-              <a:rPr lang="en-US" sz="3030" dirty="0">
-                <a:effectLst/>
-                <a:latin typeface="Times New Roman" panose="02020603050405020304" pitchFamily="18" charset="0"/>
-                <a:ea typeface="Calibri" panose="020F0502020204030204" pitchFamily="34" charset="0"/>
-              </a:rPr>
-              <a:t>k</a:t>
-            </a:r>
-            <a:r>
-              <a:rPr lang="en-US" sz="3030" baseline="-25000" dirty="0">
-                <a:effectLst/>
-                <a:latin typeface="Times New Roman" panose="02020603050405020304" pitchFamily="18" charset="0"/>
-                <a:ea typeface="Calibri" panose="020F0502020204030204" pitchFamily="34" charset="0"/>
-              </a:rPr>
-              <a:t>+</a:t>
-            </a:r>
-            <a:r>
-              <a:rPr lang="en-US" sz="3030" dirty="0">
-                <a:latin typeface="Times New Roman" panose="02020603050405020304" pitchFamily="18" charset="0"/>
-                <a:cs typeface="Times New Roman" panose="02020603050405020304" pitchFamily="18" charset="0"/>
-              </a:rPr>
-              <a:t>= </a:t>
-            </a:r>
-            <a:r>
-              <a:rPr lang="en-US" sz="3031" dirty="0">
-                <a:latin typeface="Times New Roman" panose="02020603050405020304" pitchFamily="18" charset="0"/>
-                <a:cs typeface="Times New Roman" panose="02020603050405020304" pitchFamily="18" charset="0"/>
-              </a:rPr>
-              <a:t>4</a:t>
-            </a:r>
-          </a:p>
-          <a:p>
-            <a:r>
-              <a:rPr lang="en-US" sz="3030" dirty="0">
-                <a:effectLst/>
-                <a:latin typeface="Times New Roman" panose="02020603050405020304" pitchFamily="18" charset="0"/>
-                <a:ea typeface="Calibri" panose="020F0502020204030204" pitchFamily="34" charset="0"/>
-              </a:rPr>
-              <a:t>k</a:t>
-            </a:r>
-            <a:r>
-              <a:rPr lang="en-US" sz="3030" baseline="-25000" dirty="0">
-                <a:latin typeface="Times New Roman" panose="02020603050405020304" pitchFamily="18" charset="0"/>
-                <a:ea typeface="Calibri" panose="020F0502020204030204" pitchFamily="34" charset="0"/>
-              </a:rPr>
-              <a:t>- </a:t>
-            </a:r>
-            <a:r>
-              <a:rPr lang="en-US" sz="3031" dirty="0">
-                <a:latin typeface="Times New Roman" panose="02020603050405020304" pitchFamily="18" charset="0"/>
-                <a:cs typeface="Times New Roman" panose="02020603050405020304" pitchFamily="18" charset="0"/>
-              </a:rPr>
-              <a:t>= 1</a:t>
-            </a:r>
-          </a:p>
-          <a:p>
-            <a:r>
-              <a:rPr lang="el-GR" sz="3200" b="0" i="0" dirty="0">
-                <a:solidFill>
-                  <a:srgbClr val="202124"/>
-                </a:solidFill>
-                <a:effectLst/>
-                <a:latin typeface="Times New Roman" panose="02020603050405020304" pitchFamily="18" charset="0"/>
-                <a:cs typeface="Times New Roman" panose="02020603050405020304" pitchFamily="18" charset="0"/>
-              </a:rPr>
-              <a:t>ρ </a:t>
-            </a:r>
-            <a:r>
-              <a:rPr lang="en-US" sz="3031" dirty="0">
-                <a:latin typeface="Times New Roman" panose="02020603050405020304" pitchFamily="18" charset="0"/>
-                <a:cs typeface="Times New Roman" panose="02020603050405020304" pitchFamily="18" charset="0"/>
-              </a:rPr>
-              <a:t>= 0.8</a:t>
-            </a:r>
-          </a:p>
-        </p:txBody>
-      </p:sp>
-      <p:sp>
-        <p:nvSpPr>
-          <p:cNvPr id="55" name="TextBox 54">
-            <a:extLst>
-              <a:ext uri="{FF2B5EF4-FFF2-40B4-BE49-F238E27FC236}">
-                <a16:creationId xmlns:a16="http://schemas.microsoft.com/office/drawing/2014/main" id="{B33FDAE6-A647-4474-ABDD-12982A2A08EB}"/>
-              </a:ext>
-            </a:extLst>
-          </p:cNvPr>
-          <p:cNvSpPr txBox="1"/>
-          <p:nvPr/>
-        </p:nvSpPr>
-        <p:spPr>
-          <a:xfrm>
-            <a:off x="21923980" y="14045622"/>
-            <a:ext cx="2324964" cy="1517595"/>
-          </a:xfrm>
-          <a:prstGeom prst="rect">
-            <a:avLst/>
-          </a:prstGeom>
-          <a:noFill/>
-        </p:spPr>
-        <p:txBody>
-          <a:bodyPr wrap="square" rtlCol="0">
-            <a:spAutoFit/>
-          </a:bodyPr>
-          <a:lstStyle/>
-          <a:p>
-            <a:r>
-              <a:rPr lang="en-US" sz="3030" dirty="0">
-                <a:effectLst/>
-                <a:latin typeface="Times New Roman" panose="02020603050405020304" pitchFamily="18" charset="0"/>
-                <a:ea typeface="Calibri" panose="020F0502020204030204" pitchFamily="34" charset="0"/>
-              </a:rPr>
-              <a:t>k</a:t>
-            </a:r>
-            <a:r>
-              <a:rPr lang="en-US" sz="3030" baseline="-25000" dirty="0">
-                <a:effectLst/>
-                <a:latin typeface="Times New Roman" panose="02020603050405020304" pitchFamily="18" charset="0"/>
-                <a:ea typeface="Calibri" panose="020F0502020204030204" pitchFamily="34" charset="0"/>
-              </a:rPr>
-              <a:t>+</a:t>
-            </a:r>
-            <a:r>
-              <a:rPr lang="en-US" sz="3030" dirty="0">
-                <a:latin typeface="Times New Roman" panose="02020603050405020304" pitchFamily="18" charset="0"/>
-                <a:cs typeface="Times New Roman" panose="02020603050405020304" pitchFamily="18" charset="0"/>
-              </a:rPr>
-              <a:t>= </a:t>
-            </a:r>
-            <a:r>
-              <a:rPr lang="en-US" sz="3031" dirty="0">
-                <a:latin typeface="Times New Roman" panose="02020603050405020304" pitchFamily="18" charset="0"/>
-                <a:cs typeface="Times New Roman" panose="02020603050405020304" pitchFamily="18" charset="0"/>
-              </a:rPr>
-              <a:t>1</a:t>
-            </a:r>
-          </a:p>
-          <a:p>
-            <a:r>
-              <a:rPr lang="en-US" sz="3030" dirty="0">
-                <a:effectLst/>
-                <a:latin typeface="Times New Roman" panose="02020603050405020304" pitchFamily="18" charset="0"/>
-                <a:ea typeface="Calibri" panose="020F0502020204030204" pitchFamily="34" charset="0"/>
-              </a:rPr>
-              <a:t>k</a:t>
-            </a:r>
-            <a:r>
-              <a:rPr lang="en-US" sz="3030" baseline="-25000" dirty="0">
-                <a:latin typeface="Times New Roman" panose="02020603050405020304" pitchFamily="18" charset="0"/>
-                <a:ea typeface="Calibri" panose="020F0502020204030204" pitchFamily="34" charset="0"/>
-              </a:rPr>
-              <a:t>- </a:t>
-            </a:r>
-            <a:r>
-              <a:rPr lang="en-US" sz="3031" dirty="0">
-                <a:latin typeface="Times New Roman" panose="02020603050405020304" pitchFamily="18" charset="0"/>
-                <a:cs typeface="Times New Roman" panose="02020603050405020304" pitchFamily="18" charset="0"/>
-              </a:rPr>
-              <a:t>= 0</a:t>
-            </a:r>
-          </a:p>
-          <a:p>
-            <a:r>
-              <a:rPr lang="el-GR" sz="3200" b="0" i="0" dirty="0">
-                <a:solidFill>
-                  <a:srgbClr val="202124"/>
-                </a:solidFill>
-                <a:effectLst/>
-                <a:latin typeface="Times New Roman" panose="02020603050405020304" pitchFamily="18" charset="0"/>
-                <a:cs typeface="Times New Roman" panose="02020603050405020304" pitchFamily="18" charset="0"/>
-              </a:rPr>
-              <a:t>ρ </a:t>
-            </a:r>
-            <a:r>
-              <a:rPr lang="en-US" sz="3031" dirty="0">
-                <a:latin typeface="Times New Roman" panose="02020603050405020304" pitchFamily="18" charset="0"/>
-                <a:cs typeface="Times New Roman" panose="02020603050405020304" pitchFamily="18" charset="0"/>
-              </a:rPr>
-              <a:t>= 1.0</a:t>
-            </a:r>
-          </a:p>
-        </p:txBody>
-      </p:sp>
-      <p:sp>
-        <p:nvSpPr>
           <p:cNvPr id="2" name="Rectangle: Rounded Corners 1">
             <a:extLst>
               <a:ext uri="{FF2B5EF4-FFF2-40B4-BE49-F238E27FC236}">
@@ -6408,321 +6255,6 @@
       </p:grpSp>
       <p:sp>
         <p:nvSpPr>
-          <p:cNvPr id="70" name="TextBox 69">
-            <a:extLst>
-              <a:ext uri="{FF2B5EF4-FFF2-40B4-BE49-F238E27FC236}">
-                <a16:creationId xmlns:a16="http://schemas.microsoft.com/office/drawing/2014/main" id="{DCC03F26-DF20-487F-98AB-5235EE81CC6B}"/>
-              </a:ext>
-            </a:extLst>
-          </p:cNvPr>
-          <p:cNvSpPr txBox="1"/>
-          <p:nvPr/>
-        </p:nvSpPr>
-        <p:spPr>
-          <a:xfrm>
-            <a:off x="13006108" y="27133694"/>
-            <a:ext cx="2324964" cy="1517595"/>
-          </a:xfrm>
-          <a:prstGeom prst="rect">
-            <a:avLst/>
-          </a:prstGeom>
-          <a:noFill/>
-        </p:spPr>
-        <p:txBody>
-          <a:bodyPr wrap="square" rtlCol="0">
-            <a:spAutoFit/>
-          </a:bodyPr>
-          <a:lstStyle/>
-          <a:p>
-            <a:r>
-              <a:rPr lang="en-US" sz="3030" dirty="0">
-                <a:effectLst/>
-                <a:latin typeface="Times New Roman" panose="02020603050405020304" pitchFamily="18" charset="0"/>
-                <a:ea typeface="Calibri" panose="020F0502020204030204" pitchFamily="34" charset="0"/>
-              </a:rPr>
-              <a:t>k</a:t>
-            </a:r>
-            <a:r>
-              <a:rPr lang="en-US" sz="3030" baseline="-25000" dirty="0">
-                <a:effectLst/>
-                <a:latin typeface="Times New Roman" panose="02020603050405020304" pitchFamily="18" charset="0"/>
-                <a:ea typeface="Calibri" panose="020F0502020204030204" pitchFamily="34" charset="0"/>
-              </a:rPr>
-              <a:t>+</a:t>
-            </a:r>
-            <a:r>
-              <a:rPr lang="en-US" sz="3030" dirty="0">
-                <a:latin typeface="Times New Roman" panose="02020603050405020304" pitchFamily="18" charset="0"/>
-                <a:cs typeface="Times New Roman" panose="02020603050405020304" pitchFamily="18" charset="0"/>
-              </a:rPr>
-              <a:t>= </a:t>
-            </a:r>
-            <a:r>
-              <a:rPr lang="en-US" sz="3031" dirty="0">
-                <a:latin typeface="Times New Roman" panose="02020603050405020304" pitchFamily="18" charset="0"/>
-                <a:cs typeface="Times New Roman" panose="02020603050405020304" pitchFamily="18" charset="0"/>
-              </a:rPr>
-              <a:t>10</a:t>
-            </a:r>
-          </a:p>
-          <a:p>
-            <a:r>
-              <a:rPr lang="en-US" sz="3030" dirty="0">
-                <a:effectLst/>
-                <a:latin typeface="Times New Roman" panose="02020603050405020304" pitchFamily="18" charset="0"/>
-                <a:ea typeface="Calibri" panose="020F0502020204030204" pitchFamily="34" charset="0"/>
-              </a:rPr>
-              <a:t>k</a:t>
-            </a:r>
-            <a:r>
-              <a:rPr lang="en-US" sz="3030" baseline="-25000" dirty="0">
-                <a:latin typeface="Times New Roman" panose="02020603050405020304" pitchFamily="18" charset="0"/>
-                <a:ea typeface="Calibri" panose="020F0502020204030204" pitchFamily="34" charset="0"/>
-              </a:rPr>
-              <a:t>- </a:t>
-            </a:r>
-            <a:r>
-              <a:rPr lang="en-US" sz="3031" dirty="0">
-                <a:latin typeface="Times New Roman" panose="02020603050405020304" pitchFamily="18" charset="0"/>
-                <a:cs typeface="Times New Roman" panose="02020603050405020304" pitchFamily="18" charset="0"/>
-              </a:rPr>
-              <a:t>= 5</a:t>
-            </a:r>
-          </a:p>
-          <a:p>
-            <a:r>
-              <a:rPr lang="el-GR" sz="3200" b="0" i="0" dirty="0">
-                <a:solidFill>
-                  <a:srgbClr val="202124"/>
-                </a:solidFill>
-                <a:effectLst/>
-                <a:latin typeface="Times New Roman" panose="02020603050405020304" pitchFamily="18" charset="0"/>
-                <a:cs typeface="Times New Roman" panose="02020603050405020304" pitchFamily="18" charset="0"/>
-              </a:rPr>
-              <a:t>ρ </a:t>
-            </a:r>
-            <a:r>
-              <a:rPr lang="en-US" sz="3031" dirty="0">
-                <a:latin typeface="Times New Roman" panose="02020603050405020304" pitchFamily="18" charset="0"/>
-                <a:cs typeface="Times New Roman" panose="02020603050405020304" pitchFamily="18" charset="0"/>
-              </a:rPr>
-              <a:t>= 0.67</a:t>
-            </a:r>
-          </a:p>
-        </p:txBody>
-      </p:sp>
-      <p:sp>
-        <p:nvSpPr>
-          <p:cNvPr id="71" name="TextBox 70">
-            <a:extLst>
-              <a:ext uri="{FF2B5EF4-FFF2-40B4-BE49-F238E27FC236}">
-                <a16:creationId xmlns:a16="http://schemas.microsoft.com/office/drawing/2014/main" id="{C7BEB85D-EEF6-4952-A8D8-2958447CBE64}"/>
-              </a:ext>
-            </a:extLst>
-          </p:cNvPr>
-          <p:cNvSpPr txBox="1"/>
-          <p:nvPr/>
-        </p:nvSpPr>
-        <p:spPr>
-          <a:xfrm>
-            <a:off x="17389927" y="26962940"/>
-            <a:ext cx="2324964" cy="1517595"/>
-          </a:xfrm>
-          <a:prstGeom prst="rect">
-            <a:avLst/>
-          </a:prstGeom>
-          <a:noFill/>
-        </p:spPr>
-        <p:txBody>
-          <a:bodyPr wrap="square" rtlCol="0">
-            <a:spAutoFit/>
-          </a:bodyPr>
-          <a:lstStyle/>
-          <a:p>
-            <a:r>
-              <a:rPr lang="en-US" sz="3030" dirty="0">
-                <a:effectLst/>
-                <a:latin typeface="Times New Roman" panose="02020603050405020304" pitchFamily="18" charset="0"/>
-                <a:ea typeface="Calibri" panose="020F0502020204030204" pitchFamily="34" charset="0"/>
-              </a:rPr>
-              <a:t>k</a:t>
-            </a:r>
-            <a:r>
-              <a:rPr lang="en-US" sz="3030" baseline="-25000" dirty="0">
-                <a:effectLst/>
-                <a:latin typeface="Times New Roman" panose="02020603050405020304" pitchFamily="18" charset="0"/>
-                <a:ea typeface="Calibri" panose="020F0502020204030204" pitchFamily="34" charset="0"/>
-              </a:rPr>
-              <a:t>+</a:t>
-            </a:r>
-            <a:r>
-              <a:rPr lang="en-US" sz="3030" dirty="0">
-                <a:latin typeface="Times New Roman" panose="02020603050405020304" pitchFamily="18" charset="0"/>
-                <a:cs typeface="Times New Roman" panose="02020603050405020304" pitchFamily="18" charset="0"/>
-              </a:rPr>
-              <a:t>= </a:t>
-            </a:r>
-            <a:r>
-              <a:rPr lang="en-US" sz="3031" dirty="0">
-                <a:latin typeface="Times New Roman" panose="02020603050405020304" pitchFamily="18" charset="0"/>
-                <a:cs typeface="Times New Roman" panose="02020603050405020304" pitchFamily="18" charset="0"/>
-              </a:rPr>
-              <a:t>60</a:t>
-            </a:r>
-          </a:p>
-          <a:p>
-            <a:r>
-              <a:rPr lang="en-US" sz="3030" dirty="0">
-                <a:effectLst/>
-                <a:latin typeface="Times New Roman" panose="02020603050405020304" pitchFamily="18" charset="0"/>
-                <a:ea typeface="Calibri" panose="020F0502020204030204" pitchFamily="34" charset="0"/>
-              </a:rPr>
-              <a:t>k</a:t>
-            </a:r>
-            <a:r>
-              <a:rPr lang="en-US" sz="3030" baseline="-25000" dirty="0">
-                <a:latin typeface="Times New Roman" panose="02020603050405020304" pitchFamily="18" charset="0"/>
-                <a:ea typeface="Calibri" panose="020F0502020204030204" pitchFamily="34" charset="0"/>
-              </a:rPr>
-              <a:t>- </a:t>
-            </a:r>
-            <a:r>
-              <a:rPr lang="en-US" sz="3031" dirty="0">
-                <a:latin typeface="Times New Roman" panose="02020603050405020304" pitchFamily="18" charset="0"/>
-                <a:cs typeface="Times New Roman" panose="02020603050405020304" pitchFamily="18" charset="0"/>
-              </a:rPr>
-              <a:t>= 18</a:t>
-            </a:r>
-          </a:p>
-          <a:p>
-            <a:r>
-              <a:rPr lang="el-GR" sz="3200" b="0" i="0" dirty="0">
-                <a:solidFill>
-                  <a:srgbClr val="202124"/>
-                </a:solidFill>
-                <a:effectLst/>
-                <a:latin typeface="Times New Roman" panose="02020603050405020304" pitchFamily="18" charset="0"/>
-                <a:cs typeface="Times New Roman" panose="02020603050405020304" pitchFamily="18" charset="0"/>
-              </a:rPr>
-              <a:t>ρ </a:t>
-            </a:r>
-            <a:r>
-              <a:rPr lang="en-US" sz="3031" dirty="0">
-                <a:latin typeface="Times New Roman" panose="02020603050405020304" pitchFamily="18" charset="0"/>
-                <a:cs typeface="Times New Roman" panose="02020603050405020304" pitchFamily="18" charset="0"/>
-              </a:rPr>
-              <a:t>= 0.77</a:t>
-            </a:r>
-          </a:p>
-        </p:txBody>
-      </p:sp>
-      <p:sp>
-        <p:nvSpPr>
-          <p:cNvPr id="72" name="TextBox 71">
-            <a:extLst>
-              <a:ext uri="{FF2B5EF4-FFF2-40B4-BE49-F238E27FC236}">
-                <a16:creationId xmlns:a16="http://schemas.microsoft.com/office/drawing/2014/main" id="{C493D1F0-633E-4CAF-B595-871E1D5E393C}"/>
-              </a:ext>
-            </a:extLst>
-          </p:cNvPr>
-          <p:cNvSpPr txBox="1"/>
-          <p:nvPr/>
-        </p:nvSpPr>
-        <p:spPr>
-          <a:xfrm>
-            <a:off x="21923980" y="26899378"/>
-            <a:ext cx="2324964" cy="1517595"/>
-          </a:xfrm>
-          <a:prstGeom prst="rect">
-            <a:avLst/>
-          </a:prstGeom>
-          <a:noFill/>
-        </p:spPr>
-        <p:txBody>
-          <a:bodyPr wrap="square" rtlCol="0">
-            <a:spAutoFit/>
-          </a:bodyPr>
-          <a:lstStyle/>
-          <a:p>
-            <a:r>
-              <a:rPr lang="en-US" sz="3030" dirty="0">
-                <a:effectLst/>
-                <a:latin typeface="Times New Roman" panose="02020603050405020304" pitchFamily="18" charset="0"/>
-                <a:ea typeface="Calibri" panose="020F0502020204030204" pitchFamily="34" charset="0"/>
-              </a:rPr>
-              <a:t>k</a:t>
-            </a:r>
-            <a:r>
-              <a:rPr lang="en-US" sz="3030" baseline="-25000" dirty="0">
-                <a:effectLst/>
-                <a:latin typeface="Times New Roman" panose="02020603050405020304" pitchFamily="18" charset="0"/>
-                <a:ea typeface="Calibri" panose="020F0502020204030204" pitchFamily="34" charset="0"/>
-              </a:rPr>
-              <a:t>+</a:t>
-            </a:r>
-            <a:r>
-              <a:rPr lang="en-US" sz="3030" dirty="0">
-                <a:latin typeface="Times New Roman" panose="02020603050405020304" pitchFamily="18" charset="0"/>
-                <a:cs typeface="Times New Roman" panose="02020603050405020304" pitchFamily="18" charset="0"/>
-              </a:rPr>
-              <a:t>= </a:t>
-            </a:r>
-            <a:r>
-              <a:rPr lang="en-US" sz="3031" dirty="0">
-                <a:latin typeface="Times New Roman" panose="02020603050405020304" pitchFamily="18" charset="0"/>
-                <a:cs typeface="Times New Roman" panose="02020603050405020304" pitchFamily="18" charset="0"/>
-              </a:rPr>
-              <a:t>3</a:t>
-            </a:r>
-          </a:p>
-          <a:p>
-            <a:r>
-              <a:rPr lang="en-US" sz="3030" dirty="0">
-                <a:effectLst/>
-                <a:latin typeface="Times New Roman" panose="02020603050405020304" pitchFamily="18" charset="0"/>
-                <a:ea typeface="Calibri" panose="020F0502020204030204" pitchFamily="34" charset="0"/>
-              </a:rPr>
-              <a:t>k</a:t>
-            </a:r>
-            <a:r>
-              <a:rPr lang="en-US" sz="3030" baseline="-25000" dirty="0">
-                <a:latin typeface="Times New Roman" panose="02020603050405020304" pitchFamily="18" charset="0"/>
-                <a:ea typeface="Calibri" panose="020F0502020204030204" pitchFamily="34" charset="0"/>
-              </a:rPr>
-              <a:t>- </a:t>
-            </a:r>
-            <a:r>
-              <a:rPr lang="en-US" sz="3031" dirty="0">
-                <a:latin typeface="Times New Roman" panose="02020603050405020304" pitchFamily="18" charset="0"/>
-                <a:cs typeface="Times New Roman" panose="02020603050405020304" pitchFamily="18" charset="0"/>
-              </a:rPr>
-              <a:t>= 0</a:t>
-            </a:r>
-          </a:p>
-          <a:p>
-            <a:r>
-              <a:rPr lang="el-GR" sz="3200" b="0" i="0" dirty="0">
-                <a:solidFill>
-                  <a:srgbClr val="202124"/>
-                </a:solidFill>
-                <a:effectLst/>
-                <a:latin typeface="Times New Roman" panose="02020603050405020304" pitchFamily="18" charset="0"/>
-                <a:cs typeface="Times New Roman" panose="02020603050405020304" pitchFamily="18" charset="0"/>
-              </a:rPr>
-              <a:t>ρ </a:t>
-            </a:r>
-            <a:r>
-              <a:rPr lang="en-US" sz="3031" dirty="0">
-                <a:latin typeface="Times New Roman" panose="02020603050405020304" pitchFamily="18" charset="0"/>
-                <a:cs typeface="Times New Roman" panose="02020603050405020304" pitchFamily="18" charset="0"/>
-              </a:rPr>
-              <a:t>= 1.0</a:t>
-            </a:r>
-          </a:p>
-        </p:txBody>
-      </p:sp>
-      <p:sp>
-        <p:nvSpPr>
           <p:cNvPr id="73" name="Rectangle: Rounded Corners 72">
             <a:extLst>
               <a:ext uri="{FF2B5EF4-FFF2-40B4-BE49-F238E27FC236}">
@@ -6891,8 +6423,8 @@
         </p:nvSpPr>
         <p:spPr>
           <a:xfrm rot="10800000" flipV="1">
-            <a:off x="2687546" y="6285126"/>
-            <a:ext cx="2155785" cy="921471"/>
+            <a:off x="2687546" y="6330363"/>
+            <a:ext cx="2155785" cy="830997"/>
           </a:xfrm>
           <a:prstGeom prst="rect">
             <a:avLst/>
@@ -6906,7 +6438,7 @@
           <a:lstStyle/>
           <a:p>
             <a:r>
-              <a:rPr lang="en-US" sz="5388" b="1" dirty="0">
+              <a:rPr lang="en-US" sz="4800" b="1" dirty="0">
                 <a:latin typeface="Times New Roman" panose="02020603050405020304" pitchFamily="18" charset="0"/>
                 <a:cs typeface="Times New Roman" panose="02020603050405020304" pitchFamily="18" charset="0"/>
               </a:rPr>
@@ -6929,8 +6461,8 @@
         </p:nvSpPr>
         <p:spPr>
           <a:xfrm rot="10800000" flipV="1">
-            <a:off x="2508012" y="19285460"/>
-            <a:ext cx="2155785" cy="921471"/>
+            <a:off x="2508012" y="19330697"/>
+            <a:ext cx="2155785" cy="830997"/>
           </a:xfrm>
           <a:prstGeom prst="rect">
             <a:avLst/>
@@ -6944,11 +6476,812 @@
           <a:lstStyle/>
           <a:p>
             <a:r>
-              <a:rPr lang="en-US" sz="5388" b="1" dirty="0">
+              <a:rPr lang="en-US" sz="4800" b="1" dirty="0">
                 <a:latin typeface="Times New Roman" panose="02020603050405020304" pitchFamily="18" charset="0"/>
                 <a:cs typeface="Times New Roman" panose="02020603050405020304" pitchFamily="18" charset="0"/>
               </a:rPr>
               <a:t>c1</a:t>
+            </a:r>
+          </a:p>
+        </p:txBody>
+      </p:sp>
+      <p:sp>
+        <p:nvSpPr>
+          <p:cNvPr id="78" name="TextBox 77">
+            <a:extLst>
+              <a:ext uri="{FF2B5EF4-FFF2-40B4-BE49-F238E27FC236}">
+                <a16:creationId xmlns:a16="http://schemas.microsoft.com/office/drawing/2014/main" id="{5E8BE009-CC8D-4DBF-9680-5FE20E233029}"/>
+              </a:ext>
+            </a:extLst>
+          </p:cNvPr>
+          <p:cNvSpPr txBox="1"/>
+          <p:nvPr/>
+        </p:nvSpPr>
+        <p:spPr>
+          <a:xfrm>
+            <a:off x="17494971" y="14060956"/>
+            <a:ext cx="2324964" cy="1517595"/>
+          </a:xfrm>
+          <a:prstGeom prst="rect">
+            <a:avLst/>
+          </a:prstGeom>
+          <a:noFill/>
+        </p:spPr>
+        <p:txBody>
+          <a:bodyPr wrap="square" rtlCol="0">
+            <a:spAutoFit/>
+          </a:bodyPr>
+          <a:lstStyle/>
+          <a:p>
+            <a:r>
+              <a:rPr lang="en-US" sz="3030" dirty="0">
+                <a:effectLst/>
+                <a:latin typeface="Times New Roman" panose="02020603050405020304" pitchFamily="18" charset="0"/>
+                <a:ea typeface="Calibri" panose="020F0502020204030204" pitchFamily="34" charset="0"/>
+                <a:cs typeface="Times New Roman" panose="02020603050405020304" pitchFamily="18" charset="0"/>
+              </a:rPr>
+              <a:t>k</a:t>
+            </a:r>
+            <a:r>
+              <a:rPr lang="en-US" sz="3030" baseline="-25000" dirty="0">
+                <a:effectLst/>
+                <a:latin typeface="Times New Roman" panose="02020603050405020304" pitchFamily="18" charset="0"/>
+                <a:ea typeface="Calibri" panose="020F0502020204030204" pitchFamily="34" charset="0"/>
+                <a:cs typeface="Times New Roman" panose="02020603050405020304" pitchFamily="18" charset="0"/>
+              </a:rPr>
+              <a:t>i</a:t>
+            </a:r>
+            <a:r>
+              <a:rPr lang="en-US" sz="3030" baseline="30000" dirty="0">
+                <a:effectLst/>
+                <a:latin typeface="Times New Roman" panose="02020603050405020304" pitchFamily="18" charset="0"/>
+                <a:ea typeface="Calibri" panose="020F0502020204030204" pitchFamily="34" charset="0"/>
+                <a:cs typeface="Times New Roman" panose="02020603050405020304" pitchFamily="18" charset="0"/>
+              </a:rPr>
+              <a:t>+ </a:t>
+            </a:r>
+            <a:r>
+              <a:rPr lang="en-US" sz="3030" dirty="0">
+                <a:latin typeface="Times New Roman" panose="02020603050405020304" pitchFamily="18" charset="0"/>
+                <a:cs typeface="Times New Roman" panose="02020603050405020304" pitchFamily="18" charset="0"/>
+              </a:rPr>
+              <a:t>= </a:t>
+            </a:r>
+            <a:r>
+              <a:rPr lang="en-US" sz="3031" dirty="0">
+                <a:latin typeface="Times New Roman" panose="02020603050405020304" pitchFamily="18" charset="0"/>
+                <a:cs typeface="Times New Roman" panose="02020603050405020304" pitchFamily="18" charset="0"/>
+              </a:rPr>
+              <a:t>4</a:t>
+            </a:r>
+          </a:p>
+          <a:p>
+            <a:r>
+              <a:rPr lang="en-US" sz="3030" dirty="0">
+                <a:effectLst/>
+                <a:latin typeface="Times New Roman" panose="02020603050405020304" pitchFamily="18" charset="0"/>
+                <a:ea typeface="Calibri" panose="020F0502020204030204" pitchFamily="34" charset="0"/>
+                <a:cs typeface="Times New Roman" panose="02020603050405020304" pitchFamily="18" charset="0"/>
+              </a:rPr>
+              <a:t>k</a:t>
+            </a:r>
+            <a:r>
+              <a:rPr lang="en-US" sz="3030" baseline="-25000" dirty="0">
+                <a:effectLst/>
+                <a:latin typeface="Times New Roman" panose="02020603050405020304" pitchFamily="18" charset="0"/>
+                <a:ea typeface="Calibri" panose="020F0502020204030204" pitchFamily="34" charset="0"/>
+                <a:cs typeface="Times New Roman" panose="02020603050405020304" pitchFamily="18" charset="0"/>
+              </a:rPr>
+              <a:t>i</a:t>
+            </a:r>
+            <a:r>
+              <a:rPr lang="en-US" sz="3030" baseline="30000" dirty="0">
+                <a:latin typeface="Times New Roman" panose="02020603050405020304" pitchFamily="18" charset="0"/>
+                <a:ea typeface="Calibri" panose="020F0502020204030204" pitchFamily="34" charset="0"/>
+                <a:cs typeface="Times New Roman" panose="02020603050405020304" pitchFamily="18" charset="0"/>
+              </a:rPr>
+              <a:t>-</a:t>
+            </a:r>
+            <a:r>
+              <a:rPr lang="en-US" sz="3030" baseline="30000" dirty="0">
+                <a:effectLst/>
+                <a:latin typeface="Times New Roman" panose="02020603050405020304" pitchFamily="18" charset="0"/>
+                <a:ea typeface="Calibri" panose="020F0502020204030204" pitchFamily="34" charset="0"/>
+                <a:cs typeface="Times New Roman" panose="02020603050405020304" pitchFamily="18" charset="0"/>
+              </a:rPr>
+              <a:t> </a:t>
+            </a:r>
+            <a:r>
+              <a:rPr lang="en-US" sz="3031" dirty="0">
+                <a:latin typeface="Times New Roman" panose="02020603050405020304" pitchFamily="18" charset="0"/>
+                <a:cs typeface="Times New Roman" panose="02020603050405020304" pitchFamily="18" charset="0"/>
+              </a:rPr>
+              <a:t>= 1</a:t>
+            </a:r>
+          </a:p>
+          <a:p>
+            <a:r>
+              <a:rPr lang="el-GR" sz="3030" dirty="0">
+                <a:effectLst/>
+                <a:latin typeface="Times New Roman" panose="02020603050405020304" pitchFamily="18" charset="0"/>
+                <a:ea typeface="Calibri" panose="020F0502020204030204" pitchFamily="34" charset="0"/>
+                <a:cs typeface="Times New Roman" panose="02020603050405020304" pitchFamily="18" charset="0"/>
+              </a:rPr>
+              <a:t>ρ</a:t>
+            </a:r>
+            <a:r>
+              <a:rPr lang="en-US" sz="3030" baseline="-25000" dirty="0">
+                <a:effectLst/>
+                <a:latin typeface="Times New Roman" panose="02020603050405020304" pitchFamily="18" charset="0"/>
+                <a:ea typeface="Calibri" panose="020F0502020204030204" pitchFamily="34" charset="0"/>
+                <a:cs typeface="Times New Roman" panose="02020603050405020304" pitchFamily="18" charset="0"/>
+              </a:rPr>
+              <a:t>i</a:t>
+            </a:r>
+            <a:r>
+              <a:rPr lang="en-US" sz="3030" baseline="-25000" dirty="0">
+                <a:latin typeface="Times New Roman" panose="02020603050405020304" pitchFamily="18" charset="0"/>
+                <a:ea typeface="Calibri" panose="020F0502020204030204" pitchFamily="34" charset="0"/>
+                <a:cs typeface="Times New Roman" panose="02020603050405020304" pitchFamily="18" charset="0"/>
+              </a:rPr>
+              <a:t> </a:t>
+            </a:r>
+            <a:r>
+              <a:rPr lang="el-GR" sz="3200" b="0" i="0" dirty="0">
+                <a:solidFill>
+                  <a:srgbClr val="202124"/>
+                </a:solidFill>
+                <a:effectLst/>
+                <a:latin typeface="Times New Roman" panose="02020603050405020304" pitchFamily="18" charset="0"/>
+                <a:cs typeface="Times New Roman" panose="02020603050405020304" pitchFamily="18" charset="0"/>
+              </a:rPr>
+              <a:t> </a:t>
+            </a:r>
+            <a:r>
+              <a:rPr lang="en-US" sz="3031" dirty="0">
+                <a:latin typeface="Times New Roman" panose="02020603050405020304" pitchFamily="18" charset="0"/>
+                <a:cs typeface="Times New Roman" panose="02020603050405020304" pitchFamily="18" charset="0"/>
+              </a:rPr>
+              <a:t>= 0.8</a:t>
+            </a:r>
+          </a:p>
+        </p:txBody>
+      </p:sp>
+      <p:sp>
+        <p:nvSpPr>
+          <p:cNvPr id="79" name="TextBox 78">
+            <a:extLst>
+              <a:ext uri="{FF2B5EF4-FFF2-40B4-BE49-F238E27FC236}">
+                <a16:creationId xmlns:a16="http://schemas.microsoft.com/office/drawing/2014/main" id="{F4BEAC3A-4006-47F9-877E-98FF9C8D6456}"/>
+              </a:ext>
+            </a:extLst>
+          </p:cNvPr>
+          <p:cNvSpPr txBox="1"/>
+          <p:nvPr/>
+        </p:nvSpPr>
+        <p:spPr>
+          <a:xfrm>
+            <a:off x="21864642" y="14179059"/>
+            <a:ext cx="2324964" cy="1517595"/>
+          </a:xfrm>
+          <a:prstGeom prst="rect">
+            <a:avLst/>
+          </a:prstGeom>
+          <a:noFill/>
+        </p:spPr>
+        <p:txBody>
+          <a:bodyPr wrap="square" rtlCol="0">
+            <a:spAutoFit/>
+          </a:bodyPr>
+          <a:lstStyle/>
+          <a:p>
+            <a:r>
+              <a:rPr lang="en-US" sz="3030" dirty="0">
+                <a:effectLst/>
+                <a:latin typeface="Times New Roman" panose="02020603050405020304" pitchFamily="18" charset="0"/>
+                <a:ea typeface="Calibri" panose="020F0502020204030204" pitchFamily="34" charset="0"/>
+                <a:cs typeface="Times New Roman" panose="02020603050405020304" pitchFamily="18" charset="0"/>
+              </a:rPr>
+              <a:t>k</a:t>
+            </a:r>
+            <a:r>
+              <a:rPr lang="en-US" sz="3030" baseline="-25000" dirty="0">
+                <a:effectLst/>
+                <a:latin typeface="Times New Roman" panose="02020603050405020304" pitchFamily="18" charset="0"/>
+                <a:ea typeface="Calibri" panose="020F0502020204030204" pitchFamily="34" charset="0"/>
+                <a:cs typeface="Times New Roman" panose="02020603050405020304" pitchFamily="18" charset="0"/>
+              </a:rPr>
+              <a:t>i</a:t>
+            </a:r>
+            <a:r>
+              <a:rPr lang="en-US" sz="3030" baseline="30000" dirty="0">
+                <a:effectLst/>
+                <a:latin typeface="Times New Roman" panose="02020603050405020304" pitchFamily="18" charset="0"/>
+                <a:ea typeface="Calibri" panose="020F0502020204030204" pitchFamily="34" charset="0"/>
+                <a:cs typeface="Times New Roman" panose="02020603050405020304" pitchFamily="18" charset="0"/>
+              </a:rPr>
+              <a:t>+ </a:t>
+            </a:r>
+            <a:r>
+              <a:rPr lang="en-US" sz="3030" dirty="0">
+                <a:latin typeface="Times New Roman" panose="02020603050405020304" pitchFamily="18" charset="0"/>
+                <a:cs typeface="Times New Roman" panose="02020603050405020304" pitchFamily="18" charset="0"/>
+              </a:rPr>
+              <a:t>= </a:t>
+            </a:r>
+            <a:r>
+              <a:rPr lang="en-US" sz="3031" dirty="0">
+                <a:latin typeface="Times New Roman" panose="02020603050405020304" pitchFamily="18" charset="0"/>
+                <a:cs typeface="Times New Roman" panose="02020603050405020304" pitchFamily="18" charset="0"/>
+              </a:rPr>
+              <a:t>1</a:t>
+            </a:r>
+          </a:p>
+          <a:p>
+            <a:r>
+              <a:rPr lang="en-US" sz="3030" dirty="0">
+                <a:effectLst/>
+                <a:latin typeface="Times New Roman" panose="02020603050405020304" pitchFamily="18" charset="0"/>
+                <a:ea typeface="Calibri" panose="020F0502020204030204" pitchFamily="34" charset="0"/>
+                <a:cs typeface="Times New Roman" panose="02020603050405020304" pitchFamily="18" charset="0"/>
+              </a:rPr>
+              <a:t>k</a:t>
+            </a:r>
+            <a:r>
+              <a:rPr lang="en-US" sz="3030" baseline="-25000" dirty="0">
+                <a:effectLst/>
+                <a:latin typeface="Times New Roman" panose="02020603050405020304" pitchFamily="18" charset="0"/>
+                <a:ea typeface="Calibri" panose="020F0502020204030204" pitchFamily="34" charset="0"/>
+                <a:cs typeface="Times New Roman" panose="02020603050405020304" pitchFamily="18" charset="0"/>
+              </a:rPr>
+              <a:t>i</a:t>
+            </a:r>
+            <a:r>
+              <a:rPr lang="en-US" sz="3030" baseline="30000" dirty="0">
+                <a:latin typeface="Times New Roman" panose="02020603050405020304" pitchFamily="18" charset="0"/>
+                <a:ea typeface="Calibri" panose="020F0502020204030204" pitchFamily="34" charset="0"/>
+                <a:cs typeface="Times New Roman" panose="02020603050405020304" pitchFamily="18" charset="0"/>
+              </a:rPr>
+              <a:t>-</a:t>
+            </a:r>
+            <a:r>
+              <a:rPr lang="en-US" sz="3030" baseline="30000" dirty="0">
+                <a:effectLst/>
+                <a:latin typeface="Times New Roman" panose="02020603050405020304" pitchFamily="18" charset="0"/>
+                <a:ea typeface="Calibri" panose="020F0502020204030204" pitchFamily="34" charset="0"/>
+                <a:cs typeface="Times New Roman" panose="02020603050405020304" pitchFamily="18" charset="0"/>
+              </a:rPr>
+              <a:t> </a:t>
+            </a:r>
+            <a:r>
+              <a:rPr lang="en-US" sz="3031" dirty="0">
+                <a:latin typeface="Times New Roman" panose="02020603050405020304" pitchFamily="18" charset="0"/>
+                <a:cs typeface="Times New Roman" panose="02020603050405020304" pitchFamily="18" charset="0"/>
+              </a:rPr>
+              <a:t>= 0</a:t>
+            </a:r>
+          </a:p>
+          <a:p>
+            <a:r>
+              <a:rPr lang="el-GR" sz="3030" dirty="0">
+                <a:effectLst/>
+                <a:latin typeface="Times New Roman" panose="02020603050405020304" pitchFamily="18" charset="0"/>
+                <a:ea typeface="Calibri" panose="020F0502020204030204" pitchFamily="34" charset="0"/>
+                <a:cs typeface="Times New Roman" panose="02020603050405020304" pitchFamily="18" charset="0"/>
+              </a:rPr>
+              <a:t>ρ</a:t>
+            </a:r>
+            <a:r>
+              <a:rPr lang="en-US" sz="3030" baseline="-25000" dirty="0">
+                <a:effectLst/>
+                <a:latin typeface="Times New Roman" panose="02020603050405020304" pitchFamily="18" charset="0"/>
+                <a:ea typeface="Calibri" panose="020F0502020204030204" pitchFamily="34" charset="0"/>
+                <a:cs typeface="Times New Roman" panose="02020603050405020304" pitchFamily="18" charset="0"/>
+              </a:rPr>
+              <a:t>i</a:t>
+            </a:r>
+            <a:r>
+              <a:rPr lang="en-US" sz="3030" baseline="-25000" dirty="0">
+                <a:latin typeface="Times New Roman" panose="02020603050405020304" pitchFamily="18" charset="0"/>
+                <a:ea typeface="Calibri" panose="020F0502020204030204" pitchFamily="34" charset="0"/>
+                <a:cs typeface="Times New Roman" panose="02020603050405020304" pitchFamily="18" charset="0"/>
+              </a:rPr>
+              <a:t> </a:t>
+            </a:r>
+            <a:r>
+              <a:rPr lang="el-GR" sz="3200" b="0" i="0" dirty="0">
+                <a:solidFill>
+                  <a:srgbClr val="202124"/>
+                </a:solidFill>
+                <a:effectLst/>
+                <a:latin typeface="Times New Roman" panose="02020603050405020304" pitchFamily="18" charset="0"/>
+                <a:cs typeface="Times New Roman" panose="02020603050405020304" pitchFamily="18" charset="0"/>
+              </a:rPr>
+              <a:t> </a:t>
+            </a:r>
+            <a:r>
+              <a:rPr lang="en-US" sz="3031" dirty="0">
+                <a:latin typeface="Times New Roman" panose="02020603050405020304" pitchFamily="18" charset="0"/>
+                <a:cs typeface="Times New Roman" panose="02020603050405020304" pitchFamily="18" charset="0"/>
+              </a:rPr>
+              <a:t>= 1.0</a:t>
+            </a:r>
+          </a:p>
+        </p:txBody>
+      </p:sp>
+      <p:sp>
+        <p:nvSpPr>
+          <p:cNvPr id="80" name="TextBox 79">
+            <a:extLst>
+              <a:ext uri="{FF2B5EF4-FFF2-40B4-BE49-F238E27FC236}">
+                <a16:creationId xmlns:a16="http://schemas.microsoft.com/office/drawing/2014/main" id="{EC722727-EB3F-41CA-8325-730B1C1B1328}"/>
+              </a:ext>
+            </a:extLst>
+          </p:cNvPr>
+          <p:cNvSpPr txBox="1"/>
+          <p:nvPr/>
+        </p:nvSpPr>
+        <p:spPr>
+          <a:xfrm>
+            <a:off x="12746609" y="26962940"/>
+            <a:ext cx="2324964" cy="1517595"/>
+          </a:xfrm>
+          <a:prstGeom prst="rect">
+            <a:avLst/>
+          </a:prstGeom>
+          <a:noFill/>
+        </p:spPr>
+        <p:txBody>
+          <a:bodyPr wrap="square" rtlCol="0">
+            <a:spAutoFit/>
+          </a:bodyPr>
+          <a:lstStyle/>
+          <a:p>
+            <a:r>
+              <a:rPr lang="en-US" sz="3030" dirty="0">
+                <a:effectLst/>
+                <a:latin typeface="Times New Roman" panose="02020603050405020304" pitchFamily="18" charset="0"/>
+                <a:ea typeface="Calibri" panose="020F0502020204030204" pitchFamily="34" charset="0"/>
+                <a:cs typeface="Times New Roman" panose="02020603050405020304" pitchFamily="18" charset="0"/>
+              </a:rPr>
+              <a:t>k</a:t>
+            </a:r>
+            <a:r>
+              <a:rPr lang="en-US" sz="3030" baseline="-25000" dirty="0">
+                <a:effectLst/>
+                <a:latin typeface="Times New Roman" panose="02020603050405020304" pitchFamily="18" charset="0"/>
+                <a:ea typeface="Calibri" panose="020F0502020204030204" pitchFamily="34" charset="0"/>
+                <a:cs typeface="Times New Roman" panose="02020603050405020304" pitchFamily="18" charset="0"/>
+              </a:rPr>
+              <a:t>i</a:t>
+            </a:r>
+            <a:r>
+              <a:rPr lang="en-US" sz="3030" baseline="30000" dirty="0">
+                <a:effectLst/>
+                <a:latin typeface="Times New Roman" panose="02020603050405020304" pitchFamily="18" charset="0"/>
+                <a:ea typeface="Calibri" panose="020F0502020204030204" pitchFamily="34" charset="0"/>
+                <a:cs typeface="Times New Roman" panose="02020603050405020304" pitchFamily="18" charset="0"/>
+              </a:rPr>
+              <a:t>+ </a:t>
+            </a:r>
+            <a:r>
+              <a:rPr lang="en-US" sz="3030" dirty="0">
+                <a:latin typeface="Times New Roman" panose="02020603050405020304" pitchFamily="18" charset="0"/>
+                <a:cs typeface="Times New Roman" panose="02020603050405020304" pitchFamily="18" charset="0"/>
+              </a:rPr>
+              <a:t>= 10</a:t>
+            </a:r>
+            <a:endParaRPr lang="en-US" sz="3031" dirty="0">
+              <a:latin typeface="Times New Roman" panose="02020603050405020304" pitchFamily="18" charset="0"/>
+              <a:cs typeface="Times New Roman" panose="02020603050405020304" pitchFamily="18" charset="0"/>
+            </a:endParaRPr>
+          </a:p>
+          <a:p>
+            <a:r>
+              <a:rPr lang="en-US" sz="3030" dirty="0">
+                <a:effectLst/>
+                <a:latin typeface="Times New Roman" panose="02020603050405020304" pitchFamily="18" charset="0"/>
+                <a:ea typeface="Calibri" panose="020F0502020204030204" pitchFamily="34" charset="0"/>
+                <a:cs typeface="Times New Roman" panose="02020603050405020304" pitchFamily="18" charset="0"/>
+              </a:rPr>
+              <a:t>k</a:t>
+            </a:r>
+            <a:r>
+              <a:rPr lang="en-US" sz="3030" baseline="-25000" dirty="0">
+                <a:effectLst/>
+                <a:latin typeface="Times New Roman" panose="02020603050405020304" pitchFamily="18" charset="0"/>
+                <a:ea typeface="Calibri" panose="020F0502020204030204" pitchFamily="34" charset="0"/>
+                <a:cs typeface="Times New Roman" panose="02020603050405020304" pitchFamily="18" charset="0"/>
+              </a:rPr>
+              <a:t>i</a:t>
+            </a:r>
+            <a:r>
+              <a:rPr lang="en-US" sz="3030" baseline="30000" dirty="0">
+                <a:latin typeface="Times New Roman" panose="02020603050405020304" pitchFamily="18" charset="0"/>
+                <a:ea typeface="Calibri" panose="020F0502020204030204" pitchFamily="34" charset="0"/>
+                <a:cs typeface="Times New Roman" panose="02020603050405020304" pitchFamily="18" charset="0"/>
+              </a:rPr>
+              <a:t>-</a:t>
+            </a:r>
+            <a:r>
+              <a:rPr lang="en-US" sz="3030" baseline="30000" dirty="0">
+                <a:effectLst/>
+                <a:latin typeface="Times New Roman" panose="02020603050405020304" pitchFamily="18" charset="0"/>
+                <a:ea typeface="Calibri" panose="020F0502020204030204" pitchFamily="34" charset="0"/>
+                <a:cs typeface="Times New Roman" panose="02020603050405020304" pitchFamily="18" charset="0"/>
+              </a:rPr>
+              <a:t> </a:t>
+            </a:r>
+            <a:r>
+              <a:rPr lang="en-US" sz="3031" dirty="0">
+                <a:latin typeface="Times New Roman" panose="02020603050405020304" pitchFamily="18" charset="0"/>
+                <a:cs typeface="Times New Roman" panose="02020603050405020304" pitchFamily="18" charset="0"/>
+              </a:rPr>
+              <a:t>= 5</a:t>
+            </a:r>
+          </a:p>
+          <a:p>
+            <a:r>
+              <a:rPr lang="el-GR" sz="3030" dirty="0">
+                <a:effectLst/>
+                <a:latin typeface="Times New Roman" panose="02020603050405020304" pitchFamily="18" charset="0"/>
+                <a:ea typeface="Calibri" panose="020F0502020204030204" pitchFamily="34" charset="0"/>
+                <a:cs typeface="Times New Roman" panose="02020603050405020304" pitchFamily="18" charset="0"/>
+              </a:rPr>
+              <a:t>ρ</a:t>
+            </a:r>
+            <a:r>
+              <a:rPr lang="en-US" sz="3030" baseline="-25000" dirty="0">
+                <a:effectLst/>
+                <a:latin typeface="Times New Roman" panose="02020603050405020304" pitchFamily="18" charset="0"/>
+                <a:ea typeface="Calibri" panose="020F0502020204030204" pitchFamily="34" charset="0"/>
+                <a:cs typeface="Times New Roman" panose="02020603050405020304" pitchFamily="18" charset="0"/>
+              </a:rPr>
+              <a:t>i</a:t>
+            </a:r>
+            <a:r>
+              <a:rPr lang="en-US" sz="3030" baseline="-25000" dirty="0">
+                <a:latin typeface="Times New Roman" panose="02020603050405020304" pitchFamily="18" charset="0"/>
+                <a:ea typeface="Calibri" panose="020F0502020204030204" pitchFamily="34" charset="0"/>
+                <a:cs typeface="Times New Roman" panose="02020603050405020304" pitchFamily="18" charset="0"/>
+              </a:rPr>
+              <a:t> </a:t>
+            </a:r>
+            <a:r>
+              <a:rPr lang="el-GR" sz="3200" b="0" i="0" dirty="0">
+                <a:solidFill>
+                  <a:srgbClr val="202124"/>
+                </a:solidFill>
+                <a:effectLst/>
+                <a:latin typeface="Times New Roman" panose="02020603050405020304" pitchFamily="18" charset="0"/>
+                <a:cs typeface="Times New Roman" panose="02020603050405020304" pitchFamily="18" charset="0"/>
+              </a:rPr>
+              <a:t> </a:t>
+            </a:r>
+            <a:r>
+              <a:rPr lang="en-US" sz="3031" dirty="0">
+                <a:latin typeface="Times New Roman" panose="02020603050405020304" pitchFamily="18" charset="0"/>
+                <a:cs typeface="Times New Roman" panose="02020603050405020304" pitchFamily="18" charset="0"/>
+              </a:rPr>
+              <a:t>= 0.67</a:t>
+            </a:r>
+          </a:p>
+        </p:txBody>
+      </p:sp>
+      <p:sp>
+        <p:nvSpPr>
+          <p:cNvPr id="81" name="TextBox 80">
+            <a:extLst>
+              <a:ext uri="{FF2B5EF4-FFF2-40B4-BE49-F238E27FC236}">
+                <a16:creationId xmlns:a16="http://schemas.microsoft.com/office/drawing/2014/main" id="{9D05960D-1609-4236-92B7-6F3CE7060C32}"/>
+              </a:ext>
+            </a:extLst>
+          </p:cNvPr>
+          <p:cNvSpPr txBox="1"/>
+          <p:nvPr/>
+        </p:nvSpPr>
+        <p:spPr>
+          <a:xfrm>
+            <a:off x="17291953" y="26962939"/>
+            <a:ext cx="2324964" cy="1517595"/>
+          </a:xfrm>
+          <a:prstGeom prst="rect">
+            <a:avLst/>
+          </a:prstGeom>
+          <a:noFill/>
+        </p:spPr>
+        <p:txBody>
+          <a:bodyPr wrap="square" rtlCol="0">
+            <a:spAutoFit/>
+          </a:bodyPr>
+          <a:lstStyle/>
+          <a:p>
+            <a:r>
+              <a:rPr lang="en-US" sz="3030" dirty="0">
+                <a:effectLst/>
+                <a:latin typeface="Times New Roman" panose="02020603050405020304" pitchFamily="18" charset="0"/>
+                <a:ea typeface="Calibri" panose="020F0502020204030204" pitchFamily="34" charset="0"/>
+                <a:cs typeface="Times New Roman" panose="02020603050405020304" pitchFamily="18" charset="0"/>
+              </a:rPr>
+              <a:t>k</a:t>
+            </a:r>
+            <a:r>
+              <a:rPr lang="en-US" sz="3030" baseline="-25000" dirty="0">
+                <a:effectLst/>
+                <a:latin typeface="Times New Roman" panose="02020603050405020304" pitchFamily="18" charset="0"/>
+                <a:ea typeface="Calibri" panose="020F0502020204030204" pitchFamily="34" charset="0"/>
+                <a:cs typeface="Times New Roman" panose="02020603050405020304" pitchFamily="18" charset="0"/>
+              </a:rPr>
+              <a:t>i</a:t>
+            </a:r>
+            <a:r>
+              <a:rPr lang="en-US" sz="3030" baseline="30000" dirty="0">
+                <a:effectLst/>
+                <a:latin typeface="Times New Roman" panose="02020603050405020304" pitchFamily="18" charset="0"/>
+                <a:ea typeface="Calibri" panose="020F0502020204030204" pitchFamily="34" charset="0"/>
+                <a:cs typeface="Times New Roman" panose="02020603050405020304" pitchFamily="18" charset="0"/>
+              </a:rPr>
+              <a:t>+ </a:t>
+            </a:r>
+            <a:r>
+              <a:rPr lang="en-US" sz="3030" dirty="0">
+                <a:latin typeface="Times New Roman" panose="02020603050405020304" pitchFamily="18" charset="0"/>
+                <a:cs typeface="Times New Roman" panose="02020603050405020304" pitchFamily="18" charset="0"/>
+              </a:rPr>
+              <a:t>= 60</a:t>
+            </a:r>
+            <a:endParaRPr lang="en-US" sz="3031" dirty="0">
+              <a:latin typeface="Times New Roman" panose="02020603050405020304" pitchFamily="18" charset="0"/>
+              <a:cs typeface="Times New Roman" panose="02020603050405020304" pitchFamily="18" charset="0"/>
+            </a:endParaRPr>
+          </a:p>
+          <a:p>
+            <a:r>
+              <a:rPr lang="en-US" sz="3030" dirty="0">
+                <a:effectLst/>
+                <a:latin typeface="Times New Roman" panose="02020603050405020304" pitchFamily="18" charset="0"/>
+                <a:ea typeface="Calibri" panose="020F0502020204030204" pitchFamily="34" charset="0"/>
+                <a:cs typeface="Times New Roman" panose="02020603050405020304" pitchFamily="18" charset="0"/>
+              </a:rPr>
+              <a:t>k</a:t>
+            </a:r>
+            <a:r>
+              <a:rPr lang="en-US" sz="3030" baseline="-25000" dirty="0">
+                <a:effectLst/>
+                <a:latin typeface="Times New Roman" panose="02020603050405020304" pitchFamily="18" charset="0"/>
+                <a:ea typeface="Calibri" panose="020F0502020204030204" pitchFamily="34" charset="0"/>
+                <a:cs typeface="Times New Roman" panose="02020603050405020304" pitchFamily="18" charset="0"/>
+              </a:rPr>
+              <a:t>i</a:t>
+            </a:r>
+            <a:r>
+              <a:rPr lang="en-US" sz="3030" baseline="30000" dirty="0">
+                <a:latin typeface="Times New Roman" panose="02020603050405020304" pitchFamily="18" charset="0"/>
+                <a:ea typeface="Calibri" panose="020F0502020204030204" pitchFamily="34" charset="0"/>
+                <a:cs typeface="Times New Roman" panose="02020603050405020304" pitchFamily="18" charset="0"/>
+              </a:rPr>
+              <a:t>-</a:t>
+            </a:r>
+            <a:r>
+              <a:rPr lang="en-US" sz="3030" baseline="30000" dirty="0">
+                <a:effectLst/>
+                <a:latin typeface="Times New Roman" panose="02020603050405020304" pitchFamily="18" charset="0"/>
+                <a:ea typeface="Calibri" panose="020F0502020204030204" pitchFamily="34" charset="0"/>
+                <a:cs typeface="Times New Roman" panose="02020603050405020304" pitchFamily="18" charset="0"/>
+              </a:rPr>
+              <a:t> </a:t>
+            </a:r>
+            <a:r>
+              <a:rPr lang="en-US" sz="3031" dirty="0">
+                <a:latin typeface="Times New Roman" panose="02020603050405020304" pitchFamily="18" charset="0"/>
+                <a:cs typeface="Times New Roman" panose="02020603050405020304" pitchFamily="18" charset="0"/>
+              </a:rPr>
+              <a:t>= 18</a:t>
+            </a:r>
+          </a:p>
+          <a:p>
+            <a:r>
+              <a:rPr lang="el-GR" sz="3030" dirty="0">
+                <a:effectLst/>
+                <a:latin typeface="Times New Roman" panose="02020603050405020304" pitchFamily="18" charset="0"/>
+                <a:ea typeface="Calibri" panose="020F0502020204030204" pitchFamily="34" charset="0"/>
+                <a:cs typeface="Times New Roman" panose="02020603050405020304" pitchFamily="18" charset="0"/>
+              </a:rPr>
+              <a:t>ρ</a:t>
+            </a:r>
+            <a:r>
+              <a:rPr lang="en-US" sz="3030" baseline="-25000" dirty="0">
+                <a:effectLst/>
+                <a:latin typeface="Times New Roman" panose="02020603050405020304" pitchFamily="18" charset="0"/>
+                <a:ea typeface="Calibri" panose="020F0502020204030204" pitchFamily="34" charset="0"/>
+                <a:cs typeface="Times New Roman" panose="02020603050405020304" pitchFamily="18" charset="0"/>
+              </a:rPr>
+              <a:t>i</a:t>
+            </a:r>
+            <a:r>
+              <a:rPr lang="en-US" sz="3030" baseline="-25000" dirty="0">
+                <a:latin typeface="Times New Roman" panose="02020603050405020304" pitchFamily="18" charset="0"/>
+                <a:ea typeface="Calibri" panose="020F0502020204030204" pitchFamily="34" charset="0"/>
+                <a:cs typeface="Times New Roman" panose="02020603050405020304" pitchFamily="18" charset="0"/>
+              </a:rPr>
+              <a:t> </a:t>
+            </a:r>
+            <a:r>
+              <a:rPr lang="el-GR" sz="3200" b="0" i="0" dirty="0">
+                <a:solidFill>
+                  <a:srgbClr val="202124"/>
+                </a:solidFill>
+                <a:effectLst/>
+                <a:latin typeface="Times New Roman" panose="02020603050405020304" pitchFamily="18" charset="0"/>
+                <a:cs typeface="Times New Roman" panose="02020603050405020304" pitchFamily="18" charset="0"/>
+              </a:rPr>
+              <a:t> </a:t>
+            </a:r>
+            <a:r>
+              <a:rPr lang="en-US" sz="3031" dirty="0">
+                <a:latin typeface="Times New Roman" panose="02020603050405020304" pitchFamily="18" charset="0"/>
+                <a:cs typeface="Times New Roman" panose="02020603050405020304" pitchFamily="18" charset="0"/>
+              </a:rPr>
+              <a:t>= 0.77</a:t>
+            </a:r>
+          </a:p>
+        </p:txBody>
+      </p:sp>
+      <p:sp>
+        <p:nvSpPr>
+          <p:cNvPr id="82" name="TextBox 81">
+            <a:extLst>
+              <a:ext uri="{FF2B5EF4-FFF2-40B4-BE49-F238E27FC236}">
+                <a16:creationId xmlns:a16="http://schemas.microsoft.com/office/drawing/2014/main" id="{3DF054CA-1D3E-4184-B09D-43703E7E00A8}"/>
+              </a:ext>
+            </a:extLst>
+          </p:cNvPr>
+          <p:cNvSpPr txBox="1"/>
+          <p:nvPr/>
+        </p:nvSpPr>
+        <p:spPr>
+          <a:xfrm>
+            <a:off x="21703551" y="26870709"/>
+            <a:ext cx="2324964" cy="1517595"/>
+          </a:xfrm>
+          <a:prstGeom prst="rect">
+            <a:avLst/>
+          </a:prstGeom>
+          <a:noFill/>
+        </p:spPr>
+        <p:txBody>
+          <a:bodyPr wrap="square" rtlCol="0">
+            <a:spAutoFit/>
+          </a:bodyPr>
+          <a:lstStyle/>
+          <a:p>
+            <a:r>
+              <a:rPr lang="en-US" sz="3030" dirty="0">
+                <a:effectLst/>
+                <a:latin typeface="Times New Roman" panose="02020603050405020304" pitchFamily="18" charset="0"/>
+                <a:ea typeface="Calibri" panose="020F0502020204030204" pitchFamily="34" charset="0"/>
+                <a:cs typeface="Times New Roman" panose="02020603050405020304" pitchFamily="18" charset="0"/>
+              </a:rPr>
+              <a:t>k</a:t>
+            </a:r>
+            <a:r>
+              <a:rPr lang="en-US" sz="3030" baseline="-25000" dirty="0">
+                <a:effectLst/>
+                <a:latin typeface="Times New Roman" panose="02020603050405020304" pitchFamily="18" charset="0"/>
+                <a:ea typeface="Calibri" panose="020F0502020204030204" pitchFamily="34" charset="0"/>
+                <a:cs typeface="Times New Roman" panose="02020603050405020304" pitchFamily="18" charset="0"/>
+              </a:rPr>
+              <a:t>i</a:t>
+            </a:r>
+            <a:r>
+              <a:rPr lang="en-US" sz="3030" baseline="30000" dirty="0">
+                <a:effectLst/>
+                <a:latin typeface="Times New Roman" panose="02020603050405020304" pitchFamily="18" charset="0"/>
+                <a:ea typeface="Calibri" panose="020F0502020204030204" pitchFamily="34" charset="0"/>
+                <a:cs typeface="Times New Roman" panose="02020603050405020304" pitchFamily="18" charset="0"/>
+              </a:rPr>
+              <a:t>+ </a:t>
+            </a:r>
+            <a:r>
+              <a:rPr lang="en-US" sz="3030" dirty="0">
+                <a:latin typeface="Times New Roman" panose="02020603050405020304" pitchFamily="18" charset="0"/>
+                <a:cs typeface="Times New Roman" panose="02020603050405020304" pitchFamily="18" charset="0"/>
+              </a:rPr>
+              <a:t>= 3</a:t>
+            </a:r>
+            <a:endParaRPr lang="en-US" sz="3031" dirty="0">
+              <a:latin typeface="Times New Roman" panose="02020603050405020304" pitchFamily="18" charset="0"/>
+              <a:cs typeface="Times New Roman" panose="02020603050405020304" pitchFamily="18" charset="0"/>
+            </a:endParaRPr>
+          </a:p>
+          <a:p>
+            <a:r>
+              <a:rPr lang="en-US" sz="3030" dirty="0">
+                <a:effectLst/>
+                <a:latin typeface="Times New Roman" panose="02020603050405020304" pitchFamily="18" charset="0"/>
+                <a:ea typeface="Calibri" panose="020F0502020204030204" pitchFamily="34" charset="0"/>
+                <a:cs typeface="Times New Roman" panose="02020603050405020304" pitchFamily="18" charset="0"/>
+              </a:rPr>
+              <a:t>k</a:t>
+            </a:r>
+            <a:r>
+              <a:rPr lang="en-US" sz="3030" baseline="-25000" dirty="0">
+                <a:effectLst/>
+                <a:latin typeface="Times New Roman" panose="02020603050405020304" pitchFamily="18" charset="0"/>
+                <a:ea typeface="Calibri" panose="020F0502020204030204" pitchFamily="34" charset="0"/>
+                <a:cs typeface="Times New Roman" panose="02020603050405020304" pitchFamily="18" charset="0"/>
+              </a:rPr>
+              <a:t>i</a:t>
+            </a:r>
+            <a:r>
+              <a:rPr lang="en-US" sz="3030" baseline="30000" dirty="0">
+                <a:latin typeface="Times New Roman" panose="02020603050405020304" pitchFamily="18" charset="0"/>
+                <a:ea typeface="Calibri" panose="020F0502020204030204" pitchFamily="34" charset="0"/>
+                <a:cs typeface="Times New Roman" panose="02020603050405020304" pitchFamily="18" charset="0"/>
+              </a:rPr>
+              <a:t>-</a:t>
+            </a:r>
+            <a:r>
+              <a:rPr lang="en-US" sz="3030" baseline="30000" dirty="0">
+                <a:effectLst/>
+                <a:latin typeface="Times New Roman" panose="02020603050405020304" pitchFamily="18" charset="0"/>
+                <a:ea typeface="Calibri" panose="020F0502020204030204" pitchFamily="34" charset="0"/>
+                <a:cs typeface="Times New Roman" panose="02020603050405020304" pitchFamily="18" charset="0"/>
+              </a:rPr>
+              <a:t> </a:t>
+            </a:r>
+            <a:r>
+              <a:rPr lang="en-US" sz="3031" dirty="0">
+                <a:latin typeface="Times New Roman" panose="02020603050405020304" pitchFamily="18" charset="0"/>
+                <a:cs typeface="Times New Roman" panose="02020603050405020304" pitchFamily="18" charset="0"/>
+              </a:rPr>
+              <a:t>= 0</a:t>
+            </a:r>
+          </a:p>
+          <a:p>
+            <a:r>
+              <a:rPr lang="el-GR" sz="3030" dirty="0">
+                <a:effectLst/>
+                <a:latin typeface="Times New Roman" panose="02020603050405020304" pitchFamily="18" charset="0"/>
+                <a:ea typeface="Calibri" panose="020F0502020204030204" pitchFamily="34" charset="0"/>
+                <a:cs typeface="Times New Roman" panose="02020603050405020304" pitchFamily="18" charset="0"/>
+              </a:rPr>
+              <a:t>ρ</a:t>
+            </a:r>
+            <a:r>
+              <a:rPr lang="en-US" sz="3030" baseline="-25000" dirty="0">
+                <a:effectLst/>
+                <a:latin typeface="Times New Roman" panose="02020603050405020304" pitchFamily="18" charset="0"/>
+                <a:ea typeface="Calibri" panose="020F0502020204030204" pitchFamily="34" charset="0"/>
+                <a:cs typeface="Times New Roman" panose="02020603050405020304" pitchFamily="18" charset="0"/>
+              </a:rPr>
+              <a:t>i</a:t>
+            </a:r>
+            <a:r>
+              <a:rPr lang="en-US" sz="3030" baseline="-25000" dirty="0">
+                <a:latin typeface="Times New Roman" panose="02020603050405020304" pitchFamily="18" charset="0"/>
+                <a:ea typeface="Calibri" panose="020F0502020204030204" pitchFamily="34" charset="0"/>
+                <a:cs typeface="Times New Roman" panose="02020603050405020304" pitchFamily="18" charset="0"/>
+              </a:rPr>
+              <a:t> </a:t>
+            </a:r>
+            <a:r>
+              <a:rPr lang="el-GR" sz="3200" b="0" i="0" dirty="0">
+                <a:solidFill>
+                  <a:srgbClr val="202124"/>
+                </a:solidFill>
+                <a:effectLst/>
+                <a:latin typeface="Times New Roman" panose="02020603050405020304" pitchFamily="18" charset="0"/>
+                <a:cs typeface="Times New Roman" panose="02020603050405020304" pitchFamily="18" charset="0"/>
+              </a:rPr>
+              <a:t> </a:t>
+            </a:r>
+            <a:r>
+              <a:rPr lang="en-US" sz="3031" dirty="0">
+                <a:latin typeface="Times New Roman" panose="02020603050405020304" pitchFamily="18" charset="0"/>
+                <a:cs typeface="Times New Roman" panose="02020603050405020304" pitchFamily="18" charset="0"/>
+              </a:rPr>
+              <a:t>= 1.0</a:t>
             </a:r>
           </a:p>
         </p:txBody>

</xml_diff>

<commit_message>
Updating Transformer-CNN notebook with new plots
</commit_message>
<xml_diff>
--- a/Images/fig1a.pptx
+++ b/Images/fig1a.pptx
@@ -3560,98 +3560,6 @@
       </p:sp>
       <p:sp>
         <p:nvSpPr>
-          <p:cNvPr id="49" name="TextBox 48">
-            <a:extLst>
-              <a:ext uri="{FF2B5EF4-FFF2-40B4-BE49-F238E27FC236}">
-                <a16:creationId xmlns:a16="http://schemas.microsoft.com/office/drawing/2014/main" id="{5ABA8ECE-C61E-475C-9C9A-792866AA51D6}"/>
-              </a:ext>
-            </a:extLst>
-          </p:cNvPr>
-          <p:cNvSpPr txBox="1"/>
-          <p:nvPr/>
-        </p:nvSpPr>
-        <p:spPr>
-          <a:xfrm rot="10800000" flipV="1">
-            <a:off x="467073" y="180853"/>
-            <a:ext cx="1732641" cy="742256"/>
-          </a:xfrm>
-          <a:prstGeom prst="rect">
-            <a:avLst/>
-          </a:prstGeom>
-          <a:noFill/>
-        </p:spPr>
-        <p:txBody>
-          <a:bodyPr wrap="square" rtlCol="0">
-            <a:spAutoFit/>
-          </a:bodyPr>
-          <a:lstStyle/>
-          <a:p>
-            <a:r>
-              <a:rPr lang="en-US" sz="4041" b="1" dirty="0">
-                <a:latin typeface="Times New Roman" panose="02020603050405020304" pitchFamily="18" charset="0"/>
-                <a:cs typeface="Times New Roman" panose="02020603050405020304" pitchFamily="18" charset="0"/>
-              </a:rPr>
-              <a:t>A</a:t>
-            </a:r>
-          </a:p>
-        </p:txBody>
-      </p:sp>
-      <p:sp>
-        <p:nvSpPr>
-          <p:cNvPr id="6" name="Rectangle 5">
-            <a:extLst>
-              <a:ext uri="{FF2B5EF4-FFF2-40B4-BE49-F238E27FC236}">
-                <a16:creationId xmlns:a16="http://schemas.microsoft.com/office/drawing/2014/main" id="{265D68BB-FAAF-4B24-AD96-68D9C2855D2A}"/>
-              </a:ext>
-            </a:extLst>
-          </p:cNvPr>
-          <p:cNvSpPr/>
-          <p:nvPr/>
-        </p:nvSpPr>
-        <p:spPr>
-          <a:xfrm>
-            <a:off x="18197699" y="868121"/>
-            <a:ext cx="2132391" cy="841243"/>
-          </a:xfrm>
-          <a:prstGeom prst="rect">
-            <a:avLst/>
-          </a:prstGeom>
-          <a:solidFill>
-            <a:schemeClr val="bg1"/>
-          </a:solidFill>
-          <a:ln>
-            <a:solidFill>
-              <a:schemeClr val="bg1"/>
-            </a:solidFill>
-          </a:ln>
-        </p:spPr>
-        <p:style>
-          <a:lnRef idx="2">
-            <a:schemeClr val="accent1">
-              <a:shade val="50000"/>
-            </a:schemeClr>
-          </a:lnRef>
-          <a:fillRef idx="1">
-            <a:schemeClr val="accent1"/>
-          </a:fillRef>
-          <a:effectRef idx="0">
-            <a:schemeClr val="accent1"/>
-          </a:effectRef>
-          <a:fontRef idx="minor">
-            <a:schemeClr val="lt1"/>
-          </a:fontRef>
-        </p:style>
-        <p:txBody>
-          <a:bodyPr rtlCol="0" anchor="ctr"/>
-          <a:lstStyle/>
-          <a:p>
-            <a:pPr algn="ctr"/>
-            <a:endParaRPr lang="en-US" sz="1350"/>
-          </a:p>
-        </p:txBody>
-      </p:sp>
-      <p:sp>
-        <p:nvSpPr>
           <p:cNvPr id="126" name="Rectangle 125">
             <a:extLst>
               <a:ext uri="{FF2B5EF4-FFF2-40B4-BE49-F238E27FC236}">
@@ -3704,1387 +3612,6 @@
           </a:p>
         </p:txBody>
       </p:sp>
-      <p:sp>
-        <p:nvSpPr>
-          <p:cNvPr id="11" name="Rectangle 10">
-            <a:extLst>
-              <a:ext uri="{FF2B5EF4-FFF2-40B4-BE49-F238E27FC236}">
-                <a16:creationId xmlns:a16="http://schemas.microsoft.com/office/drawing/2014/main" id="{3A544ECB-A4A4-4105-A6E6-AA197965C2FC}"/>
-              </a:ext>
-            </a:extLst>
-          </p:cNvPr>
-          <p:cNvSpPr/>
-          <p:nvPr/>
-        </p:nvSpPr>
-        <p:spPr>
-          <a:xfrm>
-            <a:off x="1975787" y="925794"/>
-            <a:ext cx="2360472" cy="1345383"/>
-          </a:xfrm>
-          <a:prstGeom prst="rect">
-            <a:avLst/>
-          </a:prstGeom>
-          <a:solidFill>
-            <a:schemeClr val="bg1"/>
-          </a:solidFill>
-          <a:ln>
-            <a:solidFill>
-              <a:schemeClr val="bg1"/>
-            </a:solidFill>
-          </a:ln>
-        </p:spPr>
-        <p:style>
-          <a:lnRef idx="2">
-            <a:schemeClr val="accent1">
-              <a:shade val="50000"/>
-            </a:schemeClr>
-          </a:lnRef>
-          <a:fillRef idx="1">
-            <a:schemeClr val="accent1"/>
-          </a:fillRef>
-          <a:effectRef idx="0">
-            <a:schemeClr val="accent1"/>
-          </a:effectRef>
-          <a:fontRef idx="minor">
-            <a:schemeClr val="lt1"/>
-          </a:fontRef>
-        </p:style>
-        <p:txBody>
-          <a:bodyPr rtlCol="0" anchor="ctr"/>
-          <a:lstStyle/>
-          <a:p>
-            <a:pPr algn="ctr"/>
-            <a:endParaRPr lang="en-US"/>
-          </a:p>
-        </p:txBody>
-      </p:sp>
-      <p:pic>
-        <p:nvPicPr>
-          <p:cNvPr id="7" name="Picture 4">
-            <a:extLst>
-              <a:ext uri="{FF2B5EF4-FFF2-40B4-BE49-F238E27FC236}">
-                <a16:creationId xmlns:a16="http://schemas.microsoft.com/office/drawing/2014/main" id="{DACFA7AA-5C68-4225-82B7-B5ED2AECB48E}"/>
-              </a:ext>
-            </a:extLst>
-          </p:cNvPr>
-          <p:cNvPicPr>
-            <a:picLocks noChangeAspect="1" noChangeArrowheads="1"/>
-          </p:cNvPicPr>
-          <p:nvPr/>
-        </p:nvPicPr>
-        <p:blipFill>
-          <a:blip r:embed="rId3">
-            <a:extLst>
-              <a:ext uri="{28A0092B-C50C-407E-A947-70E740481C1C}">
-                <a14:useLocalDpi xmlns:a14="http://schemas.microsoft.com/office/drawing/2010/main" val="0"/>
-              </a:ext>
-            </a:extLst>
-          </a:blip>
-          <a:srcRect/>
-          <a:stretch>
-            <a:fillRect/>
-          </a:stretch>
-        </p:blipFill>
-        <p:spPr bwMode="auto">
-          <a:xfrm>
-            <a:off x="1210388" y="786159"/>
-            <a:ext cx="19574040" cy="9807205"/>
-          </a:xfrm>
-          <a:prstGeom prst="rect">
-            <a:avLst/>
-          </a:prstGeom>
-          <a:noFill/>
-          <a:extLst>
-            <a:ext uri="{909E8E84-426E-40DD-AFC4-6F175D3DCCD1}">
-              <a14:hiddenFill xmlns:a14="http://schemas.microsoft.com/office/drawing/2010/main">
-                <a:solidFill>
-                  <a:srgbClr val="FFFFFF"/>
-                </a:solidFill>
-              </a14:hiddenFill>
-            </a:ext>
-          </a:extLst>
-        </p:spPr>
-      </p:pic>
-      <p:sp>
-        <p:nvSpPr>
-          <p:cNvPr id="87" name="TextBox 86">
-            <a:extLst>
-              <a:ext uri="{FF2B5EF4-FFF2-40B4-BE49-F238E27FC236}">
-                <a16:creationId xmlns:a16="http://schemas.microsoft.com/office/drawing/2014/main" id="{69399931-4C93-48FA-B723-6E3D1B9DA0D4}"/>
-              </a:ext>
-            </a:extLst>
-          </p:cNvPr>
-          <p:cNvSpPr txBox="1"/>
-          <p:nvPr/>
-        </p:nvSpPr>
-        <p:spPr>
-          <a:xfrm rot="16200000">
-            <a:off x="857562" y="5159706"/>
-            <a:ext cx="746721" cy="474117"/>
-          </a:xfrm>
-          <a:prstGeom prst="rect">
-            <a:avLst/>
-          </a:prstGeom>
-          <a:solidFill>
-            <a:schemeClr val="bg1"/>
-          </a:solidFill>
-        </p:spPr>
-        <p:txBody>
-          <a:bodyPr wrap="none" rtlCol="0">
-            <a:spAutoFit/>
-          </a:bodyPr>
-          <a:lstStyle/>
-          <a:p>
-            <a:r>
-              <a:rPr lang="en-US" sz="2275" dirty="0">
-                <a:latin typeface="Times New Roman" panose="02020603050405020304" pitchFamily="18" charset="0"/>
-                <a:cs typeface="Times New Roman" panose="02020603050405020304" pitchFamily="18" charset="0"/>
-              </a:rPr>
-              <a:t>PDF</a:t>
-            </a:r>
-          </a:p>
-        </p:txBody>
-      </p:sp>
-      <p:grpSp>
-        <p:nvGrpSpPr>
-          <p:cNvPr id="88" name="Group 87">
-            <a:extLst>
-              <a:ext uri="{FF2B5EF4-FFF2-40B4-BE49-F238E27FC236}">
-                <a16:creationId xmlns:a16="http://schemas.microsoft.com/office/drawing/2014/main" id="{6D687B5C-A246-430B-8515-53AEBA0F8F80}"/>
-              </a:ext>
-            </a:extLst>
-          </p:cNvPr>
-          <p:cNvGrpSpPr/>
-          <p:nvPr/>
-        </p:nvGrpSpPr>
-        <p:grpSpPr>
-          <a:xfrm>
-            <a:off x="4336259" y="8329848"/>
-            <a:ext cx="2589746" cy="647759"/>
-            <a:chOff x="21483123" y="6219785"/>
-            <a:chExt cx="3222211" cy="830998"/>
-          </a:xfrm>
-        </p:grpSpPr>
-        <p:sp>
-          <p:nvSpPr>
-            <p:cNvPr id="89" name="TextBox 88">
-              <a:extLst>
-                <a:ext uri="{FF2B5EF4-FFF2-40B4-BE49-F238E27FC236}">
-                  <a16:creationId xmlns:a16="http://schemas.microsoft.com/office/drawing/2014/main" id="{AFA90415-7915-469C-86D7-1C2295400851}"/>
-                </a:ext>
-              </a:extLst>
-            </p:cNvPr>
-            <p:cNvSpPr txBox="1"/>
-            <p:nvPr/>
-          </p:nvSpPr>
-          <p:spPr>
-            <a:xfrm>
-              <a:off x="22115703" y="6219785"/>
-              <a:ext cx="2589631" cy="414582"/>
-            </a:xfrm>
-            <a:prstGeom prst="rect">
-              <a:avLst/>
-            </a:prstGeom>
-            <a:solidFill>
-              <a:schemeClr val="bg1"/>
-            </a:solidFill>
-          </p:spPr>
-          <p:txBody>
-            <a:bodyPr wrap="square" rtlCol="0">
-              <a:spAutoFit/>
-            </a:bodyPr>
-            <a:lstStyle/>
-            <a:p>
-              <a:r>
-                <a:rPr lang="en-US" sz="1500" dirty="0">
-                  <a:solidFill>
-                    <a:srgbClr val="202124"/>
-                  </a:solidFill>
-                  <a:latin typeface="Times New Roman" panose="02020603050405020304" pitchFamily="18" charset="0"/>
-                  <a:cs typeface="Times New Roman" panose="02020603050405020304" pitchFamily="18" charset="0"/>
-                </a:rPr>
-                <a:t>Whole BindingDB</a:t>
-              </a:r>
-            </a:p>
-          </p:txBody>
-        </p:sp>
-        <p:sp>
-          <p:nvSpPr>
-            <p:cNvPr id="102" name="Rectangle 101">
-              <a:extLst>
-                <a:ext uri="{FF2B5EF4-FFF2-40B4-BE49-F238E27FC236}">
-                  <a16:creationId xmlns:a16="http://schemas.microsoft.com/office/drawing/2014/main" id="{8540CFE2-8873-43B0-8143-9C835C164B22}"/>
-                </a:ext>
-              </a:extLst>
-            </p:cNvPr>
-            <p:cNvSpPr/>
-            <p:nvPr/>
-          </p:nvSpPr>
-          <p:spPr>
-            <a:xfrm>
-              <a:off x="21483123" y="6296644"/>
-              <a:ext cx="440857" cy="247772"/>
-            </a:xfrm>
-            <a:prstGeom prst="rect">
-              <a:avLst/>
-            </a:prstGeom>
-            <a:solidFill>
-              <a:srgbClr val="D6E5F0"/>
-            </a:solidFill>
-          </p:spPr>
-          <p:style>
-            <a:lnRef idx="2">
-              <a:schemeClr val="accent1">
-                <a:shade val="50000"/>
-              </a:schemeClr>
-            </a:lnRef>
-            <a:fillRef idx="1">
-              <a:schemeClr val="accent1"/>
-            </a:fillRef>
-            <a:effectRef idx="0">
-              <a:schemeClr val="accent1"/>
-            </a:effectRef>
-            <a:fontRef idx="minor">
-              <a:schemeClr val="lt1"/>
-            </a:fontRef>
-          </p:style>
-          <p:txBody>
-            <a:bodyPr rtlCol="0" anchor="ctr"/>
-            <a:lstStyle/>
-            <a:p>
-              <a:pPr algn="ctr"/>
-              <a:endParaRPr lang="en-US" sz="1350"/>
-            </a:p>
-          </p:txBody>
-        </p:sp>
-        <p:sp>
-          <p:nvSpPr>
-            <p:cNvPr id="103" name="Rectangle 102">
-              <a:extLst>
-                <a:ext uri="{FF2B5EF4-FFF2-40B4-BE49-F238E27FC236}">
-                  <a16:creationId xmlns:a16="http://schemas.microsoft.com/office/drawing/2014/main" id="{93B64396-591D-43AA-8FC7-5FF07A71534D}"/>
-                </a:ext>
-              </a:extLst>
-            </p:cNvPr>
-            <p:cNvSpPr/>
-            <p:nvPr/>
-          </p:nvSpPr>
-          <p:spPr>
-            <a:xfrm>
-              <a:off x="21483123" y="6721369"/>
-              <a:ext cx="440857" cy="247772"/>
-            </a:xfrm>
-            <a:prstGeom prst="rect">
-              <a:avLst/>
-            </a:prstGeom>
-            <a:solidFill>
-              <a:srgbClr val="F9D0D0"/>
-            </a:solidFill>
-          </p:spPr>
-          <p:style>
-            <a:lnRef idx="2">
-              <a:schemeClr val="accent1">
-                <a:shade val="50000"/>
-              </a:schemeClr>
-            </a:lnRef>
-            <a:fillRef idx="1">
-              <a:schemeClr val="accent1"/>
-            </a:fillRef>
-            <a:effectRef idx="0">
-              <a:schemeClr val="accent1"/>
-            </a:effectRef>
-            <a:fontRef idx="minor">
-              <a:schemeClr val="lt1"/>
-            </a:fontRef>
-          </p:style>
-          <p:txBody>
-            <a:bodyPr rtlCol="0" anchor="ctr"/>
-            <a:lstStyle/>
-            <a:p>
-              <a:pPr algn="ctr"/>
-              <a:endParaRPr lang="en-US" sz="1350"/>
-            </a:p>
-          </p:txBody>
-        </p:sp>
-        <p:sp>
-          <p:nvSpPr>
-            <p:cNvPr id="104" name="TextBox 103">
-              <a:extLst>
-                <a:ext uri="{FF2B5EF4-FFF2-40B4-BE49-F238E27FC236}">
-                  <a16:creationId xmlns:a16="http://schemas.microsoft.com/office/drawing/2014/main" id="{82157C44-BAB9-4528-9CA0-306A10878C71}"/>
-                </a:ext>
-              </a:extLst>
-            </p:cNvPr>
-            <p:cNvSpPr txBox="1"/>
-            <p:nvPr/>
-          </p:nvSpPr>
-          <p:spPr>
-            <a:xfrm>
-              <a:off x="22108850" y="6619896"/>
-              <a:ext cx="2589631" cy="430887"/>
-            </a:xfrm>
-            <a:prstGeom prst="rect">
-              <a:avLst/>
-            </a:prstGeom>
-            <a:solidFill>
-              <a:schemeClr val="bg1"/>
-            </a:solidFill>
-          </p:spPr>
-          <p:txBody>
-            <a:bodyPr wrap="square" rtlCol="0">
-              <a:spAutoFit/>
-            </a:bodyPr>
-            <a:lstStyle/>
-            <a:p>
-              <a:r>
-                <a:rPr lang="en-US" sz="1500" dirty="0">
-                  <a:solidFill>
-                    <a:srgbClr val="202124"/>
-                  </a:solidFill>
-                  <a:latin typeface="Times New Roman" panose="02020603050405020304" pitchFamily="18" charset="0"/>
-                  <a:cs typeface="Times New Roman" panose="02020603050405020304" pitchFamily="18" charset="0"/>
-                </a:rPr>
-                <a:t>False Positives</a:t>
-              </a:r>
-            </a:p>
-          </p:txBody>
-        </p:sp>
-      </p:grpSp>
-      <p:grpSp>
-        <p:nvGrpSpPr>
-          <p:cNvPr id="10" name="Group 9">
-            <a:extLst>
-              <a:ext uri="{FF2B5EF4-FFF2-40B4-BE49-F238E27FC236}">
-                <a16:creationId xmlns:a16="http://schemas.microsoft.com/office/drawing/2014/main" id="{E0A94426-9EB8-43F6-8AE6-A5491FA14E7B}"/>
-              </a:ext>
-            </a:extLst>
-          </p:cNvPr>
-          <p:cNvGrpSpPr/>
-          <p:nvPr/>
-        </p:nvGrpSpPr>
-        <p:grpSpPr>
-          <a:xfrm>
-            <a:off x="10262309" y="1061483"/>
-            <a:ext cx="11594849" cy="5259359"/>
-            <a:chOff x="9500091" y="950941"/>
-            <a:chExt cx="11594849" cy="5259359"/>
-          </a:xfrm>
-        </p:grpSpPr>
-        <p:sp>
-          <p:nvSpPr>
-            <p:cNvPr id="84" name="TextBox 83">
-              <a:extLst>
-                <a:ext uri="{FF2B5EF4-FFF2-40B4-BE49-F238E27FC236}">
-                  <a16:creationId xmlns:a16="http://schemas.microsoft.com/office/drawing/2014/main" id="{3D58D976-2E70-4022-B035-09CF28965947}"/>
-                </a:ext>
-              </a:extLst>
-            </p:cNvPr>
-            <p:cNvSpPr txBox="1"/>
-            <p:nvPr/>
-          </p:nvSpPr>
-          <p:spPr>
-            <a:xfrm>
-              <a:off x="17119065" y="1069262"/>
-              <a:ext cx="3975875" cy="527802"/>
-            </a:xfrm>
-            <a:prstGeom prst="rect">
-              <a:avLst/>
-            </a:prstGeom>
-            <a:noFill/>
-          </p:spPr>
-          <p:txBody>
-            <a:bodyPr wrap="square" rtlCol="0">
-              <a:spAutoFit/>
-            </a:bodyPr>
-            <a:lstStyle/>
-            <a:p>
-              <a:pPr algn="l"/>
-              <a:r>
-                <a:rPr lang="en-US" sz="2700" dirty="0">
-                  <a:latin typeface="Times New Roman" panose="02020603050405020304" pitchFamily="18" charset="0"/>
-                  <a:cs typeface="Times New Roman" panose="02020603050405020304" pitchFamily="18" charset="0"/>
-                </a:rPr>
-                <a:t>Cystazosin</a:t>
-              </a:r>
-            </a:p>
-          </p:txBody>
-        </p:sp>
-        <p:grpSp>
-          <p:nvGrpSpPr>
-            <p:cNvPr id="9" name="Group 8">
-              <a:extLst>
-                <a:ext uri="{FF2B5EF4-FFF2-40B4-BE49-F238E27FC236}">
-                  <a16:creationId xmlns:a16="http://schemas.microsoft.com/office/drawing/2014/main" id="{3419E8C0-8C51-4D5C-9DE8-3588F0D70636}"/>
-                </a:ext>
-              </a:extLst>
-            </p:cNvPr>
-            <p:cNvGrpSpPr/>
-            <p:nvPr/>
-          </p:nvGrpSpPr>
-          <p:grpSpPr>
-            <a:xfrm>
-              <a:off x="9500091" y="950941"/>
-              <a:ext cx="10077676" cy="5259359"/>
-              <a:chOff x="9500091" y="950941"/>
-              <a:chExt cx="10077676" cy="5259359"/>
-            </a:xfrm>
-          </p:grpSpPr>
-          <p:sp>
-            <p:nvSpPr>
-              <p:cNvPr id="82" name="TextBox 81">
-                <a:extLst>
-                  <a:ext uri="{FF2B5EF4-FFF2-40B4-BE49-F238E27FC236}">
-                    <a16:creationId xmlns:a16="http://schemas.microsoft.com/office/drawing/2014/main" id="{B0CBB520-9746-4956-8DA9-1DFC6C523F24}"/>
-                  </a:ext>
-                </a:extLst>
-              </p:cNvPr>
-              <p:cNvSpPr txBox="1"/>
-              <p:nvPr/>
-            </p:nvSpPr>
-            <p:spPr>
-              <a:xfrm>
-                <a:off x="13308271" y="1100012"/>
-                <a:ext cx="3422388" cy="527802"/>
-              </a:xfrm>
-              <a:prstGeom prst="rect">
-                <a:avLst/>
-              </a:prstGeom>
-              <a:noFill/>
-            </p:spPr>
-            <p:txBody>
-              <a:bodyPr wrap="square" rtlCol="0">
-                <a:spAutoFit/>
-              </a:bodyPr>
-              <a:lstStyle/>
-              <a:p>
-                <a:pPr algn="l"/>
-                <a:r>
-                  <a:rPr lang="en-US" sz="2700" dirty="0">
-                    <a:latin typeface="Times New Roman" panose="02020603050405020304" pitchFamily="18" charset="0"/>
-                    <a:cs typeface="Times New Roman" panose="02020603050405020304" pitchFamily="18" charset="0"/>
-                  </a:rPr>
-                  <a:t>CHEMBL127587</a:t>
-                </a:r>
-              </a:p>
-            </p:txBody>
-          </p:sp>
-          <p:sp>
-            <p:nvSpPr>
-              <p:cNvPr id="83" name="TextBox 82">
-                <a:extLst>
-                  <a:ext uri="{FF2B5EF4-FFF2-40B4-BE49-F238E27FC236}">
-                    <a16:creationId xmlns:a16="http://schemas.microsoft.com/office/drawing/2014/main" id="{A406C1E5-1CE7-46FA-AEAB-F050F65F2772}"/>
-                  </a:ext>
-                </a:extLst>
-              </p:cNvPr>
-              <p:cNvSpPr txBox="1"/>
-              <p:nvPr/>
-            </p:nvSpPr>
-            <p:spPr>
-              <a:xfrm>
-                <a:off x="9740836" y="1094270"/>
-                <a:ext cx="3975875" cy="527802"/>
-              </a:xfrm>
-              <a:prstGeom prst="rect">
-                <a:avLst/>
-              </a:prstGeom>
-              <a:noFill/>
-            </p:spPr>
-            <p:txBody>
-              <a:bodyPr wrap="square" rtlCol="0">
-                <a:spAutoFit/>
-              </a:bodyPr>
-              <a:lstStyle/>
-              <a:p>
-                <a:pPr algn="l"/>
-                <a:r>
-                  <a:rPr lang="en-US" sz="2700" dirty="0">
-                    <a:latin typeface="Times New Roman" panose="02020603050405020304" pitchFamily="18" charset="0"/>
-                    <a:cs typeface="Times New Roman" panose="02020603050405020304" pitchFamily="18" charset="0"/>
-                  </a:rPr>
-                  <a:t>CHEMBL2333416 </a:t>
-                </a:r>
-              </a:p>
-            </p:txBody>
-          </p:sp>
-          <p:sp>
-            <p:nvSpPr>
-              <p:cNvPr id="85" name="TextBox 84">
-                <a:extLst>
-                  <a:ext uri="{FF2B5EF4-FFF2-40B4-BE49-F238E27FC236}">
-                    <a16:creationId xmlns:a16="http://schemas.microsoft.com/office/drawing/2014/main" id="{68FC9A30-B70F-456A-84BF-8165DE88BAC2}"/>
-                  </a:ext>
-                </a:extLst>
-              </p:cNvPr>
-              <p:cNvSpPr txBox="1"/>
-              <p:nvPr/>
-            </p:nvSpPr>
-            <p:spPr>
-              <a:xfrm>
-                <a:off x="10475189" y="4773535"/>
-                <a:ext cx="1868613" cy="1207282"/>
-              </a:xfrm>
-              <a:prstGeom prst="rect">
-                <a:avLst/>
-              </a:prstGeom>
-              <a:noFill/>
-            </p:spPr>
-            <p:txBody>
-              <a:bodyPr wrap="square" rtlCol="0">
-                <a:spAutoFit/>
-              </a:bodyPr>
-              <a:lstStyle/>
-              <a:p>
-                <a:r>
-                  <a:rPr lang="en-US" sz="2273" dirty="0">
-                    <a:latin typeface="Times New Roman" panose="02020603050405020304" pitchFamily="18" charset="0"/>
-                    <a:ea typeface="Calibri" panose="020F0502020204030204" pitchFamily="34" charset="0"/>
-                    <a:cs typeface="Times New Roman" panose="02020603050405020304" pitchFamily="18" charset="0"/>
-                  </a:rPr>
-                  <a:t>k</a:t>
-                </a:r>
-                <a:r>
-                  <a:rPr lang="en-US" sz="2273" baseline="-25000" dirty="0">
-                    <a:latin typeface="Times New Roman" panose="02020603050405020304" pitchFamily="18" charset="0"/>
-                    <a:ea typeface="Calibri" panose="020F0502020204030204" pitchFamily="34" charset="0"/>
-                    <a:cs typeface="Times New Roman" panose="02020603050405020304" pitchFamily="18" charset="0"/>
-                  </a:rPr>
-                  <a:t>i</a:t>
-                </a:r>
-                <a:r>
-                  <a:rPr lang="en-US" sz="2273" baseline="30000" dirty="0">
-                    <a:latin typeface="Times New Roman" panose="02020603050405020304" pitchFamily="18" charset="0"/>
-                    <a:ea typeface="Calibri" panose="020F0502020204030204" pitchFamily="34" charset="0"/>
-                    <a:cs typeface="Times New Roman" panose="02020603050405020304" pitchFamily="18" charset="0"/>
-                  </a:rPr>
-                  <a:t>+ </a:t>
-                </a:r>
-                <a:r>
-                  <a:rPr lang="en-US" sz="2273" dirty="0">
-                    <a:latin typeface="Times New Roman" panose="02020603050405020304" pitchFamily="18" charset="0"/>
-                    <a:cs typeface="Times New Roman" panose="02020603050405020304" pitchFamily="18" charset="0"/>
-                  </a:rPr>
-                  <a:t>= </a:t>
-                </a:r>
-                <a:r>
-                  <a:rPr lang="en-US" sz="2274" dirty="0">
-                    <a:latin typeface="Times New Roman" panose="02020603050405020304" pitchFamily="18" charset="0"/>
-                    <a:cs typeface="Times New Roman" panose="02020603050405020304" pitchFamily="18" charset="0"/>
-                  </a:rPr>
-                  <a:t>20</a:t>
-                </a:r>
-              </a:p>
-              <a:p>
-                <a:r>
-                  <a:rPr lang="en-US" sz="2273" dirty="0">
-                    <a:latin typeface="Times New Roman" panose="02020603050405020304" pitchFamily="18" charset="0"/>
-                    <a:ea typeface="Calibri" panose="020F0502020204030204" pitchFamily="34" charset="0"/>
-                    <a:cs typeface="Times New Roman" panose="02020603050405020304" pitchFamily="18" charset="0"/>
-                  </a:rPr>
-                  <a:t>k</a:t>
-                </a:r>
-                <a:r>
-                  <a:rPr lang="en-US" sz="2273" baseline="-25000" dirty="0">
-                    <a:latin typeface="Times New Roman" panose="02020603050405020304" pitchFamily="18" charset="0"/>
-                    <a:ea typeface="Calibri" panose="020F0502020204030204" pitchFamily="34" charset="0"/>
-                    <a:cs typeface="Times New Roman" panose="02020603050405020304" pitchFamily="18" charset="0"/>
-                  </a:rPr>
-                  <a:t>i</a:t>
-                </a:r>
-                <a:r>
-                  <a:rPr lang="en-US" sz="2273" baseline="30000" dirty="0">
-                    <a:latin typeface="Times New Roman" panose="02020603050405020304" pitchFamily="18" charset="0"/>
-                    <a:ea typeface="Calibri" panose="020F0502020204030204" pitchFamily="34" charset="0"/>
-                    <a:cs typeface="Times New Roman" panose="02020603050405020304" pitchFamily="18" charset="0"/>
-                  </a:rPr>
-                  <a:t>- </a:t>
-                </a:r>
-                <a:r>
-                  <a:rPr lang="en-US" sz="2274" dirty="0">
-                    <a:latin typeface="Times New Roman" panose="02020603050405020304" pitchFamily="18" charset="0"/>
-                    <a:cs typeface="Times New Roman" panose="02020603050405020304" pitchFamily="18" charset="0"/>
-                  </a:rPr>
-                  <a:t>= 11</a:t>
-                </a:r>
-              </a:p>
-              <a:p>
-                <a:r>
-                  <a:rPr lang="el-GR" sz="2273" dirty="0">
-                    <a:latin typeface="Times New Roman" panose="02020603050405020304" pitchFamily="18" charset="0"/>
-                    <a:ea typeface="Calibri" panose="020F0502020204030204" pitchFamily="34" charset="0"/>
-                    <a:cs typeface="Times New Roman" panose="02020603050405020304" pitchFamily="18" charset="0"/>
-                  </a:rPr>
-                  <a:t>ρ</a:t>
-                </a:r>
-                <a:r>
-                  <a:rPr lang="en-US" sz="2273" baseline="-25000" dirty="0">
-                    <a:latin typeface="Times New Roman" panose="02020603050405020304" pitchFamily="18" charset="0"/>
-                    <a:ea typeface="Calibri" panose="020F0502020204030204" pitchFamily="34" charset="0"/>
-                    <a:cs typeface="Times New Roman" panose="02020603050405020304" pitchFamily="18" charset="0"/>
-                  </a:rPr>
-                  <a:t>i </a:t>
-                </a:r>
-                <a:r>
-                  <a:rPr lang="el-GR" sz="2400" dirty="0">
-                    <a:solidFill>
-                      <a:srgbClr val="202124"/>
-                    </a:solidFill>
-                    <a:latin typeface="Times New Roman" panose="02020603050405020304" pitchFamily="18" charset="0"/>
-                    <a:cs typeface="Times New Roman" panose="02020603050405020304" pitchFamily="18" charset="0"/>
-                  </a:rPr>
-                  <a:t> </a:t>
-                </a:r>
-                <a:r>
-                  <a:rPr lang="en-US" sz="2274" dirty="0">
-                    <a:latin typeface="Times New Roman" panose="02020603050405020304" pitchFamily="18" charset="0"/>
-                    <a:cs typeface="Times New Roman" panose="02020603050405020304" pitchFamily="18" charset="0"/>
-                  </a:rPr>
-                  <a:t>= 0.64</a:t>
-                </a:r>
-              </a:p>
-            </p:txBody>
-          </p:sp>
-          <p:sp>
-            <p:nvSpPr>
-              <p:cNvPr id="105" name="TextBox 104">
-                <a:extLst>
-                  <a:ext uri="{FF2B5EF4-FFF2-40B4-BE49-F238E27FC236}">
-                    <a16:creationId xmlns:a16="http://schemas.microsoft.com/office/drawing/2014/main" id="{829406AA-C737-42EB-941C-29C753551814}"/>
-                  </a:ext>
-                </a:extLst>
-              </p:cNvPr>
-              <p:cNvSpPr txBox="1"/>
-              <p:nvPr/>
-            </p:nvSpPr>
-            <p:spPr>
-              <a:xfrm>
-                <a:off x="14122351" y="4782519"/>
-                <a:ext cx="1868613" cy="1207282"/>
-              </a:xfrm>
-              <a:prstGeom prst="rect">
-                <a:avLst/>
-              </a:prstGeom>
-              <a:noFill/>
-            </p:spPr>
-            <p:txBody>
-              <a:bodyPr wrap="square" rtlCol="0">
-                <a:spAutoFit/>
-              </a:bodyPr>
-              <a:lstStyle/>
-              <a:p>
-                <a:r>
-                  <a:rPr lang="en-US" sz="2273" dirty="0">
-                    <a:latin typeface="Times New Roman" panose="02020603050405020304" pitchFamily="18" charset="0"/>
-                    <a:ea typeface="Calibri" panose="020F0502020204030204" pitchFamily="34" charset="0"/>
-                    <a:cs typeface="Times New Roman" panose="02020603050405020304" pitchFamily="18" charset="0"/>
-                  </a:rPr>
-                  <a:t>k</a:t>
-                </a:r>
-                <a:r>
-                  <a:rPr lang="en-US" sz="2273" baseline="-25000" dirty="0">
-                    <a:latin typeface="Times New Roman" panose="02020603050405020304" pitchFamily="18" charset="0"/>
-                    <a:ea typeface="Calibri" panose="020F0502020204030204" pitchFamily="34" charset="0"/>
-                    <a:cs typeface="Times New Roman" panose="02020603050405020304" pitchFamily="18" charset="0"/>
-                  </a:rPr>
-                  <a:t>i</a:t>
-                </a:r>
-                <a:r>
-                  <a:rPr lang="en-US" sz="2273" baseline="30000" dirty="0">
-                    <a:latin typeface="Times New Roman" panose="02020603050405020304" pitchFamily="18" charset="0"/>
-                    <a:ea typeface="Calibri" panose="020F0502020204030204" pitchFamily="34" charset="0"/>
-                    <a:cs typeface="Times New Roman" panose="02020603050405020304" pitchFamily="18" charset="0"/>
-                  </a:rPr>
-                  <a:t>+ </a:t>
-                </a:r>
-                <a:r>
-                  <a:rPr lang="en-US" sz="2273" dirty="0">
-                    <a:latin typeface="Times New Roman" panose="02020603050405020304" pitchFamily="18" charset="0"/>
-                    <a:cs typeface="Times New Roman" panose="02020603050405020304" pitchFamily="18" charset="0"/>
-                  </a:rPr>
-                  <a:t>= 3</a:t>
-                </a:r>
-                <a:endParaRPr lang="en-US" sz="2274" dirty="0">
-                  <a:latin typeface="Times New Roman" panose="02020603050405020304" pitchFamily="18" charset="0"/>
-                  <a:cs typeface="Times New Roman" panose="02020603050405020304" pitchFamily="18" charset="0"/>
-                </a:endParaRPr>
-              </a:p>
-              <a:p>
-                <a:r>
-                  <a:rPr lang="en-US" sz="2273" dirty="0">
-                    <a:latin typeface="Times New Roman" panose="02020603050405020304" pitchFamily="18" charset="0"/>
-                    <a:ea typeface="Calibri" panose="020F0502020204030204" pitchFamily="34" charset="0"/>
-                    <a:cs typeface="Times New Roman" panose="02020603050405020304" pitchFamily="18" charset="0"/>
-                  </a:rPr>
-                  <a:t>k</a:t>
-                </a:r>
-                <a:r>
-                  <a:rPr lang="en-US" sz="2273" baseline="-25000" dirty="0">
-                    <a:latin typeface="Times New Roman" panose="02020603050405020304" pitchFamily="18" charset="0"/>
-                    <a:ea typeface="Calibri" panose="020F0502020204030204" pitchFamily="34" charset="0"/>
-                    <a:cs typeface="Times New Roman" panose="02020603050405020304" pitchFamily="18" charset="0"/>
-                  </a:rPr>
-                  <a:t>i</a:t>
-                </a:r>
-                <a:r>
-                  <a:rPr lang="en-US" sz="2273" baseline="30000" dirty="0">
-                    <a:latin typeface="Times New Roman" panose="02020603050405020304" pitchFamily="18" charset="0"/>
-                    <a:ea typeface="Calibri" panose="020F0502020204030204" pitchFamily="34" charset="0"/>
-                    <a:cs typeface="Times New Roman" panose="02020603050405020304" pitchFamily="18" charset="0"/>
-                  </a:rPr>
-                  <a:t>- </a:t>
-                </a:r>
-                <a:r>
-                  <a:rPr lang="en-US" sz="2274" dirty="0">
-                    <a:latin typeface="Times New Roman" panose="02020603050405020304" pitchFamily="18" charset="0"/>
-                    <a:cs typeface="Times New Roman" panose="02020603050405020304" pitchFamily="18" charset="0"/>
-                  </a:rPr>
-                  <a:t>= 1</a:t>
-                </a:r>
-              </a:p>
-              <a:p>
-                <a:r>
-                  <a:rPr lang="el-GR" sz="2273" dirty="0">
-                    <a:latin typeface="Times New Roman" panose="02020603050405020304" pitchFamily="18" charset="0"/>
-                    <a:ea typeface="Calibri" panose="020F0502020204030204" pitchFamily="34" charset="0"/>
-                    <a:cs typeface="Times New Roman" panose="02020603050405020304" pitchFamily="18" charset="0"/>
-                  </a:rPr>
-                  <a:t>ρ</a:t>
-                </a:r>
-                <a:r>
-                  <a:rPr lang="en-US" sz="2273" baseline="-25000" dirty="0">
-                    <a:latin typeface="Times New Roman" panose="02020603050405020304" pitchFamily="18" charset="0"/>
-                    <a:ea typeface="Calibri" panose="020F0502020204030204" pitchFamily="34" charset="0"/>
-                    <a:cs typeface="Times New Roman" panose="02020603050405020304" pitchFamily="18" charset="0"/>
-                  </a:rPr>
-                  <a:t>i </a:t>
-                </a:r>
-                <a:r>
-                  <a:rPr lang="el-GR" sz="2400" dirty="0">
-                    <a:solidFill>
-                      <a:srgbClr val="202124"/>
-                    </a:solidFill>
-                    <a:latin typeface="Times New Roman" panose="02020603050405020304" pitchFamily="18" charset="0"/>
-                    <a:cs typeface="Times New Roman" panose="02020603050405020304" pitchFamily="18" charset="0"/>
-                  </a:rPr>
-                  <a:t> </a:t>
-                </a:r>
-                <a:r>
-                  <a:rPr lang="en-US" sz="2274" dirty="0">
-                    <a:latin typeface="Times New Roman" panose="02020603050405020304" pitchFamily="18" charset="0"/>
-                    <a:cs typeface="Times New Roman" panose="02020603050405020304" pitchFamily="18" charset="0"/>
-                  </a:rPr>
-                  <a:t>= 0.75</a:t>
-                </a:r>
-              </a:p>
-            </p:txBody>
-          </p:sp>
-          <p:pic>
-            <p:nvPicPr>
-              <p:cNvPr id="109" name="Picture 108">
-                <a:extLst>
-                  <a:ext uri="{FF2B5EF4-FFF2-40B4-BE49-F238E27FC236}">
-                    <a16:creationId xmlns:a16="http://schemas.microsoft.com/office/drawing/2014/main" id="{420D98FF-634C-44E5-85EF-1E9F55125F95}"/>
-                  </a:ext>
-                </a:extLst>
-              </p:cNvPr>
-              <p:cNvPicPr>
-                <a:picLocks noChangeAspect="1"/>
-              </p:cNvPicPr>
-              <p:nvPr/>
-            </p:nvPicPr>
-            <p:blipFill>
-              <a:blip r:embed="rId4"/>
-              <a:stretch>
-                <a:fillRect/>
-              </a:stretch>
-            </p:blipFill>
-            <p:spPr>
-              <a:xfrm rot="5400000">
-                <a:off x="16419745" y="2678594"/>
-                <a:ext cx="3078449" cy="1039095"/>
-              </a:xfrm>
-              <a:prstGeom prst="rect">
-                <a:avLst/>
-              </a:prstGeom>
-            </p:spPr>
-          </p:pic>
-          <p:pic>
-            <p:nvPicPr>
-              <p:cNvPr id="110" name="Picture 109">
-                <a:extLst>
-                  <a:ext uri="{FF2B5EF4-FFF2-40B4-BE49-F238E27FC236}">
-                    <a16:creationId xmlns:a16="http://schemas.microsoft.com/office/drawing/2014/main" id="{3D15BA4B-4C39-4812-97B5-3192A9AF06B8}"/>
-                  </a:ext>
-                </a:extLst>
-              </p:cNvPr>
-              <p:cNvPicPr>
-                <a:picLocks noChangeAspect="1"/>
-              </p:cNvPicPr>
-              <p:nvPr/>
-            </p:nvPicPr>
-            <p:blipFill>
-              <a:blip r:embed="rId5"/>
-              <a:stretch>
-                <a:fillRect/>
-              </a:stretch>
-            </p:blipFill>
-            <p:spPr>
-              <a:xfrm>
-                <a:off x="12999652" y="1894919"/>
-                <a:ext cx="2933700" cy="2343150"/>
-              </a:xfrm>
-              <a:prstGeom prst="rect">
-                <a:avLst/>
-              </a:prstGeom>
-            </p:spPr>
-          </p:pic>
-          <p:pic>
-            <p:nvPicPr>
-              <p:cNvPr id="111" name="Picture 110">
-                <a:extLst>
-                  <a:ext uri="{FF2B5EF4-FFF2-40B4-BE49-F238E27FC236}">
-                    <a16:creationId xmlns:a16="http://schemas.microsoft.com/office/drawing/2014/main" id="{169B48E4-FFE8-48CF-BA8C-BEC638037724}"/>
-                  </a:ext>
-                </a:extLst>
-              </p:cNvPr>
-              <p:cNvPicPr>
-                <a:picLocks noChangeAspect="1"/>
-              </p:cNvPicPr>
-              <p:nvPr/>
-            </p:nvPicPr>
-            <p:blipFill>
-              <a:blip r:embed="rId6"/>
-              <a:stretch>
-                <a:fillRect/>
-              </a:stretch>
-            </p:blipFill>
-            <p:spPr>
-              <a:xfrm>
-                <a:off x="9905972" y="1666319"/>
-                <a:ext cx="2324100" cy="2800350"/>
-              </a:xfrm>
-              <a:prstGeom prst="rect">
-                <a:avLst/>
-              </a:prstGeom>
-            </p:spPr>
-          </p:pic>
-          <p:sp>
-            <p:nvSpPr>
-              <p:cNvPr id="114" name="Rectangle: Rounded Corners 113">
-                <a:extLst>
-                  <a:ext uri="{FF2B5EF4-FFF2-40B4-BE49-F238E27FC236}">
-                    <a16:creationId xmlns:a16="http://schemas.microsoft.com/office/drawing/2014/main" id="{9B1BBAE3-4F1D-4E65-A8A1-8017B59B82B4}"/>
-                  </a:ext>
-                </a:extLst>
-              </p:cNvPr>
-              <p:cNvSpPr/>
-              <p:nvPr/>
-            </p:nvSpPr>
-            <p:spPr>
-              <a:xfrm>
-                <a:off x="9500091" y="999625"/>
-                <a:ext cx="3237594" cy="5210675"/>
-              </a:xfrm>
-              <a:prstGeom prst="roundRect">
-                <a:avLst/>
-              </a:prstGeom>
-              <a:noFill/>
-              <a:ln w="38100">
-                <a:solidFill>
-                  <a:srgbClr val="92D6B7"/>
-                </a:solidFill>
-              </a:ln>
-            </p:spPr>
-            <p:style>
-              <a:lnRef idx="2">
-                <a:schemeClr val="accent1">
-                  <a:shade val="50000"/>
-                </a:schemeClr>
-              </a:lnRef>
-              <a:fillRef idx="1">
-                <a:schemeClr val="accent1"/>
-              </a:fillRef>
-              <a:effectRef idx="0">
-                <a:schemeClr val="accent1"/>
-              </a:effectRef>
-              <a:fontRef idx="minor">
-                <a:schemeClr val="lt1"/>
-              </a:fontRef>
-            </p:style>
-            <p:txBody>
-              <a:bodyPr rtlCol="0" anchor="ctr"/>
-              <a:lstStyle/>
-              <a:p>
-                <a:pPr algn="ctr"/>
-                <a:endParaRPr lang="en-US" sz="1350"/>
-              </a:p>
-            </p:txBody>
-          </p:sp>
-          <p:sp>
-            <p:nvSpPr>
-              <p:cNvPr id="115" name="Rectangle: Rounded Corners 114">
-                <a:extLst>
-                  <a:ext uri="{FF2B5EF4-FFF2-40B4-BE49-F238E27FC236}">
-                    <a16:creationId xmlns:a16="http://schemas.microsoft.com/office/drawing/2014/main" id="{784EA528-0779-453D-8B3E-B5FABD6E2539}"/>
-                  </a:ext>
-                </a:extLst>
-              </p:cNvPr>
-              <p:cNvSpPr/>
-              <p:nvPr/>
-            </p:nvSpPr>
-            <p:spPr>
-              <a:xfrm>
-                <a:off x="12963592" y="994522"/>
-                <a:ext cx="3237594" cy="5215778"/>
-              </a:xfrm>
-              <a:prstGeom prst="roundRect">
-                <a:avLst/>
-              </a:prstGeom>
-              <a:noFill/>
-              <a:ln w="38100">
-                <a:solidFill>
-                  <a:srgbClr val="92D6B7"/>
-                </a:solidFill>
-              </a:ln>
-            </p:spPr>
-            <p:style>
-              <a:lnRef idx="2">
-                <a:schemeClr val="accent1">
-                  <a:shade val="50000"/>
-                </a:schemeClr>
-              </a:lnRef>
-              <a:fillRef idx="1">
-                <a:schemeClr val="accent1"/>
-              </a:fillRef>
-              <a:effectRef idx="0">
-                <a:schemeClr val="accent1"/>
-              </a:effectRef>
-              <a:fontRef idx="minor">
-                <a:schemeClr val="lt1"/>
-              </a:fontRef>
-            </p:style>
-            <p:txBody>
-              <a:bodyPr rtlCol="0" anchor="ctr"/>
-              <a:lstStyle/>
-              <a:p>
-                <a:pPr algn="ctr"/>
-                <a:endParaRPr lang="en-US" sz="1350"/>
-              </a:p>
-            </p:txBody>
-          </p:sp>
-          <p:sp>
-            <p:nvSpPr>
-              <p:cNvPr id="116" name="Rectangle: Rounded Corners 115">
-                <a:extLst>
-                  <a:ext uri="{FF2B5EF4-FFF2-40B4-BE49-F238E27FC236}">
-                    <a16:creationId xmlns:a16="http://schemas.microsoft.com/office/drawing/2014/main" id="{C20C8DD4-396A-4DFB-ACBB-654774B56DF2}"/>
-                  </a:ext>
-                </a:extLst>
-              </p:cNvPr>
-              <p:cNvSpPr/>
-              <p:nvPr/>
-            </p:nvSpPr>
-            <p:spPr>
-              <a:xfrm>
-                <a:off x="16340173" y="950941"/>
-                <a:ext cx="3237594" cy="5259359"/>
-              </a:xfrm>
-              <a:prstGeom prst="roundRect">
-                <a:avLst/>
-              </a:prstGeom>
-              <a:noFill/>
-              <a:ln w="38100">
-                <a:solidFill>
-                  <a:srgbClr val="92D6B7"/>
-                </a:solidFill>
-              </a:ln>
-            </p:spPr>
-            <p:style>
-              <a:lnRef idx="2">
-                <a:schemeClr val="accent1">
-                  <a:shade val="50000"/>
-                </a:schemeClr>
-              </a:lnRef>
-              <a:fillRef idx="1">
-                <a:schemeClr val="accent1"/>
-              </a:fillRef>
-              <a:effectRef idx="0">
-                <a:schemeClr val="accent1"/>
-              </a:effectRef>
-              <a:fontRef idx="minor">
-                <a:schemeClr val="lt1"/>
-              </a:fontRef>
-            </p:style>
-            <p:txBody>
-              <a:bodyPr rtlCol="0" anchor="ctr"/>
-              <a:lstStyle/>
-              <a:p>
-                <a:pPr algn="ctr"/>
-                <a:endParaRPr lang="en-US" sz="1350"/>
-              </a:p>
-            </p:txBody>
-          </p:sp>
-          <p:sp>
-            <p:nvSpPr>
-              <p:cNvPr id="117" name="TextBox 116">
-                <a:extLst>
-                  <a:ext uri="{FF2B5EF4-FFF2-40B4-BE49-F238E27FC236}">
-                    <a16:creationId xmlns:a16="http://schemas.microsoft.com/office/drawing/2014/main" id="{E858C30C-7BA5-4EDA-B217-1B62C9F716E7}"/>
-                  </a:ext>
-                </a:extLst>
-              </p:cNvPr>
-              <p:cNvSpPr txBox="1"/>
-              <p:nvPr/>
-            </p:nvSpPr>
-            <p:spPr>
-              <a:xfrm>
-                <a:off x="17519706" y="4773535"/>
-                <a:ext cx="1868613" cy="1207282"/>
-              </a:xfrm>
-              <a:prstGeom prst="rect">
-                <a:avLst/>
-              </a:prstGeom>
-              <a:noFill/>
-            </p:spPr>
-            <p:txBody>
-              <a:bodyPr wrap="square" rtlCol="0">
-                <a:spAutoFit/>
-              </a:bodyPr>
-              <a:lstStyle/>
-              <a:p>
-                <a:r>
-                  <a:rPr lang="en-US" sz="2273" dirty="0">
-                    <a:latin typeface="Times New Roman" panose="02020603050405020304" pitchFamily="18" charset="0"/>
-                    <a:ea typeface="Calibri" panose="020F0502020204030204" pitchFamily="34" charset="0"/>
-                    <a:cs typeface="Times New Roman" panose="02020603050405020304" pitchFamily="18" charset="0"/>
-                  </a:rPr>
-                  <a:t>k</a:t>
-                </a:r>
-                <a:r>
-                  <a:rPr lang="en-US" sz="2273" baseline="-25000" dirty="0">
-                    <a:latin typeface="Times New Roman" panose="02020603050405020304" pitchFamily="18" charset="0"/>
-                    <a:ea typeface="Calibri" panose="020F0502020204030204" pitchFamily="34" charset="0"/>
-                    <a:cs typeface="Times New Roman" panose="02020603050405020304" pitchFamily="18" charset="0"/>
-                  </a:rPr>
-                  <a:t>i</a:t>
-                </a:r>
-                <a:r>
-                  <a:rPr lang="en-US" sz="2273" baseline="30000" dirty="0">
-                    <a:latin typeface="Times New Roman" panose="02020603050405020304" pitchFamily="18" charset="0"/>
-                    <a:ea typeface="Calibri" panose="020F0502020204030204" pitchFamily="34" charset="0"/>
-                    <a:cs typeface="Times New Roman" panose="02020603050405020304" pitchFamily="18" charset="0"/>
-                  </a:rPr>
-                  <a:t>+ </a:t>
-                </a:r>
-                <a:r>
-                  <a:rPr lang="en-US" sz="2273" dirty="0">
-                    <a:latin typeface="Times New Roman" panose="02020603050405020304" pitchFamily="18" charset="0"/>
-                    <a:cs typeface="Times New Roman" panose="02020603050405020304" pitchFamily="18" charset="0"/>
-                  </a:rPr>
-                  <a:t>= </a:t>
-                </a:r>
-                <a:r>
-                  <a:rPr lang="en-US" sz="2274" dirty="0">
-                    <a:latin typeface="Times New Roman" panose="02020603050405020304" pitchFamily="18" charset="0"/>
-                    <a:cs typeface="Times New Roman" panose="02020603050405020304" pitchFamily="18" charset="0"/>
-                  </a:rPr>
-                  <a:t>1</a:t>
-                </a:r>
-              </a:p>
-              <a:p>
-                <a:r>
-                  <a:rPr lang="en-US" sz="2273" dirty="0">
-                    <a:latin typeface="Times New Roman" panose="02020603050405020304" pitchFamily="18" charset="0"/>
-                    <a:ea typeface="Calibri" panose="020F0502020204030204" pitchFamily="34" charset="0"/>
-                    <a:cs typeface="Times New Roman" panose="02020603050405020304" pitchFamily="18" charset="0"/>
-                  </a:rPr>
-                  <a:t>k</a:t>
-                </a:r>
-                <a:r>
-                  <a:rPr lang="en-US" sz="2273" baseline="-25000" dirty="0">
-                    <a:latin typeface="Times New Roman" panose="02020603050405020304" pitchFamily="18" charset="0"/>
-                    <a:ea typeface="Calibri" panose="020F0502020204030204" pitchFamily="34" charset="0"/>
-                    <a:cs typeface="Times New Roman" panose="02020603050405020304" pitchFamily="18" charset="0"/>
-                  </a:rPr>
-                  <a:t>i</a:t>
-                </a:r>
-                <a:r>
-                  <a:rPr lang="en-US" sz="2273" baseline="30000" dirty="0">
-                    <a:latin typeface="Times New Roman" panose="02020603050405020304" pitchFamily="18" charset="0"/>
-                    <a:ea typeface="Calibri" panose="020F0502020204030204" pitchFamily="34" charset="0"/>
-                    <a:cs typeface="Times New Roman" panose="02020603050405020304" pitchFamily="18" charset="0"/>
-                  </a:rPr>
-                  <a:t>- </a:t>
-                </a:r>
-                <a:r>
-                  <a:rPr lang="en-US" sz="2274" dirty="0">
-                    <a:latin typeface="Times New Roman" panose="02020603050405020304" pitchFamily="18" charset="0"/>
-                    <a:cs typeface="Times New Roman" panose="02020603050405020304" pitchFamily="18" charset="0"/>
-                  </a:rPr>
-                  <a:t>= 0</a:t>
-                </a:r>
-              </a:p>
-              <a:p>
-                <a:r>
-                  <a:rPr lang="el-GR" sz="2273" dirty="0">
-                    <a:latin typeface="Times New Roman" panose="02020603050405020304" pitchFamily="18" charset="0"/>
-                    <a:ea typeface="Calibri" panose="020F0502020204030204" pitchFamily="34" charset="0"/>
-                    <a:cs typeface="Times New Roman" panose="02020603050405020304" pitchFamily="18" charset="0"/>
-                  </a:rPr>
-                  <a:t>ρ</a:t>
-                </a:r>
-                <a:r>
-                  <a:rPr lang="en-US" sz="2273" baseline="-25000" dirty="0">
-                    <a:latin typeface="Times New Roman" panose="02020603050405020304" pitchFamily="18" charset="0"/>
-                    <a:ea typeface="Calibri" panose="020F0502020204030204" pitchFamily="34" charset="0"/>
-                    <a:cs typeface="Times New Roman" panose="02020603050405020304" pitchFamily="18" charset="0"/>
-                  </a:rPr>
-                  <a:t>i </a:t>
-                </a:r>
-                <a:r>
-                  <a:rPr lang="el-GR" sz="2400" dirty="0">
-                    <a:solidFill>
-                      <a:srgbClr val="202124"/>
-                    </a:solidFill>
-                    <a:latin typeface="Times New Roman" panose="02020603050405020304" pitchFamily="18" charset="0"/>
-                    <a:cs typeface="Times New Roman" panose="02020603050405020304" pitchFamily="18" charset="0"/>
-                  </a:rPr>
-                  <a:t> </a:t>
-                </a:r>
-                <a:r>
-                  <a:rPr lang="en-US" sz="2274" dirty="0">
-                    <a:latin typeface="Times New Roman" panose="02020603050405020304" pitchFamily="18" charset="0"/>
-                    <a:cs typeface="Times New Roman" panose="02020603050405020304" pitchFamily="18" charset="0"/>
-                  </a:rPr>
-                  <a:t>= 1.0</a:t>
-                </a:r>
-              </a:p>
-            </p:txBody>
-          </p:sp>
-        </p:grpSp>
-      </p:grpSp>
-      <p:sp>
-        <p:nvSpPr>
-          <p:cNvPr id="153" name="TextBox 152">
-            <a:extLst>
-              <a:ext uri="{FF2B5EF4-FFF2-40B4-BE49-F238E27FC236}">
-                <a16:creationId xmlns:a16="http://schemas.microsoft.com/office/drawing/2014/main" id="{6C7FEA9A-1F4E-4D98-8C39-73A5E635B38A}"/>
-              </a:ext>
-            </a:extLst>
-          </p:cNvPr>
-          <p:cNvSpPr txBox="1"/>
-          <p:nvPr/>
-        </p:nvSpPr>
-        <p:spPr>
-          <a:xfrm>
-            <a:off x="9943064" y="10279330"/>
-            <a:ext cx="2824431" cy="459828"/>
-          </a:xfrm>
-          <a:prstGeom prst="rect">
-            <a:avLst/>
-          </a:prstGeom>
-          <a:solidFill>
-            <a:schemeClr val="bg1"/>
-          </a:solidFill>
-        </p:spPr>
-        <p:txBody>
-          <a:bodyPr wrap="none" rtlCol="0">
-            <a:spAutoFit/>
-          </a:bodyPr>
-          <a:lstStyle/>
-          <a:p>
-            <a:r>
-              <a:rPr lang="en-US" sz="2275" dirty="0">
-                <a:latin typeface="Times New Roman" panose="02020603050405020304" pitchFamily="18" charset="0"/>
-                <a:cs typeface="Times New Roman" panose="02020603050405020304" pitchFamily="18" charset="0"/>
-              </a:rPr>
-              <a:t>Ligand Degree Ratio</a:t>
-            </a:r>
-          </a:p>
-        </p:txBody>
-      </p:sp>
-      <p:grpSp>
-        <p:nvGrpSpPr>
-          <p:cNvPr id="154" name="Group 153">
-            <a:extLst>
-              <a:ext uri="{FF2B5EF4-FFF2-40B4-BE49-F238E27FC236}">
-                <a16:creationId xmlns:a16="http://schemas.microsoft.com/office/drawing/2014/main" id="{7B9628BF-E707-4872-80C3-6B370560532C}"/>
-              </a:ext>
-            </a:extLst>
-          </p:cNvPr>
-          <p:cNvGrpSpPr/>
-          <p:nvPr/>
-        </p:nvGrpSpPr>
-        <p:grpSpPr>
-          <a:xfrm>
-            <a:off x="3651392" y="1359539"/>
-            <a:ext cx="6529249" cy="4461590"/>
-            <a:chOff x="2086454" y="1074336"/>
-            <a:chExt cx="6529249" cy="4461590"/>
-          </a:xfrm>
-        </p:grpSpPr>
-        <p:pic>
-          <p:nvPicPr>
-            <p:cNvPr id="155" name="Picture 6">
-              <a:extLst>
-                <a:ext uri="{FF2B5EF4-FFF2-40B4-BE49-F238E27FC236}">
-                  <a16:creationId xmlns:a16="http://schemas.microsoft.com/office/drawing/2014/main" id="{6AB0524B-3444-45AD-87B2-A54934612BF0}"/>
-                </a:ext>
-              </a:extLst>
-            </p:cNvPr>
-            <p:cNvPicPr>
-              <a:picLocks noChangeAspect="1" noChangeArrowheads="1"/>
-            </p:cNvPicPr>
-            <p:nvPr/>
-          </p:nvPicPr>
-          <p:blipFill>
-            <a:blip r:embed="rId7">
-              <a:extLst>
-                <a:ext uri="{28A0092B-C50C-407E-A947-70E740481C1C}">
-                  <a14:useLocalDpi xmlns:a14="http://schemas.microsoft.com/office/drawing/2010/main" val="0"/>
-                </a:ext>
-              </a:extLst>
-            </a:blip>
-            <a:srcRect/>
-            <a:stretch>
-              <a:fillRect/>
-            </a:stretch>
-          </p:blipFill>
-          <p:spPr bwMode="auto">
-            <a:xfrm>
-              <a:off x="2086454" y="1074336"/>
-              <a:ext cx="6529249" cy="4430562"/>
-            </a:xfrm>
-            <a:prstGeom prst="rect">
-              <a:avLst/>
-            </a:prstGeom>
-            <a:noFill/>
-            <a:extLst>
-              <a:ext uri="{909E8E84-426E-40DD-AFC4-6F175D3DCCD1}">
-                <a14:hiddenFill xmlns:a14="http://schemas.microsoft.com/office/drawing/2010/main">
-                  <a:solidFill>
-                    <a:srgbClr val="FFFFFF"/>
-                  </a:solidFill>
-                </a14:hiddenFill>
-              </a:ext>
-            </a:extLst>
-          </p:spPr>
-        </p:pic>
-        <p:sp>
-          <p:nvSpPr>
-            <p:cNvPr id="156" name="TextBox 155">
-              <a:extLst>
-                <a:ext uri="{FF2B5EF4-FFF2-40B4-BE49-F238E27FC236}">
-                  <a16:creationId xmlns:a16="http://schemas.microsoft.com/office/drawing/2014/main" id="{D9FD7516-066A-4F5B-95C1-A9A439249DF4}"/>
-                </a:ext>
-              </a:extLst>
-            </p:cNvPr>
-            <p:cNvSpPr txBox="1"/>
-            <p:nvPr/>
-          </p:nvSpPr>
-          <p:spPr>
-            <a:xfrm>
-              <a:off x="4666062" y="4960141"/>
-              <a:ext cx="2036338" cy="575785"/>
-            </a:xfrm>
-            <a:prstGeom prst="rect">
-              <a:avLst/>
-            </a:prstGeom>
-            <a:solidFill>
-              <a:schemeClr val="bg1"/>
-            </a:solidFill>
-          </p:spPr>
-          <p:txBody>
-            <a:bodyPr wrap="square" rtlCol="0">
-              <a:spAutoFit/>
-            </a:bodyPr>
-            <a:lstStyle/>
-            <a:p>
-              <a:r>
-                <a:rPr lang="en-US" sz="1500" dirty="0">
-                  <a:solidFill>
-                    <a:srgbClr val="202124"/>
-                  </a:solidFill>
-                  <a:latin typeface="Times New Roman" panose="02020603050405020304" pitchFamily="18" charset="0"/>
-                  <a:cs typeface="Times New Roman" panose="02020603050405020304" pitchFamily="18" charset="0"/>
-                </a:rPr>
-                <a:t>Ligand degree ratio (</a:t>
-              </a:r>
-              <a:r>
-                <a:rPr lang="el-GR" sz="1500" dirty="0">
-                  <a:solidFill>
-                    <a:srgbClr val="202124"/>
-                  </a:solidFill>
-                  <a:latin typeface="Times New Roman" panose="02020603050405020304" pitchFamily="18" charset="0"/>
-                  <a:cs typeface="Times New Roman" panose="02020603050405020304" pitchFamily="18" charset="0"/>
-                </a:rPr>
-                <a:t>ρ</a:t>
-              </a:r>
-              <a:r>
-                <a:rPr lang="en-US" sz="1500" dirty="0">
-                  <a:solidFill>
-                    <a:srgbClr val="202124"/>
-                  </a:solidFill>
-                  <a:latin typeface="Times New Roman" panose="02020603050405020304" pitchFamily="18" charset="0"/>
-                  <a:cs typeface="Times New Roman" panose="02020603050405020304" pitchFamily="18" charset="0"/>
-                </a:rPr>
-                <a:t>)</a:t>
-              </a:r>
-              <a:endParaRPr lang="en-US" sz="1500" dirty="0">
-                <a:latin typeface="Times New Roman" panose="02020603050405020304" pitchFamily="18" charset="0"/>
-                <a:cs typeface="Times New Roman" panose="02020603050405020304" pitchFamily="18" charset="0"/>
-              </a:endParaRPr>
-            </a:p>
-          </p:txBody>
-        </p:sp>
-        <p:sp>
-          <p:nvSpPr>
-            <p:cNvPr id="157" name="TextBox 156">
-              <a:extLst>
-                <a:ext uri="{FF2B5EF4-FFF2-40B4-BE49-F238E27FC236}">
-                  <a16:creationId xmlns:a16="http://schemas.microsoft.com/office/drawing/2014/main" id="{CB544F0D-2E8A-486E-8740-3C7FDB47C49E}"/>
-                </a:ext>
-              </a:extLst>
-            </p:cNvPr>
-            <p:cNvSpPr txBox="1"/>
-            <p:nvPr/>
-          </p:nvSpPr>
-          <p:spPr>
-            <a:xfrm rot="16200000">
-              <a:off x="1162863" y="2786866"/>
-              <a:ext cx="2193496" cy="346311"/>
-            </a:xfrm>
-            <a:prstGeom prst="rect">
-              <a:avLst/>
-            </a:prstGeom>
-            <a:solidFill>
-              <a:schemeClr val="bg1"/>
-            </a:solidFill>
-          </p:spPr>
-          <p:txBody>
-            <a:bodyPr wrap="square" rtlCol="0">
-              <a:spAutoFit/>
-            </a:bodyPr>
-            <a:lstStyle/>
-            <a:p>
-              <a:r>
-                <a:rPr lang="en-US" sz="1500" dirty="0">
-                  <a:solidFill>
-                    <a:srgbClr val="202124"/>
-                  </a:solidFill>
-                  <a:latin typeface="Times New Roman" panose="02020603050405020304" pitchFamily="18" charset="0"/>
-                  <a:cs typeface="Times New Roman" panose="02020603050405020304" pitchFamily="18" charset="0"/>
-                </a:rPr>
-                <a:t>DeepPurpose Prediction</a:t>
-              </a:r>
-              <a:endParaRPr lang="en-US" sz="1500" dirty="0">
-                <a:latin typeface="Times New Roman" panose="02020603050405020304" pitchFamily="18" charset="0"/>
-                <a:cs typeface="Times New Roman" panose="02020603050405020304" pitchFamily="18" charset="0"/>
-              </a:endParaRPr>
-            </a:p>
-          </p:txBody>
-        </p:sp>
-      </p:grpSp>
       <p:pic>
         <p:nvPicPr>
           <p:cNvPr id="1030" name="Picture 6">
@@ -5100,7 +3627,7 @@
           <p:nvPr/>
         </p:nvPicPr>
         <p:blipFill>
-          <a:blip r:embed="rId8">
+          <a:blip r:embed="rId3">
             <a:extLst>
               <a:ext uri="{28A0092B-C50C-407E-A947-70E740481C1C}">
                 <a14:useLocalDpi xmlns:a14="http://schemas.microsoft.com/office/drawing/2010/main" val="0"/>
@@ -5301,7 +3828,7 @@
             <p:nvPr/>
           </p:nvPicPr>
           <p:blipFill>
-            <a:blip r:embed="rId9">
+            <a:blip r:embed="rId4">
               <a:extLst>
                 <a:ext uri="{28A0092B-C50C-407E-A947-70E740481C1C}">
                   <a14:useLocalDpi xmlns:a14="http://schemas.microsoft.com/office/drawing/2010/main" val="0"/>
@@ -6342,7 +4869,7 @@
           <p:nvPr/>
         </p:nvPicPr>
         <p:blipFill>
-          <a:blip r:embed="rId10"/>
+          <a:blip r:embed="rId5"/>
           <a:stretch>
             <a:fillRect/>
           </a:stretch>
@@ -6372,7 +4899,7 @@
           <p:nvPr/>
         </p:nvPicPr>
         <p:blipFill>
-          <a:blip r:embed="rId11"/>
+          <a:blip r:embed="rId6"/>
           <a:stretch>
             <a:fillRect/>
           </a:stretch>
@@ -6402,7 +4929,7 @@
           <p:nvPr/>
         </p:nvPicPr>
         <p:blipFill>
-          <a:blip r:embed="rId12"/>
+          <a:blip r:embed="rId7"/>
           <a:stretch>
             <a:fillRect/>
           </a:stretch>
@@ -6469,6 +4996,1392 @@
           </a:p>
         </p:txBody>
       </p:sp>
+      <p:pic>
+        <p:nvPicPr>
+          <p:cNvPr id="1026" name="Picture 2">
+            <a:extLst>
+              <a:ext uri="{FF2B5EF4-FFF2-40B4-BE49-F238E27FC236}">
+                <a16:creationId xmlns:a16="http://schemas.microsoft.com/office/drawing/2014/main" id="{98B54965-0B61-4D59-89FC-DA748191CF65}"/>
+              </a:ext>
+            </a:extLst>
+          </p:cNvPr>
+          <p:cNvPicPr>
+            <a:picLocks noChangeAspect="1" noChangeArrowheads="1"/>
+          </p:cNvPicPr>
+          <p:nvPr/>
+        </p:nvPicPr>
+        <p:blipFill>
+          <a:blip r:embed="rId8">
+            <a:extLst>
+              <a:ext uri="{28A0092B-C50C-407E-A947-70E740481C1C}">
+                <a14:useLocalDpi xmlns:a14="http://schemas.microsoft.com/office/drawing/2010/main" val="0"/>
+              </a:ext>
+            </a:extLst>
+          </a:blip>
+          <a:srcRect/>
+          <a:stretch>
+            <a:fillRect/>
+          </a:stretch>
+        </p:blipFill>
+        <p:spPr bwMode="auto">
+          <a:xfrm>
+            <a:off x="1248669" y="831129"/>
+            <a:ext cx="19690070" cy="9790895"/>
+          </a:xfrm>
+          <a:prstGeom prst="rect">
+            <a:avLst/>
+          </a:prstGeom>
+          <a:noFill/>
+          <a:extLst>
+            <a:ext uri="{909E8E84-426E-40DD-AFC4-6F175D3DCCD1}">
+              <a14:hiddenFill xmlns:a14="http://schemas.microsoft.com/office/drawing/2010/main">
+                <a:solidFill>
+                  <a:srgbClr val="FFFFFF"/>
+                </a:solidFill>
+              </a14:hiddenFill>
+            </a:ext>
+          </a:extLst>
+        </p:spPr>
+      </p:pic>
+      <p:grpSp>
+        <p:nvGrpSpPr>
+          <p:cNvPr id="62" name="Group 61">
+            <a:extLst>
+              <a:ext uri="{FF2B5EF4-FFF2-40B4-BE49-F238E27FC236}">
+                <a16:creationId xmlns:a16="http://schemas.microsoft.com/office/drawing/2014/main" id="{83812C72-1C5A-47FE-9F6A-4A8D7C6C2569}"/>
+              </a:ext>
+            </a:extLst>
+          </p:cNvPr>
+          <p:cNvGrpSpPr/>
+          <p:nvPr/>
+        </p:nvGrpSpPr>
+        <p:grpSpPr>
+          <a:xfrm>
+            <a:off x="467073" y="180853"/>
+            <a:ext cx="21390085" cy="10558305"/>
+            <a:chOff x="467073" y="180853"/>
+            <a:chExt cx="21390085" cy="10558305"/>
+          </a:xfrm>
+        </p:grpSpPr>
+        <p:sp>
+          <p:nvSpPr>
+            <p:cNvPr id="63" name="TextBox 62">
+              <a:extLst>
+                <a:ext uri="{FF2B5EF4-FFF2-40B4-BE49-F238E27FC236}">
+                  <a16:creationId xmlns:a16="http://schemas.microsoft.com/office/drawing/2014/main" id="{A3B116BA-5C44-41A1-9577-DDFBC3A97D21}"/>
+                </a:ext>
+              </a:extLst>
+            </p:cNvPr>
+            <p:cNvSpPr txBox="1"/>
+            <p:nvPr/>
+          </p:nvSpPr>
+          <p:spPr>
+            <a:xfrm rot="10800000" flipV="1">
+              <a:off x="467073" y="180853"/>
+              <a:ext cx="1732641" cy="742256"/>
+            </a:xfrm>
+            <a:prstGeom prst="rect">
+              <a:avLst/>
+            </a:prstGeom>
+            <a:noFill/>
+          </p:spPr>
+          <p:txBody>
+            <a:bodyPr wrap="square" rtlCol="0">
+              <a:spAutoFit/>
+            </a:bodyPr>
+            <a:lstStyle/>
+            <a:p>
+              <a:r>
+                <a:rPr lang="en-US" sz="4041" b="1" dirty="0">
+                  <a:latin typeface="Times New Roman" panose="02020603050405020304" pitchFamily="18" charset="0"/>
+                  <a:cs typeface="Times New Roman" panose="02020603050405020304" pitchFamily="18" charset="0"/>
+                </a:rPr>
+                <a:t>A</a:t>
+              </a:r>
+            </a:p>
+          </p:txBody>
+        </p:sp>
+        <p:sp>
+          <p:nvSpPr>
+            <p:cNvPr id="66" name="TextBox 65">
+              <a:extLst>
+                <a:ext uri="{FF2B5EF4-FFF2-40B4-BE49-F238E27FC236}">
+                  <a16:creationId xmlns:a16="http://schemas.microsoft.com/office/drawing/2014/main" id="{EE19C870-F9A4-4218-A8CB-1A2AB59BF75D}"/>
+                </a:ext>
+              </a:extLst>
+            </p:cNvPr>
+            <p:cNvSpPr txBox="1"/>
+            <p:nvPr/>
+          </p:nvSpPr>
+          <p:spPr>
+            <a:xfrm rot="16200000">
+              <a:off x="857562" y="5159706"/>
+              <a:ext cx="746721" cy="474117"/>
+            </a:xfrm>
+            <a:prstGeom prst="rect">
+              <a:avLst/>
+            </a:prstGeom>
+            <a:solidFill>
+              <a:schemeClr val="bg1"/>
+            </a:solidFill>
+          </p:spPr>
+          <p:txBody>
+            <a:bodyPr wrap="none" rtlCol="0">
+              <a:spAutoFit/>
+            </a:bodyPr>
+            <a:lstStyle/>
+            <a:p>
+              <a:r>
+                <a:rPr lang="en-US" sz="2275" dirty="0">
+                  <a:latin typeface="Times New Roman" panose="02020603050405020304" pitchFamily="18" charset="0"/>
+                  <a:cs typeface="Times New Roman" panose="02020603050405020304" pitchFamily="18" charset="0"/>
+                </a:rPr>
+                <a:t>PDF</a:t>
+              </a:r>
+            </a:p>
+          </p:txBody>
+        </p:sp>
+        <p:grpSp>
+          <p:nvGrpSpPr>
+            <p:cNvPr id="67" name="Group 66">
+              <a:extLst>
+                <a:ext uri="{FF2B5EF4-FFF2-40B4-BE49-F238E27FC236}">
+                  <a16:creationId xmlns:a16="http://schemas.microsoft.com/office/drawing/2014/main" id="{FB4F1B19-5AB7-4517-AB18-C11EFD72CABE}"/>
+                </a:ext>
+              </a:extLst>
+            </p:cNvPr>
+            <p:cNvGrpSpPr/>
+            <p:nvPr/>
+          </p:nvGrpSpPr>
+          <p:grpSpPr>
+            <a:xfrm>
+              <a:off x="4336259" y="8329848"/>
+              <a:ext cx="2589746" cy="647759"/>
+              <a:chOff x="21483123" y="6219785"/>
+              <a:chExt cx="3222211" cy="830998"/>
+            </a:xfrm>
+          </p:grpSpPr>
+          <p:sp>
+            <p:nvSpPr>
+              <p:cNvPr id="94" name="TextBox 93">
+                <a:extLst>
+                  <a:ext uri="{FF2B5EF4-FFF2-40B4-BE49-F238E27FC236}">
+                    <a16:creationId xmlns:a16="http://schemas.microsoft.com/office/drawing/2014/main" id="{D73A8CBC-AB5C-4914-990D-DE742CA2F993}"/>
+                  </a:ext>
+                </a:extLst>
+              </p:cNvPr>
+              <p:cNvSpPr txBox="1"/>
+              <p:nvPr/>
+            </p:nvSpPr>
+            <p:spPr>
+              <a:xfrm>
+                <a:off x="22115703" y="6219785"/>
+                <a:ext cx="2589631" cy="414582"/>
+              </a:xfrm>
+              <a:prstGeom prst="rect">
+                <a:avLst/>
+              </a:prstGeom>
+              <a:solidFill>
+                <a:schemeClr val="bg1"/>
+              </a:solidFill>
+            </p:spPr>
+            <p:txBody>
+              <a:bodyPr wrap="square" rtlCol="0">
+                <a:spAutoFit/>
+              </a:bodyPr>
+              <a:lstStyle/>
+              <a:p>
+                <a:r>
+                  <a:rPr lang="en-US" sz="1500" dirty="0">
+                    <a:solidFill>
+                      <a:srgbClr val="202124"/>
+                    </a:solidFill>
+                    <a:latin typeface="Times New Roman" panose="02020603050405020304" pitchFamily="18" charset="0"/>
+                    <a:cs typeface="Times New Roman" panose="02020603050405020304" pitchFamily="18" charset="0"/>
+                  </a:rPr>
+                  <a:t>Whole BindingDB</a:t>
+                </a:r>
+              </a:p>
+            </p:txBody>
+          </p:sp>
+          <p:sp>
+            <p:nvSpPr>
+              <p:cNvPr id="95" name="Rectangle 94">
+                <a:extLst>
+                  <a:ext uri="{FF2B5EF4-FFF2-40B4-BE49-F238E27FC236}">
+                    <a16:creationId xmlns:a16="http://schemas.microsoft.com/office/drawing/2014/main" id="{C4EBC9F9-BB6E-4E6F-957A-7F9C8B4A479F}"/>
+                  </a:ext>
+                </a:extLst>
+              </p:cNvPr>
+              <p:cNvSpPr/>
+              <p:nvPr/>
+            </p:nvSpPr>
+            <p:spPr>
+              <a:xfrm>
+                <a:off x="21483123" y="6296644"/>
+                <a:ext cx="440857" cy="247772"/>
+              </a:xfrm>
+              <a:prstGeom prst="rect">
+                <a:avLst/>
+              </a:prstGeom>
+              <a:solidFill>
+                <a:srgbClr val="D6E5F0"/>
+              </a:solidFill>
+            </p:spPr>
+            <p:style>
+              <a:lnRef idx="2">
+                <a:schemeClr val="accent1">
+                  <a:shade val="50000"/>
+                </a:schemeClr>
+              </a:lnRef>
+              <a:fillRef idx="1">
+                <a:schemeClr val="accent1"/>
+              </a:fillRef>
+              <a:effectRef idx="0">
+                <a:schemeClr val="accent1"/>
+              </a:effectRef>
+              <a:fontRef idx="minor">
+                <a:schemeClr val="lt1"/>
+              </a:fontRef>
+            </p:style>
+            <p:txBody>
+              <a:bodyPr rtlCol="0" anchor="ctr"/>
+              <a:lstStyle/>
+              <a:p>
+                <a:pPr algn="ctr"/>
+                <a:endParaRPr lang="en-US" sz="1350"/>
+              </a:p>
+            </p:txBody>
+          </p:sp>
+          <p:sp>
+            <p:nvSpPr>
+              <p:cNvPr id="96" name="Rectangle 95">
+                <a:extLst>
+                  <a:ext uri="{FF2B5EF4-FFF2-40B4-BE49-F238E27FC236}">
+                    <a16:creationId xmlns:a16="http://schemas.microsoft.com/office/drawing/2014/main" id="{7E943F50-9A96-49E8-9029-F8BB389E4233}"/>
+                  </a:ext>
+                </a:extLst>
+              </p:cNvPr>
+              <p:cNvSpPr/>
+              <p:nvPr/>
+            </p:nvSpPr>
+            <p:spPr>
+              <a:xfrm>
+                <a:off x="21483123" y="6721369"/>
+                <a:ext cx="440857" cy="247772"/>
+              </a:xfrm>
+              <a:prstGeom prst="rect">
+                <a:avLst/>
+              </a:prstGeom>
+              <a:solidFill>
+                <a:srgbClr val="F9D0D0"/>
+              </a:solidFill>
+            </p:spPr>
+            <p:style>
+              <a:lnRef idx="2">
+                <a:schemeClr val="accent1">
+                  <a:shade val="50000"/>
+                </a:schemeClr>
+              </a:lnRef>
+              <a:fillRef idx="1">
+                <a:schemeClr val="accent1"/>
+              </a:fillRef>
+              <a:effectRef idx="0">
+                <a:schemeClr val="accent1"/>
+              </a:effectRef>
+              <a:fontRef idx="minor">
+                <a:schemeClr val="lt1"/>
+              </a:fontRef>
+            </p:style>
+            <p:txBody>
+              <a:bodyPr rtlCol="0" anchor="ctr"/>
+              <a:lstStyle/>
+              <a:p>
+                <a:pPr algn="ctr"/>
+                <a:endParaRPr lang="en-US" sz="1350"/>
+              </a:p>
+            </p:txBody>
+          </p:sp>
+          <p:sp>
+            <p:nvSpPr>
+              <p:cNvPr id="97" name="TextBox 96">
+                <a:extLst>
+                  <a:ext uri="{FF2B5EF4-FFF2-40B4-BE49-F238E27FC236}">
+                    <a16:creationId xmlns:a16="http://schemas.microsoft.com/office/drawing/2014/main" id="{3529302F-7E5F-40F2-ABAA-064C7220C455}"/>
+                  </a:ext>
+                </a:extLst>
+              </p:cNvPr>
+              <p:cNvSpPr txBox="1"/>
+              <p:nvPr/>
+            </p:nvSpPr>
+            <p:spPr>
+              <a:xfrm>
+                <a:off x="22108850" y="6619896"/>
+                <a:ext cx="2589631" cy="430887"/>
+              </a:xfrm>
+              <a:prstGeom prst="rect">
+                <a:avLst/>
+              </a:prstGeom>
+              <a:solidFill>
+                <a:schemeClr val="bg1"/>
+              </a:solidFill>
+            </p:spPr>
+            <p:txBody>
+              <a:bodyPr wrap="square" rtlCol="0">
+                <a:spAutoFit/>
+              </a:bodyPr>
+              <a:lstStyle/>
+              <a:p>
+                <a:r>
+                  <a:rPr lang="en-US" sz="1500" dirty="0">
+                    <a:solidFill>
+                      <a:srgbClr val="202124"/>
+                    </a:solidFill>
+                    <a:latin typeface="Times New Roman" panose="02020603050405020304" pitchFamily="18" charset="0"/>
+                    <a:cs typeface="Times New Roman" panose="02020603050405020304" pitchFamily="18" charset="0"/>
+                  </a:rPr>
+                  <a:t>False Positives</a:t>
+                </a:r>
+              </a:p>
+            </p:txBody>
+          </p:sp>
+        </p:grpSp>
+        <p:grpSp>
+          <p:nvGrpSpPr>
+            <p:cNvPr id="68" name="Group 67">
+              <a:extLst>
+                <a:ext uri="{FF2B5EF4-FFF2-40B4-BE49-F238E27FC236}">
+                  <a16:creationId xmlns:a16="http://schemas.microsoft.com/office/drawing/2014/main" id="{4C134FA9-EAD9-4805-9B6E-A2D2ED4151AB}"/>
+                </a:ext>
+              </a:extLst>
+            </p:cNvPr>
+            <p:cNvGrpSpPr/>
+            <p:nvPr/>
+          </p:nvGrpSpPr>
+          <p:grpSpPr>
+            <a:xfrm>
+              <a:off x="10262309" y="1061483"/>
+              <a:ext cx="11594849" cy="5259359"/>
+              <a:chOff x="9500091" y="950941"/>
+              <a:chExt cx="11594849" cy="5259359"/>
+            </a:xfrm>
+          </p:grpSpPr>
+          <p:sp>
+            <p:nvSpPr>
+              <p:cNvPr id="74" name="TextBox 73">
+                <a:extLst>
+                  <a:ext uri="{FF2B5EF4-FFF2-40B4-BE49-F238E27FC236}">
+                    <a16:creationId xmlns:a16="http://schemas.microsoft.com/office/drawing/2014/main" id="{2C54DFEE-D87A-43F0-8ED0-D6C7C6ABE1F4}"/>
+                  </a:ext>
+                </a:extLst>
+              </p:cNvPr>
+              <p:cNvSpPr txBox="1"/>
+              <p:nvPr/>
+            </p:nvSpPr>
+            <p:spPr>
+              <a:xfrm>
+                <a:off x="17119065" y="1069262"/>
+                <a:ext cx="3975875" cy="527802"/>
+              </a:xfrm>
+              <a:prstGeom prst="rect">
+                <a:avLst/>
+              </a:prstGeom>
+              <a:noFill/>
+            </p:spPr>
+            <p:txBody>
+              <a:bodyPr wrap="square" rtlCol="0">
+                <a:spAutoFit/>
+              </a:bodyPr>
+              <a:lstStyle/>
+              <a:p>
+                <a:pPr algn="l"/>
+                <a:r>
+                  <a:rPr lang="en-US" sz="2700" dirty="0">
+                    <a:latin typeface="Times New Roman" panose="02020603050405020304" pitchFamily="18" charset="0"/>
+                    <a:cs typeface="Times New Roman" panose="02020603050405020304" pitchFamily="18" charset="0"/>
+                  </a:rPr>
+                  <a:t>Cystazosin</a:t>
+                </a:r>
+              </a:p>
+            </p:txBody>
+          </p:sp>
+          <p:grpSp>
+            <p:nvGrpSpPr>
+              <p:cNvPr id="75" name="Group 74">
+                <a:extLst>
+                  <a:ext uri="{FF2B5EF4-FFF2-40B4-BE49-F238E27FC236}">
+                    <a16:creationId xmlns:a16="http://schemas.microsoft.com/office/drawing/2014/main" id="{8AC24AC9-DD88-48F1-809F-88AA6BED52FD}"/>
+                  </a:ext>
+                </a:extLst>
+              </p:cNvPr>
+              <p:cNvGrpSpPr/>
+              <p:nvPr/>
+            </p:nvGrpSpPr>
+            <p:grpSpPr>
+              <a:xfrm>
+                <a:off x="9500091" y="950941"/>
+                <a:ext cx="10077676" cy="5259359"/>
+                <a:chOff x="9500091" y="950941"/>
+                <a:chExt cx="10077676" cy="5259359"/>
+              </a:xfrm>
+            </p:grpSpPr>
+            <p:sp>
+              <p:nvSpPr>
+                <p:cNvPr id="76" name="TextBox 75">
+                  <a:extLst>
+                    <a:ext uri="{FF2B5EF4-FFF2-40B4-BE49-F238E27FC236}">
+                      <a16:creationId xmlns:a16="http://schemas.microsoft.com/office/drawing/2014/main" id="{94879EF8-B46A-4B07-BFE0-55C9F5B67742}"/>
+                    </a:ext>
+                  </a:extLst>
+                </p:cNvPr>
+                <p:cNvSpPr txBox="1"/>
+                <p:nvPr/>
+              </p:nvSpPr>
+              <p:spPr>
+                <a:xfrm>
+                  <a:off x="13308271" y="1100012"/>
+                  <a:ext cx="3422388" cy="527802"/>
+                </a:xfrm>
+                <a:prstGeom prst="rect">
+                  <a:avLst/>
+                </a:prstGeom>
+                <a:noFill/>
+              </p:spPr>
+              <p:txBody>
+                <a:bodyPr wrap="square" rtlCol="0">
+                  <a:spAutoFit/>
+                </a:bodyPr>
+                <a:lstStyle/>
+                <a:p>
+                  <a:pPr algn="l"/>
+                  <a:r>
+                    <a:rPr lang="en-US" sz="2700" dirty="0">
+                      <a:latin typeface="Times New Roman" panose="02020603050405020304" pitchFamily="18" charset="0"/>
+                      <a:cs typeface="Times New Roman" panose="02020603050405020304" pitchFamily="18" charset="0"/>
+                    </a:rPr>
+                    <a:t>CHEMBL127587</a:t>
+                  </a:r>
+                </a:p>
+              </p:txBody>
+            </p:sp>
+            <p:sp>
+              <p:nvSpPr>
+                <p:cNvPr id="77" name="TextBox 76">
+                  <a:extLst>
+                    <a:ext uri="{FF2B5EF4-FFF2-40B4-BE49-F238E27FC236}">
+                      <a16:creationId xmlns:a16="http://schemas.microsoft.com/office/drawing/2014/main" id="{95B8151B-A99E-44D2-9423-0C17B4D3F52F}"/>
+                    </a:ext>
+                  </a:extLst>
+                </p:cNvPr>
+                <p:cNvSpPr txBox="1"/>
+                <p:nvPr/>
+              </p:nvSpPr>
+              <p:spPr>
+                <a:xfrm>
+                  <a:off x="9740836" y="1094270"/>
+                  <a:ext cx="3975875" cy="527802"/>
+                </a:xfrm>
+                <a:prstGeom prst="rect">
+                  <a:avLst/>
+                </a:prstGeom>
+                <a:noFill/>
+              </p:spPr>
+              <p:txBody>
+                <a:bodyPr wrap="square" rtlCol="0">
+                  <a:spAutoFit/>
+                </a:bodyPr>
+                <a:lstStyle/>
+                <a:p>
+                  <a:pPr algn="l"/>
+                  <a:r>
+                    <a:rPr lang="en-US" sz="2700" dirty="0">
+                      <a:latin typeface="Times New Roman" panose="02020603050405020304" pitchFamily="18" charset="0"/>
+                      <a:cs typeface="Times New Roman" panose="02020603050405020304" pitchFamily="18" charset="0"/>
+                    </a:rPr>
+                    <a:t>CHEMBL2333416 </a:t>
+                  </a:r>
+                </a:p>
+              </p:txBody>
+            </p:sp>
+            <p:sp>
+              <p:nvSpPr>
+                <p:cNvPr id="78" name="TextBox 77">
+                  <a:extLst>
+                    <a:ext uri="{FF2B5EF4-FFF2-40B4-BE49-F238E27FC236}">
+                      <a16:creationId xmlns:a16="http://schemas.microsoft.com/office/drawing/2014/main" id="{D7E81AEE-14E4-4BE8-BFA5-03DC627E33F2}"/>
+                    </a:ext>
+                  </a:extLst>
+                </p:cNvPr>
+                <p:cNvSpPr txBox="1"/>
+                <p:nvPr/>
+              </p:nvSpPr>
+              <p:spPr>
+                <a:xfrm>
+                  <a:off x="10475189" y="4773535"/>
+                  <a:ext cx="1868613" cy="1207282"/>
+                </a:xfrm>
+                <a:prstGeom prst="rect">
+                  <a:avLst/>
+                </a:prstGeom>
+                <a:noFill/>
+              </p:spPr>
+              <p:txBody>
+                <a:bodyPr wrap="square" rtlCol="0">
+                  <a:spAutoFit/>
+                </a:bodyPr>
+                <a:lstStyle/>
+                <a:p>
+                  <a:r>
+                    <a:rPr lang="en-US" sz="2273" dirty="0">
+                      <a:latin typeface="Times New Roman" panose="02020603050405020304" pitchFamily="18" charset="0"/>
+                      <a:ea typeface="Calibri" panose="020F0502020204030204" pitchFamily="34" charset="0"/>
+                      <a:cs typeface="Times New Roman" panose="02020603050405020304" pitchFamily="18" charset="0"/>
+                    </a:rPr>
+                    <a:t>k</a:t>
+                  </a:r>
+                  <a:r>
+                    <a:rPr lang="en-US" sz="2273" baseline="-25000" dirty="0">
+                      <a:latin typeface="Times New Roman" panose="02020603050405020304" pitchFamily="18" charset="0"/>
+                      <a:ea typeface="Calibri" panose="020F0502020204030204" pitchFamily="34" charset="0"/>
+                      <a:cs typeface="Times New Roman" panose="02020603050405020304" pitchFamily="18" charset="0"/>
+                    </a:rPr>
+                    <a:t>i</a:t>
+                  </a:r>
+                  <a:r>
+                    <a:rPr lang="en-US" sz="2273" baseline="30000" dirty="0">
+                      <a:latin typeface="Times New Roman" panose="02020603050405020304" pitchFamily="18" charset="0"/>
+                      <a:ea typeface="Calibri" panose="020F0502020204030204" pitchFamily="34" charset="0"/>
+                      <a:cs typeface="Times New Roman" panose="02020603050405020304" pitchFamily="18" charset="0"/>
+                    </a:rPr>
+                    <a:t>+ </a:t>
+                  </a:r>
+                  <a:r>
+                    <a:rPr lang="en-US" sz="2273" dirty="0">
+                      <a:latin typeface="Times New Roman" panose="02020603050405020304" pitchFamily="18" charset="0"/>
+                      <a:cs typeface="Times New Roman" panose="02020603050405020304" pitchFamily="18" charset="0"/>
+                    </a:rPr>
+                    <a:t>= </a:t>
+                  </a:r>
+                  <a:r>
+                    <a:rPr lang="en-US" sz="2274" dirty="0">
+                      <a:latin typeface="Times New Roman" panose="02020603050405020304" pitchFamily="18" charset="0"/>
+                      <a:cs typeface="Times New Roman" panose="02020603050405020304" pitchFamily="18" charset="0"/>
+                    </a:rPr>
+                    <a:t>20</a:t>
+                  </a:r>
+                </a:p>
+                <a:p>
+                  <a:r>
+                    <a:rPr lang="en-US" sz="2273" dirty="0">
+                      <a:latin typeface="Times New Roman" panose="02020603050405020304" pitchFamily="18" charset="0"/>
+                      <a:ea typeface="Calibri" panose="020F0502020204030204" pitchFamily="34" charset="0"/>
+                      <a:cs typeface="Times New Roman" panose="02020603050405020304" pitchFamily="18" charset="0"/>
+                    </a:rPr>
+                    <a:t>k</a:t>
+                  </a:r>
+                  <a:r>
+                    <a:rPr lang="en-US" sz="2273" baseline="-25000" dirty="0">
+                      <a:latin typeface="Times New Roman" panose="02020603050405020304" pitchFamily="18" charset="0"/>
+                      <a:ea typeface="Calibri" panose="020F0502020204030204" pitchFamily="34" charset="0"/>
+                      <a:cs typeface="Times New Roman" panose="02020603050405020304" pitchFamily="18" charset="0"/>
+                    </a:rPr>
+                    <a:t>i</a:t>
+                  </a:r>
+                  <a:r>
+                    <a:rPr lang="en-US" sz="2273" baseline="30000" dirty="0">
+                      <a:latin typeface="Times New Roman" panose="02020603050405020304" pitchFamily="18" charset="0"/>
+                      <a:ea typeface="Calibri" panose="020F0502020204030204" pitchFamily="34" charset="0"/>
+                      <a:cs typeface="Times New Roman" panose="02020603050405020304" pitchFamily="18" charset="0"/>
+                    </a:rPr>
+                    <a:t>- </a:t>
+                  </a:r>
+                  <a:r>
+                    <a:rPr lang="en-US" sz="2274" dirty="0">
+                      <a:latin typeface="Times New Roman" panose="02020603050405020304" pitchFamily="18" charset="0"/>
+                      <a:cs typeface="Times New Roman" panose="02020603050405020304" pitchFamily="18" charset="0"/>
+                    </a:rPr>
+                    <a:t>= 11</a:t>
+                  </a:r>
+                </a:p>
+                <a:p>
+                  <a:r>
+                    <a:rPr lang="el-GR" sz="2273" dirty="0">
+                      <a:latin typeface="Times New Roman" panose="02020603050405020304" pitchFamily="18" charset="0"/>
+                      <a:ea typeface="Calibri" panose="020F0502020204030204" pitchFamily="34" charset="0"/>
+                      <a:cs typeface="Times New Roman" panose="02020603050405020304" pitchFamily="18" charset="0"/>
+                    </a:rPr>
+                    <a:t>ρ</a:t>
+                  </a:r>
+                  <a:r>
+                    <a:rPr lang="en-US" sz="2273" baseline="-25000" dirty="0">
+                      <a:latin typeface="Times New Roman" panose="02020603050405020304" pitchFamily="18" charset="0"/>
+                      <a:ea typeface="Calibri" panose="020F0502020204030204" pitchFamily="34" charset="0"/>
+                      <a:cs typeface="Times New Roman" panose="02020603050405020304" pitchFamily="18" charset="0"/>
+                    </a:rPr>
+                    <a:t>i </a:t>
+                  </a:r>
+                  <a:r>
+                    <a:rPr lang="el-GR" sz="2400" dirty="0">
+                      <a:solidFill>
+                        <a:srgbClr val="202124"/>
+                      </a:solidFill>
+                      <a:latin typeface="Times New Roman" panose="02020603050405020304" pitchFamily="18" charset="0"/>
+                      <a:cs typeface="Times New Roman" panose="02020603050405020304" pitchFamily="18" charset="0"/>
+                    </a:rPr>
+                    <a:t> </a:t>
+                  </a:r>
+                  <a:r>
+                    <a:rPr lang="en-US" sz="2274" dirty="0">
+                      <a:latin typeface="Times New Roman" panose="02020603050405020304" pitchFamily="18" charset="0"/>
+                      <a:cs typeface="Times New Roman" panose="02020603050405020304" pitchFamily="18" charset="0"/>
+                    </a:rPr>
+                    <a:t>= 0.64</a:t>
+                  </a:r>
+                </a:p>
+              </p:txBody>
+            </p:sp>
+            <p:sp>
+              <p:nvSpPr>
+                <p:cNvPr id="79" name="TextBox 78">
+                  <a:extLst>
+                    <a:ext uri="{FF2B5EF4-FFF2-40B4-BE49-F238E27FC236}">
+                      <a16:creationId xmlns:a16="http://schemas.microsoft.com/office/drawing/2014/main" id="{C4FFA2F2-3E47-42F9-9E6C-D74B4B87BF4D}"/>
+                    </a:ext>
+                  </a:extLst>
+                </p:cNvPr>
+                <p:cNvSpPr txBox="1"/>
+                <p:nvPr/>
+              </p:nvSpPr>
+              <p:spPr>
+                <a:xfrm>
+                  <a:off x="14122351" y="4782519"/>
+                  <a:ext cx="1868613" cy="1207282"/>
+                </a:xfrm>
+                <a:prstGeom prst="rect">
+                  <a:avLst/>
+                </a:prstGeom>
+                <a:noFill/>
+              </p:spPr>
+              <p:txBody>
+                <a:bodyPr wrap="square" rtlCol="0">
+                  <a:spAutoFit/>
+                </a:bodyPr>
+                <a:lstStyle/>
+                <a:p>
+                  <a:r>
+                    <a:rPr lang="en-US" sz="2273" dirty="0">
+                      <a:latin typeface="Times New Roman" panose="02020603050405020304" pitchFamily="18" charset="0"/>
+                      <a:ea typeface="Calibri" panose="020F0502020204030204" pitchFamily="34" charset="0"/>
+                      <a:cs typeface="Times New Roman" panose="02020603050405020304" pitchFamily="18" charset="0"/>
+                    </a:rPr>
+                    <a:t>k</a:t>
+                  </a:r>
+                  <a:r>
+                    <a:rPr lang="en-US" sz="2273" baseline="-25000" dirty="0">
+                      <a:latin typeface="Times New Roman" panose="02020603050405020304" pitchFamily="18" charset="0"/>
+                      <a:ea typeface="Calibri" panose="020F0502020204030204" pitchFamily="34" charset="0"/>
+                      <a:cs typeface="Times New Roman" panose="02020603050405020304" pitchFamily="18" charset="0"/>
+                    </a:rPr>
+                    <a:t>i</a:t>
+                  </a:r>
+                  <a:r>
+                    <a:rPr lang="en-US" sz="2273" baseline="30000" dirty="0">
+                      <a:latin typeface="Times New Roman" panose="02020603050405020304" pitchFamily="18" charset="0"/>
+                      <a:ea typeface="Calibri" panose="020F0502020204030204" pitchFamily="34" charset="0"/>
+                      <a:cs typeface="Times New Roman" panose="02020603050405020304" pitchFamily="18" charset="0"/>
+                    </a:rPr>
+                    <a:t>+ </a:t>
+                  </a:r>
+                  <a:r>
+                    <a:rPr lang="en-US" sz="2273" dirty="0">
+                      <a:latin typeface="Times New Roman" panose="02020603050405020304" pitchFamily="18" charset="0"/>
+                      <a:cs typeface="Times New Roman" panose="02020603050405020304" pitchFamily="18" charset="0"/>
+                    </a:rPr>
+                    <a:t>= 3</a:t>
+                  </a:r>
+                  <a:endParaRPr lang="en-US" sz="2274" dirty="0">
+                    <a:latin typeface="Times New Roman" panose="02020603050405020304" pitchFamily="18" charset="0"/>
+                    <a:cs typeface="Times New Roman" panose="02020603050405020304" pitchFamily="18" charset="0"/>
+                  </a:endParaRPr>
+                </a:p>
+                <a:p>
+                  <a:r>
+                    <a:rPr lang="en-US" sz="2273" dirty="0">
+                      <a:latin typeface="Times New Roman" panose="02020603050405020304" pitchFamily="18" charset="0"/>
+                      <a:ea typeface="Calibri" panose="020F0502020204030204" pitchFamily="34" charset="0"/>
+                      <a:cs typeface="Times New Roman" panose="02020603050405020304" pitchFamily="18" charset="0"/>
+                    </a:rPr>
+                    <a:t>k</a:t>
+                  </a:r>
+                  <a:r>
+                    <a:rPr lang="en-US" sz="2273" baseline="-25000" dirty="0">
+                      <a:latin typeface="Times New Roman" panose="02020603050405020304" pitchFamily="18" charset="0"/>
+                      <a:ea typeface="Calibri" panose="020F0502020204030204" pitchFamily="34" charset="0"/>
+                      <a:cs typeface="Times New Roman" panose="02020603050405020304" pitchFamily="18" charset="0"/>
+                    </a:rPr>
+                    <a:t>i</a:t>
+                  </a:r>
+                  <a:r>
+                    <a:rPr lang="en-US" sz="2273" baseline="30000" dirty="0">
+                      <a:latin typeface="Times New Roman" panose="02020603050405020304" pitchFamily="18" charset="0"/>
+                      <a:ea typeface="Calibri" panose="020F0502020204030204" pitchFamily="34" charset="0"/>
+                      <a:cs typeface="Times New Roman" panose="02020603050405020304" pitchFamily="18" charset="0"/>
+                    </a:rPr>
+                    <a:t>- </a:t>
+                  </a:r>
+                  <a:r>
+                    <a:rPr lang="en-US" sz="2274" dirty="0">
+                      <a:latin typeface="Times New Roman" panose="02020603050405020304" pitchFamily="18" charset="0"/>
+                      <a:cs typeface="Times New Roman" panose="02020603050405020304" pitchFamily="18" charset="0"/>
+                    </a:rPr>
+                    <a:t>= 1</a:t>
+                  </a:r>
+                </a:p>
+                <a:p>
+                  <a:r>
+                    <a:rPr lang="el-GR" sz="2273" dirty="0">
+                      <a:latin typeface="Times New Roman" panose="02020603050405020304" pitchFamily="18" charset="0"/>
+                      <a:ea typeface="Calibri" panose="020F0502020204030204" pitchFamily="34" charset="0"/>
+                      <a:cs typeface="Times New Roman" panose="02020603050405020304" pitchFamily="18" charset="0"/>
+                    </a:rPr>
+                    <a:t>ρ</a:t>
+                  </a:r>
+                  <a:r>
+                    <a:rPr lang="en-US" sz="2273" baseline="-25000" dirty="0">
+                      <a:latin typeface="Times New Roman" panose="02020603050405020304" pitchFamily="18" charset="0"/>
+                      <a:ea typeface="Calibri" panose="020F0502020204030204" pitchFamily="34" charset="0"/>
+                      <a:cs typeface="Times New Roman" panose="02020603050405020304" pitchFamily="18" charset="0"/>
+                    </a:rPr>
+                    <a:t>i </a:t>
+                  </a:r>
+                  <a:r>
+                    <a:rPr lang="el-GR" sz="2400" dirty="0">
+                      <a:solidFill>
+                        <a:srgbClr val="202124"/>
+                      </a:solidFill>
+                      <a:latin typeface="Times New Roman" panose="02020603050405020304" pitchFamily="18" charset="0"/>
+                      <a:cs typeface="Times New Roman" panose="02020603050405020304" pitchFamily="18" charset="0"/>
+                    </a:rPr>
+                    <a:t> </a:t>
+                  </a:r>
+                  <a:r>
+                    <a:rPr lang="en-US" sz="2274" dirty="0">
+                      <a:latin typeface="Times New Roman" panose="02020603050405020304" pitchFamily="18" charset="0"/>
+                      <a:cs typeface="Times New Roman" panose="02020603050405020304" pitchFamily="18" charset="0"/>
+                    </a:rPr>
+                    <a:t>= 0.75</a:t>
+                  </a:r>
+                </a:p>
+              </p:txBody>
+            </p:sp>
+            <p:pic>
+              <p:nvPicPr>
+                <p:cNvPr id="80" name="Picture 79">
+                  <a:extLst>
+                    <a:ext uri="{FF2B5EF4-FFF2-40B4-BE49-F238E27FC236}">
+                      <a16:creationId xmlns:a16="http://schemas.microsoft.com/office/drawing/2014/main" id="{2C5847FE-6505-4936-A00B-DE2D929B2CE6}"/>
+                    </a:ext>
+                  </a:extLst>
+                </p:cNvPr>
+                <p:cNvPicPr>
+                  <a:picLocks noChangeAspect="1"/>
+                </p:cNvPicPr>
+                <p:nvPr/>
+              </p:nvPicPr>
+              <p:blipFill>
+                <a:blip r:embed="rId9"/>
+                <a:stretch>
+                  <a:fillRect/>
+                </a:stretch>
+              </p:blipFill>
+              <p:spPr>
+                <a:xfrm rot="5400000">
+                  <a:off x="16419745" y="2678594"/>
+                  <a:ext cx="3078449" cy="1039095"/>
+                </a:xfrm>
+                <a:prstGeom prst="rect">
+                  <a:avLst/>
+                </a:prstGeom>
+              </p:spPr>
+            </p:pic>
+            <p:pic>
+              <p:nvPicPr>
+                <p:cNvPr id="81" name="Picture 80">
+                  <a:extLst>
+                    <a:ext uri="{FF2B5EF4-FFF2-40B4-BE49-F238E27FC236}">
+                      <a16:creationId xmlns:a16="http://schemas.microsoft.com/office/drawing/2014/main" id="{4604C89B-5BAB-43CE-8104-F381D25760D1}"/>
+                    </a:ext>
+                  </a:extLst>
+                </p:cNvPr>
+                <p:cNvPicPr>
+                  <a:picLocks noChangeAspect="1"/>
+                </p:cNvPicPr>
+                <p:nvPr/>
+              </p:nvPicPr>
+              <p:blipFill>
+                <a:blip r:embed="rId10"/>
+                <a:stretch>
+                  <a:fillRect/>
+                </a:stretch>
+              </p:blipFill>
+              <p:spPr>
+                <a:xfrm>
+                  <a:off x="12999652" y="1894919"/>
+                  <a:ext cx="2933700" cy="2343150"/>
+                </a:xfrm>
+                <a:prstGeom prst="rect">
+                  <a:avLst/>
+                </a:prstGeom>
+              </p:spPr>
+            </p:pic>
+            <p:pic>
+              <p:nvPicPr>
+                <p:cNvPr id="86" name="Picture 85">
+                  <a:extLst>
+                    <a:ext uri="{FF2B5EF4-FFF2-40B4-BE49-F238E27FC236}">
+                      <a16:creationId xmlns:a16="http://schemas.microsoft.com/office/drawing/2014/main" id="{68F5D72A-A893-442E-A8DF-5C392025C5CC}"/>
+                    </a:ext>
+                  </a:extLst>
+                </p:cNvPr>
+                <p:cNvPicPr>
+                  <a:picLocks noChangeAspect="1"/>
+                </p:cNvPicPr>
+                <p:nvPr/>
+              </p:nvPicPr>
+              <p:blipFill>
+                <a:blip r:embed="rId11"/>
+                <a:stretch>
+                  <a:fillRect/>
+                </a:stretch>
+              </p:blipFill>
+              <p:spPr>
+                <a:xfrm>
+                  <a:off x="9905972" y="1666319"/>
+                  <a:ext cx="2324100" cy="2800350"/>
+                </a:xfrm>
+                <a:prstGeom prst="rect">
+                  <a:avLst/>
+                </a:prstGeom>
+              </p:spPr>
+            </p:pic>
+            <p:sp>
+              <p:nvSpPr>
+                <p:cNvPr id="90" name="Rectangle: Rounded Corners 89">
+                  <a:extLst>
+                    <a:ext uri="{FF2B5EF4-FFF2-40B4-BE49-F238E27FC236}">
+                      <a16:creationId xmlns:a16="http://schemas.microsoft.com/office/drawing/2014/main" id="{E2715EF4-0692-47DB-914F-1053E7C90B68}"/>
+                    </a:ext>
+                  </a:extLst>
+                </p:cNvPr>
+                <p:cNvSpPr/>
+                <p:nvPr/>
+              </p:nvSpPr>
+              <p:spPr>
+                <a:xfrm>
+                  <a:off x="9500091" y="999625"/>
+                  <a:ext cx="3237594" cy="5210675"/>
+                </a:xfrm>
+                <a:prstGeom prst="roundRect">
+                  <a:avLst/>
+                </a:prstGeom>
+                <a:noFill/>
+                <a:ln w="38100">
+                  <a:solidFill>
+                    <a:srgbClr val="92D6B7"/>
+                  </a:solidFill>
+                </a:ln>
+              </p:spPr>
+              <p:style>
+                <a:lnRef idx="2">
+                  <a:schemeClr val="accent1">
+                    <a:shade val="50000"/>
+                  </a:schemeClr>
+                </a:lnRef>
+                <a:fillRef idx="1">
+                  <a:schemeClr val="accent1"/>
+                </a:fillRef>
+                <a:effectRef idx="0">
+                  <a:schemeClr val="accent1"/>
+                </a:effectRef>
+                <a:fontRef idx="minor">
+                  <a:schemeClr val="lt1"/>
+                </a:fontRef>
+              </p:style>
+              <p:txBody>
+                <a:bodyPr rtlCol="0" anchor="ctr"/>
+                <a:lstStyle/>
+                <a:p>
+                  <a:pPr algn="ctr"/>
+                  <a:endParaRPr lang="en-US" sz="1350"/>
+                </a:p>
+              </p:txBody>
+            </p:sp>
+            <p:sp>
+              <p:nvSpPr>
+                <p:cNvPr id="91" name="Rectangle: Rounded Corners 90">
+                  <a:extLst>
+                    <a:ext uri="{FF2B5EF4-FFF2-40B4-BE49-F238E27FC236}">
+                      <a16:creationId xmlns:a16="http://schemas.microsoft.com/office/drawing/2014/main" id="{0700E220-3595-484B-9E16-A2EF0925DFA5}"/>
+                    </a:ext>
+                  </a:extLst>
+                </p:cNvPr>
+                <p:cNvSpPr/>
+                <p:nvPr/>
+              </p:nvSpPr>
+              <p:spPr>
+                <a:xfrm>
+                  <a:off x="12963592" y="994522"/>
+                  <a:ext cx="3237594" cy="5215778"/>
+                </a:xfrm>
+                <a:prstGeom prst="roundRect">
+                  <a:avLst/>
+                </a:prstGeom>
+                <a:noFill/>
+                <a:ln w="38100">
+                  <a:solidFill>
+                    <a:srgbClr val="92D6B7"/>
+                  </a:solidFill>
+                </a:ln>
+              </p:spPr>
+              <p:style>
+                <a:lnRef idx="2">
+                  <a:schemeClr val="accent1">
+                    <a:shade val="50000"/>
+                  </a:schemeClr>
+                </a:lnRef>
+                <a:fillRef idx="1">
+                  <a:schemeClr val="accent1"/>
+                </a:fillRef>
+                <a:effectRef idx="0">
+                  <a:schemeClr val="accent1"/>
+                </a:effectRef>
+                <a:fontRef idx="minor">
+                  <a:schemeClr val="lt1"/>
+                </a:fontRef>
+              </p:style>
+              <p:txBody>
+                <a:bodyPr rtlCol="0" anchor="ctr"/>
+                <a:lstStyle/>
+                <a:p>
+                  <a:pPr algn="ctr"/>
+                  <a:endParaRPr lang="en-US" sz="1350"/>
+                </a:p>
+              </p:txBody>
+            </p:sp>
+            <p:sp>
+              <p:nvSpPr>
+                <p:cNvPr id="92" name="Rectangle: Rounded Corners 91">
+                  <a:extLst>
+                    <a:ext uri="{FF2B5EF4-FFF2-40B4-BE49-F238E27FC236}">
+                      <a16:creationId xmlns:a16="http://schemas.microsoft.com/office/drawing/2014/main" id="{176E6B87-BFB6-4EA0-9DDA-380BB3FD0828}"/>
+                    </a:ext>
+                  </a:extLst>
+                </p:cNvPr>
+                <p:cNvSpPr/>
+                <p:nvPr/>
+              </p:nvSpPr>
+              <p:spPr>
+                <a:xfrm>
+                  <a:off x="16340173" y="950941"/>
+                  <a:ext cx="3237594" cy="5259359"/>
+                </a:xfrm>
+                <a:prstGeom prst="roundRect">
+                  <a:avLst/>
+                </a:prstGeom>
+                <a:noFill/>
+                <a:ln w="38100">
+                  <a:solidFill>
+                    <a:srgbClr val="92D6B7"/>
+                  </a:solidFill>
+                </a:ln>
+              </p:spPr>
+              <p:style>
+                <a:lnRef idx="2">
+                  <a:schemeClr val="accent1">
+                    <a:shade val="50000"/>
+                  </a:schemeClr>
+                </a:lnRef>
+                <a:fillRef idx="1">
+                  <a:schemeClr val="accent1"/>
+                </a:fillRef>
+                <a:effectRef idx="0">
+                  <a:schemeClr val="accent1"/>
+                </a:effectRef>
+                <a:fontRef idx="minor">
+                  <a:schemeClr val="lt1"/>
+                </a:fontRef>
+              </p:style>
+              <p:txBody>
+                <a:bodyPr rtlCol="0" anchor="ctr"/>
+                <a:lstStyle/>
+                <a:p>
+                  <a:pPr algn="ctr"/>
+                  <a:endParaRPr lang="en-US" sz="1350"/>
+                </a:p>
+              </p:txBody>
+            </p:sp>
+            <p:sp>
+              <p:nvSpPr>
+                <p:cNvPr id="93" name="TextBox 92">
+                  <a:extLst>
+                    <a:ext uri="{FF2B5EF4-FFF2-40B4-BE49-F238E27FC236}">
+                      <a16:creationId xmlns:a16="http://schemas.microsoft.com/office/drawing/2014/main" id="{9E57FEA0-B111-4B71-87E4-4D2F69C8F3E2}"/>
+                    </a:ext>
+                  </a:extLst>
+                </p:cNvPr>
+                <p:cNvSpPr txBox="1"/>
+                <p:nvPr/>
+              </p:nvSpPr>
+              <p:spPr>
+                <a:xfrm>
+                  <a:off x="17519706" y="4773535"/>
+                  <a:ext cx="1868613" cy="1207282"/>
+                </a:xfrm>
+                <a:prstGeom prst="rect">
+                  <a:avLst/>
+                </a:prstGeom>
+                <a:noFill/>
+              </p:spPr>
+              <p:txBody>
+                <a:bodyPr wrap="square" rtlCol="0">
+                  <a:spAutoFit/>
+                </a:bodyPr>
+                <a:lstStyle/>
+                <a:p>
+                  <a:r>
+                    <a:rPr lang="en-US" sz="2273" dirty="0">
+                      <a:latin typeface="Times New Roman" panose="02020603050405020304" pitchFamily="18" charset="0"/>
+                      <a:ea typeface="Calibri" panose="020F0502020204030204" pitchFamily="34" charset="0"/>
+                      <a:cs typeface="Times New Roman" panose="02020603050405020304" pitchFamily="18" charset="0"/>
+                    </a:rPr>
+                    <a:t>k</a:t>
+                  </a:r>
+                  <a:r>
+                    <a:rPr lang="en-US" sz="2273" baseline="-25000" dirty="0">
+                      <a:latin typeface="Times New Roman" panose="02020603050405020304" pitchFamily="18" charset="0"/>
+                      <a:ea typeface="Calibri" panose="020F0502020204030204" pitchFamily="34" charset="0"/>
+                      <a:cs typeface="Times New Roman" panose="02020603050405020304" pitchFamily="18" charset="0"/>
+                    </a:rPr>
+                    <a:t>i</a:t>
+                  </a:r>
+                  <a:r>
+                    <a:rPr lang="en-US" sz="2273" baseline="30000" dirty="0">
+                      <a:latin typeface="Times New Roman" panose="02020603050405020304" pitchFamily="18" charset="0"/>
+                      <a:ea typeface="Calibri" panose="020F0502020204030204" pitchFamily="34" charset="0"/>
+                      <a:cs typeface="Times New Roman" panose="02020603050405020304" pitchFamily="18" charset="0"/>
+                    </a:rPr>
+                    <a:t>+ </a:t>
+                  </a:r>
+                  <a:r>
+                    <a:rPr lang="en-US" sz="2273" dirty="0">
+                      <a:latin typeface="Times New Roman" panose="02020603050405020304" pitchFamily="18" charset="0"/>
+                      <a:cs typeface="Times New Roman" panose="02020603050405020304" pitchFamily="18" charset="0"/>
+                    </a:rPr>
+                    <a:t>= </a:t>
+                  </a:r>
+                  <a:r>
+                    <a:rPr lang="en-US" sz="2274" dirty="0">
+                      <a:latin typeface="Times New Roman" panose="02020603050405020304" pitchFamily="18" charset="0"/>
+                      <a:cs typeface="Times New Roman" panose="02020603050405020304" pitchFamily="18" charset="0"/>
+                    </a:rPr>
+                    <a:t>1</a:t>
+                  </a:r>
+                </a:p>
+                <a:p>
+                  <a:r>
+                    <a:rPr lang="en-US" sz="2273" dirty="0">
+                      <a:latin typeface="Times New Roman" panose="02020603050405020304" pitchFamily="18" charset="0"/>
+                      <a:ea typeface="Calibri" panose="020F0502020204030204" pitchFamily="34" charset="0"/>
+                      <a:cs typeface="Times New Roman" panose="02020603050405020304" pitchFamily="18" charset="0"/>
+                    </a:rPr>
+                    <a:t>k</a:t>
+                  </a:r>
+                  <a:r>
+                    <a:rPr lang="en-US" sz="2273" baseline="-25000" dirty="0">
+                      <a:latin typeface="Times New Roman" panose="02020603050405020304" pitchFamily="18" charset="0"/>
+                      <a:ea typeface="Calibri" panose="020F0502020204030204" pitchFamily="34" charset="0"/>
+                      <a:cs typeface="Times New Roman" panose="02020603050405020304" pitchFamily="18" charset="0"/>
+                    </a:rPr>
+                    <a:t>i</a:t>
+                  </a:r>
+                  <a:r>
+                    <a:rPr lang="en-US" sz="2273" baseline="30000" dirty="0">
+                      <a:latin typeface="Times New Roman" panose="02020603050405020304" pitchFamily="18" charset="0"/>
+                      <a:ea typeface="Calibri" panose="020F0502020204030204" pitchFamily="34" charset="0"/>
+                      <a:cs typeface="Times New Roman" panose="02020603050405020304" pitchFamily="18" charset="0"/>
+                    </a:rPr>
+                    <a:t>- </a:t>
+                  </a:r>
+                  <a:r>
+                    <a:rPr lang="en-US" sz="2274" dirty="0">
+                      <a:latin typeface="Times New Roman" panose="02020603050405020304" pitchFamily="18" charset="0"/>
+                      <a:cs typeface="Times New Roman" panose="02020603050405020304" pitchFamily="18" charset="0"/>
+                    </a:rPr>
+                    <a:t>= 0</a:t>
+                  </a:r>
+                </a:p>
+                <a:p>
+                  <a:r>
+                    <a:rPr lang="el-GR" sz="2273" dirty="0">
+                      <a:latin typeface="Times New Roman" panose="02020603050405020304" pitchFamily="18" charset="0"/>
+                      <a:ea typeface="Calibri" panose="020F0502020204030204" pitchFamily="34" charset="0"/>
+                      <a:cs typeface="Times New Roman" panose="02020603050405020304" pitchFamily="18" charset="0"/>
+                    </a:rPr>
+                    <a:t>ρ</a:t>
+                  </a:r>
+                  <a:r>
+                    <a:rPr lang="en-US" sz="2273" baseline="-25000" dirty="0">
+                      <a:latin typeface="Times New Roman" panose="02020603050405020304" pitchFamily="18" charset="0"/>
+                      <a:ea typeface="Calibri" panose="020F0502020204030204" pitchFamily="34" charset="0"/>
+                      <a:cs typeface="Times New Roman" panose="02020603050405020304" pitchFamily="18" charset="0"/>
+                    </a:rPr>
+                    <a:t>i </a:t>
+                  </a:r>
+                  <a:r>
+                    <a:rPr lang="el-GR" sz="2400" dirty="0">
+                      <a:solidFill>
+                        <a:srgbClr val="202124"/>
+                      </a:solidFill>
+                      <a:latin typeface="Times New Roman" panose="02020603050405020304" pitchFamily="18" charset="0"/>
+                      <a:cs typeface="Times New Roman" panose="02020603050405020304" pitchFamily="18" charset="0"/>
+                    </a:rPr>
+                    <a:t> </a:t>
+                  </a:r>
+                  <a:r>
+                    <a:rPr lang="en-US" sz="2274" dirty="0">
+                      <a:latin typeface="Times New Roman" panose="02020603050405020304" pitchFamily="18" charset="0"/>
+                      <a:cs typeface="Times New Roman" panose="02020603050405020304" pitchFamily="18" charset="0"/>
+                    </a:rPr>
+                    <a:t>= 1.0</a:t>
+                  </a:r>
+                </a:p>
+              </p:txBody>
+            </p:sp>
+          </p:grpSp>
+        </p:grpSp>
+        <p:sp>
+          <p:nvSpPr>
+            <p:cNvPr id="69" name="TextBox 68">
+              <a:extLst>
+                <a:ext uri="{FF2B5EF4-FFF2-40B4-BE49-F238E27FC236}">
+                  <a16:creationId xmlns:a16="http://schemas.microsoft.com/office/drawing/2014/main" id="{16B228B2-2614-4DD7-89E3-A519919B6744}"/>
+                </a:ext>
+              </a:extLst>
+            </p:cNvPr>
+            <p:cNvSpPr txBox="1"/>
+            <p:nvPr/>
+          </p:nvSpPr>
+          <p:spPr>
+            <a:xfrm>
+              <a:off x="9943064" y="10279330"/>
+              <a:ext cx="2824431" cy="459828"/>
+            </a:xfrm>
+            <a:prstGeom prst="rect">
+              <a:avLst/>
+            </a:prstGeom>
+            <a:solidFill>
+              <a:schemeClr val="bg1"/>
+            </a:solidFill>
+          </p:spPr>
+          <p:txBody>
+            <a:bodyPr wrap="none" rtlCol="0">
+              <a:spAutoFit/>
+            </a:bodyPr>
+            <a:lstStyle/>
+            <a:p>
+              <a:r>
+                <a:rPr lang="en-US" sz="2275" dirty="0">
+                  <a:latin typeface="Times New Roman" panose="02020603050405020304" pitchFamily="18" charset="0"/>
+                  <a:cs typeface="Times New Roman" panose="02020603050405020304" pitchFamily="18" charset="0"/>
+                </a:rPr>
+                <a:t>Ligand Degree Ratio</a:t>
+              </a:r>
+            </a:p>
+          </p:txBody>
+        </p:sp>
+        <p:grpSp>
+          <p:nvGrpSpPr>
+            <p:cNvPr id="70" name="Group 69">
+              <a:extLst>
+                <a:ext uri="{FF2B5EF4-FFF2-40B4-BE49-F238E27FC236}">
+                  <a16:creationId xmlns:a16="http://schemas.microsoft.com/office/drawing/2014/main" id="{5410308B-A2C9-424C-BB73-C300B13763EE}"/>
+                </a:ext>
+              </a:extLst>
+            </p:cNvPr>
+            <p:cNvGrpSpPr/>
+            <p:nvPr/>
+          </p:nvGrpSpPr>
+          <p:grpSpPr>
+            <a:xfrm>
+              <a:off x="3651392" y="1359539"/>
+              <a:ext cx="6529249" cy="4461590"/>
+              <a:chOff x="2086454" y="1074336"/>
+              <a:chExt cx="6529249" cy="4461590"/>
+            </a:xfrm>
+          </p:grpSpPr>
+          <p:pic>
+            <p:nvPicPr>
+              <p:cNvPr id="71" name="Picture 6">
+                <a:extLst>
+                  <a:ext uri="{FF2B5EF4-FFF2-40B4-BE49-F238E27FC236}">
+                    <a16:creationId xmlns:a16="http://schemas.microsoft.com/office/drawing/2014/main" id="{62DACA0E-DF95-4FC5-A165-3DFFAD8FB868}"/>
+                  </a:ext>
+                </a:extLst>
+              </p:cNvPr>
+              <p:cNvPicPr>
+                <a:picLocks noChangeAspect="1" noChangeArrowheads="1"/>
+              </p:cNvPicPr>
+              <p:nvPr/>
+            </p:nvPicPr>
+            <p:blipFill>
+              <a:blip r:embed="rId12">
+                <a:extLst>
+                  <a:ext uri="{28A0092B-C50C-407E-A947-70E740481C1C}">
+                    <a14:useLocalDpi xmlns:a14="http://schemas.microsoft.com/office/drawing/2010/main" val="0"/>
+                  </a:ext>
+                </a:extLst>
+              </a:blip>
+              <a:srcRect/>
+              <a:stretch>
+                <a:fillRect/>
+              </a:stretch>
+            </p:blipFill>
+            <p:spPr bwMode="auto">
+              <a:xfrm>
+                <a:off x="2086454" y="1074336"/>
+                <a:ext cx="6529249" cy="4430562"/>
+              </a:xfrm>
+              <a:prstGeom prst="rect">
+                <a:avLst/>
+              </a:prstGeom>
+              <a:noFill/>
+              <a:extLst>
+                <a:ext uri="{909E8E84-426E-40DD-AFC4-6F175D3DCCD1}">
+                  <a14:hiddenFill xmlns:a14="http://schemas.microsoft.com/office/drawing/2010/main">
+                    <a:solidFill>
+                      <a:srgbClr val="FFFFFF"/>
+                    </a:solidFill>
+                  </a14:hiddenFill>
+                </a:ext>
+              </a:extLst>
+            </p:spPr>
+          </p:pic>
+          <p:sp>
+            <p:nvSpPr>
+              <p:cNvPr id="72" name="TextBox 71">
+                <a:extLst>
+                  <a:ext uri="{FF2B5EF4-FFF2-40B4-BE49-F238E27FC236}">
+                    <a16:creationId xmlns:a16="http://schemas.microsoft.com/office/drawing/2014/main" id="{F2A7D6BA-D647-48D0-A85B-A6BF32105D15}"/>
+                  </a:ext>
+                </a:extLst>
+              </p:cNvPr>
+              <p:cNvSpPr txBox="1"/>
+              <p:nvPr/>
+            </p:nvSpPr>
+            <p:spPr>
+              <a:xfrm>
+                <a:off x="4666062" y="4960141"/>
+                <a:ext cx="2036338" cy="575785"/>
+              </a:xfrm>
+              <a:prstGeom prst="rect">
+                <a:avLst/>
+              </a:prstGeom>
+              <a:solidFill>
+                <a:schemeClr val="bg1"/>
+              </a:solidFill>
+            </p:spPr>
+            <p:txBody>
+              <a:bodyPr wrap="square" rtlCol="0">
+                <a:spAutoFit/>
+              </a:bodyPr>
+              <a:lstStyle/>
+              <a:p>
+                <a:r>
+                  <a:rPr lang="en-US" sz="1500" dirty="0">
+                    <a:solidFill>
+                      <a:srgbClr val="202124"/>
+                    </a:solidFill>
+                    <a:latin typeface="Times New Roman" panose="02020603050405020304" pitchFamily="18" charset="0"/>
+                    <a:cs typeface="Times New Roman" panose="02020603050405020304" pitchFamily="18" charset="0"/>
+                  </a:rPr>
+                  <a:t>Ligand degree ratio (</a:t>
+                </a:r>
+                <a:r>
+                  <a:rPr lang="el-GR" sz="1500" dirty="0">
+                    <a:solidFill>
+                      <a:srgbClr val="202124"/>
+                    </a:solidFill>
+                    <a:latin typeface="Times New Roman" panose="02020603050405020304" pitchFamily="18" charset="0"/>
+                    <a:cs typeface="Times New Roman" panose="02020603050405020304" pitchFamily="18" charset="0"/>
+                  </a:rPr>
+                  <a:t>ρ</a:t>
+                </a:r>
+                <a:r>
+                  <a:rPr lang="en-US" sz="1500" dirty="0">
+                    <a:solidFill>
+                      <a:srgbClr val="202124"/>
+                    </a:solidFill>
+                    <a:latin typeface="Times New Roman" panose="02020603050405020304" pitchFamily="18" charset="0"/>
+                    <a:cs typeface="Times New Roman" panose="02020603050405020304" pitchFamily="18" charset="0"/>
+                  </a:rPr>
+                  <a:t>)</a:t>
+                </a:r>
+                <a:endParaRPr lang="en-US" sz="1500" dirty="0">
+                  <a:latin typeface="Times New Roman" panose="02020603050405020304" pitchFamily="18" charset="0"/>
+                  <a:cs typeface="Times New Roman" panose="02020603050405020304" pitchFamily="18" charset="0"/>
+                </a:endParaRPr>
+              </a:p>
+            </p:txBody>
+          </p:sp>
+          <p:sp>
+            <p:nvSpPr>
+              <p:cNvPr id="73" name="TextBox 72">
+                <a:extLst>
+                  <a:ext uri="{FF2B5EF4-FFF2-40B4-BE49-F238E27FC236}">
+                    <a16:creationId xmlns:a16="http://schemas.microsoft.com/office/drawing/2014/main" id="{1ED405A2-99CC-401F-BE96-4D8CD23F047F}"/>
+                  </a:ext>
+                </a:extLst>
+              </p:cNvPr>
+              <p:cNvSpPr txBox="1"/>
+              <p:nvPr/>
+            </p:nvSpPr>
+            <p:spPr>
+              <a:xfrm rot="16200000">
+                <a:off x="1162863" y="2786866"/>
+                <a:ext cx="2193496" cy="346311"/>
+              </a:xfrm>
+              <a:prstGeom prst="rect">
+                <a:avLst/>
+              </a:prstGeom>
+              <a:solidFill>
+                <a:schemeClr val="bg1"/>
+              </a:solidFill>
+            </p:spPr>
+            <p:txBody>
+              <a:bodyPr wrap="square" rtlCol="0">
+                <a:spAutoFit/>
+              </a:bodyPr>
+              <a:lstStyle/>
+              <a:p>
+                <a:r>
+                  <a:rPr lang="en-US" sz="1500" dirty="0">
+                    <a:solidFill>
+                      <a:srgbClr val="202124"/>
+                    </a:solidFill>
+                    <a:latin typeface="Times New Roman" panose="02020603050405020304" pitchFamily="18" charset="0"/>
+                    <a:cs typeface="Times New Roman" panose="02020603050405020304" pitchFamily="18" charset="0"/>
+                  </a:rPr>
+                  <a:t>DeepPurpose Prediction</a:t>
+                </a:r>
+                <a:endParaRPr lang="en-US" sz="1500" dirty="0">
+                  <a:latin typeface="Times New Roman" panose="02020603050405020304" pitchFamily="18" charset="0"/>
+                  <a:cs typeface="Times New Roman" panose="02020603050405020304" pitchFamily="18" charset="0"/>
+                </a:endParaRPr>
+              </a:p>
+            </p:txBody>
+          </p:sp>
+        </p:grpSp>
+      </p:grpSp>
     </p:spTree>
     <p:extLst>
       <p:ext uri="{BB962C8B-B14F-4D97-AF65-F5344CB8AC3E}">

</xml_diff>

<commit_message>
Adding new figure to SI
</commit_message>
<xml_diff>
--- a/Images/fig1a.pptx
+++ b/Images/fig1a.pptx
@@ -3558,66 +3558,12 @@
           </a:p>
         </p:txBody>
       </p:sp>
-      <p:sp>
-        <p:nvSpPr>
-          <p:cNvPr id="126" name="Rectangle 125">
+      <p:pic>
+        <p:nvPicPr>
+          <p:cNvPr id="1026" name="Picture 2">
             <a:extLst>
               <a:ext uri="{FF2B5EF4-FFF2-40B4-BE49-F238E27FC236}">
-                <a16:creationId xmlns:a16="http://schemas.microsoft.com/office/drawing/2014/main" id="{C9B9931C-2BAD-4A90-B9A3-E527ABBA8E2F}"/>
-              </a:ext>
-            </a:extLst>
-          </p:cNvPr>
-          <p:cNvSpPr/>
-          <p:nvPr/>
-        </p:nvSpPr>
-        <p:spPr>
-          <a:xfrm>
-            <a:off x="18439097" y="11347420"/>
-            <a:ext cx="2132391" cy="902447"/>
-          </a:xfrm>
-          <a:prstGeom prst="rect">
-            <a:avLst/>
-          </a:prstGeom>
-          <a:solidFill>
-            <a:schemeClr val="bg1"/>
-          </a:solidFill>
-          <a:ln>
-            <a:solidFill>
-              <a:schemeClr val="bg1"/>
-            </a:solidFill>
-          </a:ln>
-        </p:spPr>
-        <p:style>
-          <a:lnRef idx="2">
-            <a:schemeClr val="accent1">
-              <a:shade val="50000"/>
-            </a:schemeClr>
-          </a:lnRef>
-          <a:fillRef idx="1">
-            <a:schemeClr val="accent1"/>
-          </a:fillRef>
-          <a:effectRef idx="0">
-            <a:schemeClr val="accent1"/>
-          </a:effectRef>
-          <a:fontRef idx="minor">
-            <a:schemeClr val="lt1"/>
-          </a:fontRef>
-        </p:style>
-        <p:txBody>
-          <a:bodyPr rtlCol="0" anchor="ctr"/>
-          <a:lstStyle/>
-          <a:p>
-            <a:pPr algn="ctr"/>
-            <a:endParaRPr lang="en-US" sz="1350"/>
-          </a:p>
-        </p:txBody>
-      </p:sp>
-      <p:pic>
-        <p:nvPicPr>
-          <p:cNvPr id="1030" name="Picture 6">
-            <a:extLst>
-              <a:ext uri="{FF2B5EF4-FFF2-40B4-BE49-F238E27FC236}">
-                <a16:creationId xmlns:a16="http://schemas.microsoft.com/office/drawing/2014/main" id="{C2E8ADE5-8023-452E-97E9-0E1BA58C420D}"/>
+                <a16:creationId xmlns:a16="http://schemas.microsoft.com/office/drawing/2014/main" id="{98B54965-0B61-4D59-89FC-DA748191CF65}"/>
               </a:ext>
             </a:extLst>
           </p:cNvPr>
@@ -3641,1391 +3587,7 @@
         </p:blipFill>
         <p:spPr bwMode="auto">
           <a:xfrm>
-            <a:off x="1133118" y="11173137"/>
-            <a:ext cx="19728579" cy="9846669"/>
-          </a:xfrm>
-          <a:prstGeom prst="rect">
-            <a:avLst/>
-          </a:prstGeom>
-          <a:noFill/>
-          <a:extLst>
-            <a:ext uri="{909E8E84-426E-40DD-AFC4-6F175D3DCCD1}">
-              <a14:hiddenFill xmlns:a14="http://schemas.microsoft.com/office/drawing/2010/main">
-                <a:solidFill>
-                  <a:srgbClr val="FFFFFF"/>
-                </a:solidFill>
-              </a14:hiddenFill>
-            </a:ext>
-          </a:extLst>
-        </p:spPr>
-      </p:pic>
-      <p:sp>
-        <p:nvSpPr>
-          <p:cNvPr id="158" name="TextBox 157">
-            <a:extLst>
-              <a:ext uri="{FF2B5EF4-FFF2-40B4-BE49-F238E27FC236}">
-                <a16:creationId xmlns:a16="http://schemas.microsoft.com/office/drawing/2014/main" id="{64AD3884-BD52-4426-9106-5A4CB2C37390}"/>
-              </a:ext>
-            </a:extLst>
-          </p:cNvPr>
-          <p:cNvSpPr txBox="1"/>
-          <p:nvPr/>
-        </p:nvSpPr>
-        <p:spPr>
-          <a:xfrm>
-            <a:off x="9943064" y="20735718"/>
-            <a:ext cx="2728233" cy="459828"/>
-          </a:xfrm>
-          <a:prstGeom prst="rect">
-            <a:avLst/>
-          </a:prstGeom>
-          <a:solidFill>
-            <a:schemeClr val="bg1"/>
-          </a:solidFill>
-        </p:spPr>
-        <p:txBody>
-          <a:bodyPr wrap="none" rtlCol="0">
-            <a:spAutoFit/>
-          </a:bodyPr>
-          <a:lstStyle/>
-          <a:p>
-            <a:r>
-              <a:rPr lang="en-US" sz="2275" dirty="0">
-                <a:latin typeface="Times New Roman" panose="02020603050405020304" pitchFamily="18" charset="0"/>
-                <a:cs typeface="Times New Roman" panose="02020603050405020304" pitchFamily="18" charset="0"/>
-              </a:rPr>
-              <a:t>Target Degree Ratio</a:t>
-            </a:r>
-          </a:p>
-        </p:txBody>
-      </p:sp>
-      <p:sp>
-        <p:nvSpPr>
-          <p:cNvPr id="160" name="TextBox 159">
-            <a:extLst>
-              <a:ext uri="{FF2B5EF4-FFF2-40B4-BE49-F238E27FC236}">
-                <a16:creationId xmlns:a16="http://schemas.microsoft.com/office/drawing/2014/main" id="{22E8D8C7-B220-48D6-BB2E-E3B5367CC446}"/>
-              </a:ext>
-            </a:extLst>
-          </p:cNvPr>
-          <p:cNvSpPr txBox="1"/>
-          <p:nvPr/>
-        </p:nvSpPr>
-        <p:spPr>
-          <a:xfrm rot="16200000">
-            <a:off x="826051" y="15657552"/>
-            <a:ext cx="746721" cy="474117"/>
-          </a:xfrm>
-          <a:prstGeom prst="rect">
-            <a:avLst/>
-          </a:prstGeom>
-          <a:solidFill>
-            <a:schemeClr val="bg1"/>
-          </a:solidFill>
-        </p:spPr>
-        <p:txBody>
-          <a:bodyPr wrap="none" rtlCol="0">
-            <a:spAutoFit/>
-          </a:bodyPr>
-          <a:lstStyle/>
-          <a:p>
-            <a:r>
-              <a:rPr lang="en-US" sz="2275" dirty="0">
-                <a:latin typeface="Times New Roman" panose="02020603050405020304" pitchFamily="18" charset="0"/>
-                <a:cs typeface="Times New Roman" panose="02020603050405020304" pitchFamily="18" charset="0"/>
-              </a:rPr>
-              <a:t>PDF</a:t>
-            </a:r>
-          </a:p>
-        </p:txBody>
-      </p:sp>
-      <p:sp>
-        <p:nvSpPr>
-          <p:cNvPr id="162" name="Rectangle 161">
-            <a:extLst>
-              <a:ext uri="{FF2B5EF4-FFF2-40B4-BE49-F238E27FC236}">
-                <a16:creationId xmlns:a16="http://schemas.microsoft.com/office/drawing/2014/main" id="{4FB1647F-E5E7-4CE2-9401-7C354253E177}"/>
-              </a:ext>
-            </a:extLst>
-          </p:cNvPr>
-          <p:cNvSpPr/>
-          <p:nvPr/>
-        </p:nvSpPr>
-        <p:spPr>
-          <a:xfrm>
-            <a:off x="3603908" y="11684891"/>
-            <a:ext cx="6729956" cy="4583080"/>
-          </a:xfrm>
-          <a:prstGeom prst="rect">
-            <a:avLst/>
-          </a:prstGeom>
-          <a:solidFill>
-            <a:schemeClr val="bg1"/>
-          </a:solidFill>
-          <a:ln>
-            <a:solidFill>
-              <a:schemeClr val="bg1"/>
-            </a:solidFill>
-          </a:ln>
-        </p:spPr>
-        <p:style>
-          <a:lnRef idx="2">
-            <a:schemeClr val="accent1">
-              <a:shade val="50000"/>
-            </a:schemeClr>
-          </a:lnRef>
-          <a:fillRef idx="1">
-            <a:schemeClr val="accent1"/>
-          </a:fillRef>
-          <a:effectRef idx="0">
-            <a:schemeClr val="accent1"/>
-          </a:effectRef>
-          <a:fontRef idx="minor">
-            <a:schemeClr val="lt1"/>
-          </a:fontRef>
-        </p:style>
-        <p:txBody>
-          <a:bodyPr rtlCol="0" anchor="ctr"/>
-          <a:lstStyle/>
-          <a:p>
-            <a:pPr algn="ctr"/>
-            <a:endParaRPr lang="en-US"/>
-          </a:p>
-        </p:txBody>
-      </p:sp>
-      <p:grpSp>
-        <p:nvGrpSpPr>
-          <p:cNvPr id="20" name="Group 19">
-            <a:extLst>
-              <a:ext uri="{FF2B5EF4-FFF2-40B4-BE49-F238E27FC236}">
-                <a16:creationId xmlns:a16="http://schemas.microsoft.com/office/drawing/2014/main" id="{9B7703BD-C064-4168-B194-CBBC7476C3A8}"/>
-              </a:ext>
-            </a:extLst>
-          </p:cNvPr>
-          <p:cNvGrpSpPr/>
-          <p:nvPr/>
-        </p:nvGrpSpPr>
-        <p:grpSpPr>
-          <a:xfrm>
-            <a:off x="3557402" y="11575731"/>
-            <a:ext cx="6623471" cy="4463546"/>
-            <a:chOff x="3583115" y="11550254"/>
-            <a:chExt cx="6623471" cy="4463546"/>
-          </a:xfrm>
-        </p:grpSpPr>
-        <p:pic>
-          <p:nvPicPr>
-            <p:cNvPr id="163" name="Picture 8">
-              <a:extLst>
-                <a:ext uri="{FF2B5EF4-FFF2-40B4-BE49-F238E27FC236}">
-                  <a16:creationId xmlns:a16="http://schemas.microsoft.com/office/drawing/2014/main" id="{3EF9E4DC-A50C-4027-B550-33D07ED44E13}"/>
-                </a:ext>
-              </a:extLst>
-            </p:cNvPr>
-            <p:cNvPicPr>
-              <a:picLocks noChangeAspect="1" noChangeArrowheads="1"/>
-            </p:cNvPicPr>
-            <p:nvPr/>
-          </p:nvPicPr>
-          <p:blipFill>
-            <a:blip r:embed="rId4">
-              <a:extLst>
-                <a:ext uri="{28A0092B-C50C-407E-A947-70E740481C1C}">
-                  <a14:useLocalDpi xmlns:a14="http://schemas.microsoft.com/office/drawing/2010/main" val="0"/>
-                </a:ext>
-              </a:extLst>
-            </a:blip>
-            <a:srcRect/>
-            <a:stretch>
-              <a:fillRect/>
-            </a:stretch>
-          </p:blipFill>
-          <p:spPr bwMode="auto">
-            <a:xfrm>
-              <a:off x="3603907" y="11550254"/>
-              <a:ext cx="6602679" cy="4463546"/>
-            </a:xfrm>
-            <a:prstGeom prst="rect">
-              <a:avLst/>
-            </a:prstGeom>
-            <a:noFill/>
-            <a:extLst>
-              <a:ext uri="{909E8E84-426E-40DD-AFC4-6F175D3DCCD1}">
-                <a14:hiddenFill xmlns:a14="http://schemas.microsoft.com/office/drawing/2010/main">
-                  <a:solidFill>
-                    <a:srgbClr val="FFFFFF"/>
-                  </a:solidFill>
-                </a14:hiddenFill>
-              </a:ext>
-            </a:extLst>
-          </p:spPr>
-        </p:pic>
-        <p:sp>
-          <p:nvSpPr>
-            <p:cNvPr id="164" name="TextBox 163">
-              <a:extLst>
-                <a:ext uri="{FF2B5EF4-FFF2-40B4-BE49-F238E27FC236}">
-                  <a16:creationId xmlns:a16="http://schemas.microsoft.com/office/drawing/2014/main" id="{50DDE504-0D56-47B8-8EC8-C66999E1945E}"/>
-                </a:ext>
-              </a:extLst>
-            </p:cNvPr>
-            <p:cNvSpPr txBox="1"/>
-            <p:nvPr/>
-          </p:nvSpPr>
-          <p:spPr>
-            <a:xfrm rot="16200000">
-              <a:off x="2615583" y="13288596"/>
-              <a:ext cx="2281376" cy="346311"/>
-            </a:xfrm>
-            <a:prstGeom prst="rect">
-              <a:avLst/>
-            </a:prstGeom>
-            <a:solidFill>
-              <a:schemeClr val="bg1"/>
-            </a:solidFill>
-          </p:spPr>
-          <p:txBody>
-            <a:bodyPr wrap="square" rtlCol="0">
-              <a:spAutoFit/>
-            </a:bodyPr>
-            <a:lstStyle/>
-            <a:p>
-              <a:r>
-                <a:rPr lang="en-US" sz="1500" dirty="0">
-                  <a:solidFill>
-                    <a:srgbClr val="202124"/>
-                  </a:solidFill>
-                  <a:latin typeface="Times New Roman" panose="02020603050405020304" pitchFamily="18" charset="0"/>
-                  <a:cs typeface="Times New Roman" panose="02020603050405020304" pitchFamily="18" charset="0"/>
-                </a:rPr>
-                <a:t>DeepPurpose Prediction</a:t>
-              </a:r>
-              <a:endParaRPr lang="en-US" sz="1500" dirty="0">
-                <a:latin typeface="Times New Roman" panose="02020603050405020304" pitchFamily="18" charset="0"/>
-                <a:cs typeface="Times New Roman" panose="02020603050405020304" pitchFamily="18" charset="0"/>
-              </a:endParaRPr>
-            </a:p>
-          </p:txBody>
-        </p:sp>
-        <p:sp>
-          <p:nvSpPr>
-            <p:cNvPr id="172" name="TextBox 171">
-              <a:extLst>
-                <a:ext uri="{FF2B5EF4-FFF2-40B4-BE49-F238E27FC236}">
-                  <a16:creationId xmlns:a16="http://schemas.microsoft.com/office/drawing/2014/main" id="{A5C6C90D-27F8-46B6-A39E-2134D19D4837}"/>
-                </a:ext>
-              </a:extLst>
-            </p:cNvPr>
-            <p:cNvSpPr txBox="1"/>
-            <p:nvPr/>
-          </p:nvSpPr>
-          <p:spPr>
-            <a:xfrm>
-              <a:off x="6214834" y="15665932"/>
-              <a:ext cx="2036338" cy="335874"/>
-            </a:xfrm>
-            <a:prstGeom prst="rect">
-              <a:avLst/>
-            </a:prstGeom>
-            <a:solidFill>
-              <a:schemeClr val="bg1"/>
-            </a:solidFill>
-          </p:spPr>
-          <p:txBody>
-            <a:bodyPr wrap="square" rtlCol="0">
-              <a:spAutoFit/>
-            </a:bodyPr>
-            <a:lstStyle/>
-            <a:p>
-              <a:r>
-                <a:rPr lang="en-US" sz="1500" dirty="0">
-                  <a:solidFill>
-                    <a:srgbClr val="202124"/>
-                  </a:solidFill>
-                  <a:latin typeface="Times New Roman" panose="02020603050405020304" pitchFamily="18" charset="0"/>
-                  <a:cs typeface="Times New Roman" panose="02020603050405020304" pitchFamily="18" charset="0"/>
-                </a:rPr>
-                <a:t>Target degree ratio (</a:t>
-              </a:r>
-              <a:r>
-                <a:rPr lang="el-GR" sz="1500" dirty="0">
-                  <a:solidFill>
-                    <a:srgbClr val="202124"/>
-                  </a:solidFill>
-                  <a:latin typeface="Times New Roman" panose="02020603050405020304" pitchFamily="18" charset="0"/>
-                  <a:cs typeface="Times New Roman" panose="02020603050405020304" pitchFamily="18" charset="0"/>
-                </a:rPr>
-                <a:t>ρ</a:t>
-              </a:r>
-              <a:r>
-                <a:rPr lang="en-US" sz="1500" dirty="0">
-                  <a:solidFill>
-                    <a:srgbClr val="202124"/>
-                  </a:solidFill>
-                  <a:latin typeface="Times New Roman" panose="02020603050405020304" pitchFamily="18" charset="0"/>
-                  <a:cs typeface="Times New Roman" panose="02020603050405020304" pitchFamily="18" charset="0"/>
-                </a:rPr>
-                <a:t>)</a:t>
-              </a:r>
-              <a:endParaRPr lang="en-US" sz="1500" dirty="0">
-                <a:latin typeface="Times New Roman" panose="02020603050405020304" pitchFamily="18" charset="0"/>
-                <a:cs typeface="Times New Roman" panose="02020603050405020304" pitchFamily="18" charset="0"/>
-              </a:endParaRPr>
-            </a:p>
-          </p:txBody>
-        </p:sp>
-      </p:grpSp>
-      <p:sp>
-        <p:nvSpPr>
-          <p:cNvPr id="173" name="Rectangle 172">
-            <a:extLst>
-              <a:ext uri="{FF2B5EF4-FFF2-40B4-BE49-F238E27FC236}">
-                <a16:creationId xmlns:a16="http://schemas.microsoft.com/office/drawing/2014/main" id="{170DF9EB-C08A-4E7A-A2AD-497FAE6EFD9B}"/>
-              </a:ext>
-            </a:extLst>
-          </p:cNvPr>
-          <p:cNvSpPr/>
-          <p:nvPr/>
-        </p:nvSpPr>
-        <p:spPr>
-          <a:xfrm>
-            <a:off x="6348718" y="16569295"/>
-            <a:ext cx="2689128" cy="857250"/>
-          </a:xfrm>
-          <a:prstGeom prst="rect">
-            <a:avLst/>
-          </a:prstGeom>
-          <a:solidFill>
-            <a:schemeClr val="bg1"/>
-          </a:solidFill>
-          <a:ln>
-            <a:solidFill>
-              <a:schemeClr val="bg1"/>
-            </a:solidFill>
-          </a:ln>
-        </p:spPr>
-        <p:style>
-          <a:lnRef idx="2">
-            <a:schemeClr val="accent1">
-              <a:shade val="50000"/>
-            </a:schemeClr>
-          </a:lnRef>
-          <a:fillRef idx="1">
-            <a:schemeClr val="accent1"/>
-          </a:fillRef>
-          <a:effectRef idx="0">
-            <a:schemeClr val="accent1"/>
-          </a:effectRef>
-          <a:fontRef idx="minor">
-            <a:schemeClr val="lt1"/>
-          </a:fontRef>
-        </p:style>
-        <p:txBody>
-          <a:bodyPr rtlCol="0" anchor="ctr"/>
-          <a:lstStyle/>
-          <a:p>
-            <a:pPr algn="ctr"/>
-            <a:endParaRPr lang="en-US"/>
-          </a:p>
-        </p:txBody>
-      </p:sp>
-      <p:grpSp>
-        <p:nvGrpSpPr>
-          <p:cNvPr id="174" name="Group 173">
-            <a:extLst>
-              <a:ext uri="{FF2B5EF4-FFF2-40B4-BE49-F238E27FC236}">
-                <a16:creationId xmlns:a16="http://schemas.microsoft.com/office/drawing/2014/main" id="{39C0A416-9868-405C-A660-6B48196A4FF7}"/>
-              </a:ext>
-            </a:extLst>
-          </p:cNvPr>
-          <p:cNvGrpSpPr/>
-          <p:nvPr/>
-        </p:nvGrpSpPr>
-        <p:grpSpPr>
-          <a:xfrm>
-            <a:off x="5677592" y="17348679"/>
-            <a:ext cx="2589746" cy="647759"/>
-            <a:chOff x="21483123" y="6219785"/>
-            <a:chExt cx="3222211" cy="830998"/>
-          </a:xfrm>
-        </p:grpSpPr>
-        <p:sp>
-          <p:nvSpPr>
-            <p:cNvPr id="175" name="TextBox 174">
-              <a:extLst>
-                <a:ext uri="{FF2B5EF4-FFF2-40B4-BE49-F238E27FC236}">
-                  <a16:creationId xmlns:a16="http://schemas.microsoft.com/office/drawing/2014/main" id="{5858BBF3-A672-4946-B4AA-C27459450044}"/>
-                </a:ext>
-              </a:extLst>
-            </p:cNvPr>
-            <p:cNvSpPr txBox="1"/>
-            <p:nvPr/>
-          </p:nvSpPr>
-          <p:spPr>
-            <a:xfrm>
-              <a:off x="22115703" y="6219785"/>
-              <a:ext cx="2589631" cy="430887"/>
-            </a:xfrm>
-            <a:prstGeom prst="rect">
-              <a:avLst/>
-            </a:prstGeom>
-            <a:solidFill>
-              <a:schemeClr val="bg1"/>
-            </a:solidFill>
-          </p:spPr>
-          <p:txBody>
-            <a:bodyPr wrap="square" rtlCol="0">
-              <a:spAutoFit/>
-            </a:bodyPr>
-            <a:lstStyle/>
-            <a:p>
-              <a:r>
-                <a:rPr lang="en-US" sz="1500" dirty="0">
-                  <a:solidFill>
-                    <a:srgbClr val="202124"/>
-                  </a:solidFill>
-                  <a:latin typeface="Times New Roman" panose="02020603050405020304" pitchFamily="18" charset="0"/>
-                  <a:cs typeface="Times New Roman" panose="02020603050405020304" pitchFamily="18" charset="0"/>
-                </a:rPr>
-                <a:t>Whole BindingDB</a:t>
-              </a:r>
-            </a:p>
-          </p:txBody>
-        </p:sp>
-        <p:sp>
-          <p:nvSpPr>
-            <p:cNvPr id="176" name="Rectangle 175">
-              <a:extLst>
-                <a:ext uri="{FF2B5EF4-FFF2-40B4-BE49-F238E27FC236}">
-                  <a16:creationId xmlns:a16="http://schemas.microsoft.com/office/drawing/2014/main" id="{45494D25-49E1-48D3-B0AA-7BC58B1EACC3}"/>
-                </a:ext>
-              </a:extLst>
-            </p:cNvPr>
-            <p:cNvSpPr/>
-            <p:nvPr/>
-          </p:nvSpPr>
-          <p:spPr>
-            <a:xfrm>
-              <a:off x="21483123" y="6296644"/>
-              <a:ext cx="440857" cy="247772"/>
-            </a:xfrm>
-            <a:prstGeom prst="rect">
-              <a:avLst/>
-            </a:prstGeom>
-            <a:solidFill>
-              <a:srgbClr val="D6E5F0"/>
-            </a:solidFill>
-          </p:spPr>
-          <p:style>
-            <a:lnRef idx="2">
-              <a:schemeClr val="accent1">
-                <a:shade val="50000"/>
-              </a:schemeClr>
-            </a:lnRef>
-            <a:fillRef idx="1">
-              <a:schemeClr val="accent1"/>
-            </a:fillRef>
-            <a:effectRef idx="0">
-              <a:schemeClr val="accent1"/>
-            </a:effectRef>
-            <a:fontRef idx="minor">
-              <a:schemeClr val="lt1"/>
-            </a:fontRef>
-          </p:style>
-          <p:txBody>
-            <a:bodyPr rtlCol="0" anchor="ctr"/>
-            <a:lstStyle/>
-            <a:p>
-              <a:pPr algn="ctr"/>
-              <a:endParaRPr lang="en-US" sz="1350"/>
-            </a:p>
-          </p:txBody>
-        </p:sp>
-        <p:sp>
-          <p:nvSpPr>
-            <p:cNvPr id="177" name="Rectangle 176">
-              <a:extLst>
-                <a:ext uri="{FF2B5EF4-FFF2-40B4-BE49-F238E27FC236}">
-                  <a16:creationId xmlns:a16="http://schemas.microsoft.com/office/drawing/2014/main" id="{1C119509-ABCF-4C6D-A4D2-E41ADE560C4A}"/>
-                </a:ext>
-              </a:extLst>
-            </p:cNvPr>
-            <p:cNvSpPr/>
-            <p:nvPr/>
-          </p:nvSpPr>
-          <p:spPr>
-            <a:xfrm>
-              <a:off x="21483123" y="6721369"/>
-              <a:ext cx="440857" cy="247772"/>
-            </a:xfrm>
-            <a:prstGeom prst="rect">
-              <a:avLst/>
-            </a:prstGeom>
-            <a:solidFill>
-              <a:srgbClr val="F9D0D0"/>
-            </a:solidFill>
-          </p:spPr>
-          <p:style>
-            <a:lnRef idx="2">
-              <a:schemeClr val="accent1">
-                <a:shade val="50000"/>
-              </a:schemeClr>
-            </a:lnRef>
-            <a:fillRef idx="1">
-              <a:schemeClr val="accent1"/>
-            </a:fillRef>
-            <a:effectRef idx="0">
-              <a:schemeClr val="accent1"/>
-            </a:effectRef>
-            <a:fontRef idx="minor">
-              <a:schemeClr val="lt1"/>
-            </a:fontRef>
-          </p:style>
-          <p:txBody>
-            <a:bodyPr rtlCol="0" anchor="ctr"/>
-            <a:lstStyle/>
-            <a:p>
-              <a:pPr algn="ctr"/>
-              <a:endParaRPr lang="en-US" sz="1350"/>
-            </a:p>
-          </p:txBody>
-        </p:sp>
-        <p:sp>
-          <p:nvSpPr>
-            <p:cNvPr id="178" name="TextBox 177">
-              <a:extLst>
-                <a:ext uri="{FF2B5EF4-FFF2-40B4-BE49-F238E27FC236}">
-                  <a16:creationId xmlns:a16="http://schemas.microsoft.com/office/drawing/2014/main" id="{B929704A-970C-4FD3-8A90-989B1D0202DA}"/>
-                </a:ext>
-              </a:extLst>
-            </p:cNvPr>
-            <p:cNvSpPr txBox="1"/>
-            <p:nvPr/>
-          </p:nvSpPr>
-          <p:spPr>
-            <a:xfrm>
-              <a:off x="22108850" y="6619896"/>
-              <a:ext cx="2589631" cy="430887"/>
-            </a:xfrm>
-            <a:prstGeom prst="rect">
-              <a:avLst/>
-            </a:prstGeom>
-            <a:solidFill>
-              <a:schemeClr val="bg1"/>
-            </a:solidFill>
-          </p:spPr>
-          <p:txBody>
-            <a:bodyPr wrap="square" rtlCol="0">
-              <a:spAutoFit/>
-            </a:bodyPr>
-            <a:lstStyle/>
-            <a:p>
-              <a:r>
-                <a:rPr lang="en-US" sz="1500" dirty="0">
-                  <a:solidFill>
-                    <a:srgbClr val="202124"/>
-                  </a:solidFill>
-                  <a:latin typeface="Times New Roman" panose="02020603050405020304" pitchFamily="18" charset="0"/>
-                  <a:cs typeface="Times New Roman" panose="02020603050405020304" pitchFamily="18" charset="0"/>
-                </a:rPr>
-                <a:t>False Positives</a:t>
-              </a:r>
-            </a:p>
-          </p:txBody>
-        </p:sp>
-      </p:grpSp>
-      <p:sp>
-        <p:nvSpPr>
-          <p:cNvPr id="184" name="TextBox 183">
-            <a:extLst>
-              <a:ext uri="{FF2B5EF4-FFF2-40B4-BE49-F238E27FC236}">
-                <a16:creationId xmlns:a16="http://schemas.microsoft.com/office/drawing/2014/main" id="{45B4C778-E141-4DF5-B09E-00545BFE86EC}"/>
-              </a:ext>
-            </a:extLst>
-          </p:cNvPr>
-          <p:cNvSpPr txBox="1"/>
-          <p:nvPr/>
-        </p:nvSpPr>
-        <p:spPr>
-          <a:xfrm>
-            <a:off x="14953374" y="11574011"/>
-            <a:ext cx="1143132" cy="459696"/>
-          </a:xfrm>
-          <a:prstGeom prst="rect">
-            <a:avLst/>
-          </a:prstGeom>
-          <a:noFill/>
-        </p:spPr>
-        <p:txBody>
-          <a:bodyPr wrap="square" rtlCol="0">
-            <a:spAutoFit/>
-          </a:bodyPr>
-          <a:lstStyle/>
-          <a:p>
-            <a:r>
-              <a:rPr lang="en-US" sz="2274" dirty="0">
-                <a:latin typeface="Times New Roman" panose="02020603050405020304" pitchFamily="18" charset="0"/>
-                <a:cs typeface="Times New Roman" panose="02020603050405020304" pitchFamily="18" charset="0"/>
-              </a:rPr>
-              <a:t>DAO</a:t>
-            </a:r>
-          </a:p>
-        </p:txBody>
-      </p:sp>
-      <p:sp>
-        <p:nvSpPr>
-          <p:cNvPr id="185" name="TextBox 184">
-            <a:extLst>
-              <a:ext uri="{FF2B5EF4-FFF2-40B4-BE49-F238E27FC236}">
-                <a16:creationId xmlns:a16="http://schemas.microsoft.com/office/drawing/2014/main" id="{6095029D-1062-4037-90BD-A0CECD1EE9C5}"/>
-              </a:ext>
-            </a:extLst>
-          </p:cNvPr>
-          <p:cNvSpPr txBox="1"/>
-          <p:nvPr/>
-        </p:nvSpPr>
-        <p:spPr>
-          <a:xfrm>
-            <a:off x="11116132" y="11575731"/>
-            <a:ext cx="1428215" cy="459696"/>
-          </a:xfrm>
-          <a:prstGeom prst="rect">
-            <a:avLst/>
-          </a:prstGeom>
-          <a:noFill/>
-        </p:spPr>
-        <p:txBody>
-          <a:bodyPr wrap="square" rtlCol="0">
-            <a:spAutoFit/>
-          </a:bodyPr>
-          <a:lstStyle/>
-          <a:p>
-            <a:r>
-              <a:rPr lang="en-US" sz="2274" dirty="0">
-                <a:latin typeface="Times New Roman" panose="02020603050405020304" pitchFamily="18" charset="0"/>
-                <a:cs typeface="Times New Roman" panose="02020603050405020304" pitchFamily="18" charset="0"/>
-              </a:rPr>
-              <a:t>AVPR1A</a:t>
-            </a:r>
-          </a:p>
-        </p:txBody>
-      </p:sp>
-      <p:sp>
-        <p:nvSpPr>
-          <p:cNvPr id="186" name="TextBox 185">
-            <a:extLst>
-              <a:ext uri="{FF2B5EF4-FFF2-40B4-BE49-F238E27FC236}">
-                <a16:creationId xmlns:a16="http://schemas.microsoft.com/office/drawing/2014/main" id="{87CEABDD-D50F-4897-B37C-EE0050044744}"/>
-              </a:ext>
-            </a:extLst>
-          </p:cNvPr>
-          <p:cNvSpPr txBox="1"/>
-          <p:nvPr/>
-        </p:nvSpPr>
-        <p:spPr>
-          <a:xfrm>
-            <a:off x="18340597" y="11566225"/>
-            <a:ext cx="959280" cy="459696"/>
-          </a:xfrm>
-          <a:prstGeom prst="rect">
-            <a:avLst/>
-          </a:prstGeom>
-          <a:noFill/>
-        </p:spPr>
-        <p:txBody>
-          <a:bodyPr wrap="square" rtlCol="0">
-            <a:spAutoFit/>
-          </a:bodyPr>
-          <a:lstStyle/>
-          <a:p>
-            <a:r>
-              <a:rPr lang="en-US" sz="2274" dirty="0">
-                <a:latin typeface="Times New Roman" panose="02020603050405020304" pitchFamily="18" charset="0"/>
-                <a:cs typeface="Times New Roman" panose="02020603050405020304" pitchFamily="18" charset="0"/>
-              </a:rPr>
-              <a:t>TOP1</a:t>
-            </a:r>
-          </a:p>
-        </p:txBody>
-      </p:sp>
-      <p:sp>
-        <p:nvSpPr>
-          <p:cNvPr id="187" name="Rectangle: Rounded Corners 186">
-            <a:extLst>
-              <a:ext uri="{FF2B5EF4-FFF2-40B4-BE49-F238E27FC236}">
-                <a16:creationId xmlns:a16="http://schemas.microsoft.com/office/drawing/2014/main" id="{7BF71878-780D-4703-8ED5-3B429FCE527C}"/>
-              </a:ext>
-            </a:extLst>
-          </p:cNvPr>
-          <p:cNvSpPr/>
-          <p:nvPr/>
-        </p:nvSpPr>
-        <p:spPr>
-          <a:xfrm>
-            <a:off x="10211443" y="11427540"/>
-            <a:ext cx="3237594" cy="5391544"/>
-          </a:xfrm>
-          <a:prstGeom prst="roundRect">
-            <a:avLst/>
-          </a:prstGeom>
-          <a:noFill/>
-          <a:ln w="38100">
-            <a:solidFill>
-              <a:srgbClr val="F9D1D1"/>
-            </a:solidFill>
-          </a:ln>
-        </p:spPr>
-        <p:style>
-          <a:lnRef idx="2">
-            <a:schemeClr val="accent1">
-              <a:shade val="50000"/>
-            </a:schemeClr>
-          </a:lnRef>
-          <a:fillRef idx="1">
-            <a:schemeClr val="accent1"/>
-          </a:fillRef>
-          <a:effectRef idx="0">
-            <a:schemeClr val="accent1"/>
-          </a:effectRef>
-          <a:fontRef idx="minor">
-            <a:schemeClr val="lt1"/>
-          </a:fontRef>
-        </p:style>
-        <p:txBody>
-          <a:bodyPr rtlCol="0" anchor="ctr"/>
-          <a:lstStyle/>
-          <a:p>
-            <a:pPr algn="ctr"/>
-            <a:endParaRPr lang="en-US" sz="1350"/>
-          </a:p>
-        </p:txBody>
-      </p:sp>
-      <p:sp>
-        <p:nvSpPr>
-          <p:cNvPr id="188" name="Rectangle: Rounded Corners 187">
-            <a:extLst>
-              <a:ext uri="{FF2B5EF4-FFF2-40B4-BE49-F238E27FC236}">
-                <a16:creationId xmlns:a16="http://schemas.microsoft.com/office/drawing/2014/main" id="{5D419A7B-9D23-43B4-A3AE-F4A9CB07A67B}"/>
-              </a:ext>
-            </a:extLst>
-          </p:cNvPr>
-          <p:cNvSpPr/>
-          <p:nvPr/>
-        </p:nvSpPr>
-        <p:spPr>
-          <a:xfrm>
-            <a:off x="13657356" y="11426644"/>
-            <a:ext cx="3335672" cy="5421180"/>
-          </a:xfrm>
-          <a:prstGeom prst="roundRect">
-            <a:avLst/>
-          </a:prstGeom>
-          <a:noFill/>
-          <a:ln w="38100">
-            <a:solidFill>
-              <a:srgbClr val="F9D1D1"/>
-            </a:solidFill>
-          </a:ln>
-        </p:spPr>
-        <p:style>
-          <a:lnRef idx="2">
-            <a:schemeClr val="accent1">
-              <a:shade val="50000"/>
-            </a:schemeClr>
-          </a:lnRef>
-          <a:fillRef idx="1">
-            <a:schemeClr val="accent1"/>
-          </a:fillRef>
-          <a:effectRef idx="0">
-            <a:schemeClr val="accent1"/>
-          </a:effectRef>
-          <a:fontRef idx="minor">
-            <a:schemeClr val="lt1"/>
-          </a:fontRef>
-        </p:style>
-        <p:txBody>
-          <a:bodyPr rtlCol="0" anchor="ctr"/>
-          <a:lstStyle/>
-          <a:p>
-            <a:pPr algn="ctr"/>
-            <a:endParaRPr lang="en-US" sz="1350"/>
-          </a:p>
-        </p:txBody>
-      </p:sp>
-      <p:sp>
-        <p:nvSpPr>
-          <p:cNvPr id="190" name="TextBox 189">
-            <a:extLst>
-              <a:ext uri="{FF2B5EF4-FFF2-40B4-BE49-F238E27FC236}">
-                <a16:creationId xmlns:a16="http://schemas.microsoft.com/office/drawing/2014/main" id="{236F0238-15AC-48E8-BDE7-90D82A351FBE}"/>
-              </a:ext>
-            </a:extLst>
-          </p:cNvPr>
-          <p:cNvSpPr txBox="1"/>
-          <p:nvPr/>
-        </p:nvSpPr>
-        <p:spPr>
-          <a:xfrm>
-            <a:off x="11198750" y="15345289"/>
-            <a:ext cx="1868613" cy="1207083"/>
-          </a:xfrm>
-          <a:prstGeom prst="rect">
-            <a:avLst/>
-          </a:prstGeom>
-          <a:noFill/>
-        </p:spPr>
-        <p:txBody>
-          <a:bodyPr wrap="square" rtlCol="0">
-            <a:spAutoFit/>
-          </a:bodyPr>
-          <a:lstStyle/>
-          <a:p>
-            <a:r>
-              <a:rPr lang="en-US" sz="2273" dirty="0">
-                <a:latin typeface="Times New Roman" panose="02020603050405020304" pitchFamily="18" charset="0"/>
-                <a:ea typeface="Calibri" panose="020F0502020204030204" pitchFamily="34" charset="0"/>
-                <a:cs typeface="Times New Roman" panose="02020603050405020304" pitchFamily="18" charset="0"/>
-              </a:rPr>
-              <a:t>k</a:t>
-            </a:r>
-            <a:r>
-              <a:rPr lang="en-US" sz="2273" baseline="-25000" dirty="0">
-                <a:latin typeface="Times New Roman" panose="02020603050405020304" pitchFamily="18" charset="0"/>
-                <a:ea typeface="Calibri" panose="020F0502020204030204" pitchFamily="34" charset="0"/>
-                <a:cs typeface="Times New Roman" panose="02020603050405020304" pitchFamily="18" charset="0"/>
-              </a:rPr>
-              <a:t>i</a:t>
-            </a:r>
-            <a:r>
-              <a:rPr lang="en-US" sz="2273" baseline="30000" dirty="0">
-                <a:latin typeface="Times New Roman" panose="02020603050405020304" pitchFamily="18" charset="0"/>
-                <a:ea typeface="Calibri" panose="020F0502020204030204" pitchFamily="34" charset="0"/>
-                <a:cs typeface="Times New Roman" panose="02020603050405020304" pitchFamily="18" charset="0"/>
-              </a:rPr>
-              <a:t>+ </a:t>
-            </a:r>
-            <a:r>
-              <a:rPr lang="en-US" sz="2273" dirty="0">
-                <a:latin typeface="Times New Roman" panose="02020603050405020304" pitchFamily="18" charset="0"/>
-                <a:cs typeface="Times New Roman" panose="02020603050405020304" pitchFamily="18" charset="0"/>
-              </a:rPr>
-              <a:t>= 32</a:t>
-            </a:r>
-            <a:endParaRPr lang="en-US" sz="2274" dirty="0">
-              <a:latin typeface="Times New Roman" panose="02020603050405020304" pitchFamily="18" charset="0"/>
-              <a:cs typeface="Times New Roman" panose="02020603050405020304" pitchFamily="18" charset="0"/>
-            </a:endParaRPr>
-          </a:p>
-          <a:p>
-            <a:r>
-              <a:rPr lang="en-US" sz="2273" dirty="0">
-                <a:latin typeface="Times New Roman" panose="02020603050405020304" pitchFamily="18" charset="0"/>
-                <a:ea typeface="Calibri" panose="020F0502020204030204" pitchFamily="34" charset="0"/>
-                <a:cs typeface="Times New Roman" panose="02020603050405020304" pitchFamily="18" charset="0"/>
-              </a:rPr>
-              <a:t>k</a:t>
-            </a:r>
-            <a:r>
-              <a:rPr lang="en-US" sz="2273" baseline="-25000" dirty="0">
-                <a:latin typeface="Times New Roman" panose="02020603050405020304" pitchFamily="18" charset="0"/>
-                <a:ea typeface="Calibri" panose="020F0502020204030204" pitchFamily="34" charset="0"/>
-                <a:cs typeface="Times New Roman" panose="02020603050405020304" pitchFamily="18" charset="0"/>
-              </a:rPr>
-              <a:t>i</a:t>
-            </a:r>
-            <a:r>
-              <a:rPr lang="en-US" sz="2273" baseline="30000" dirty="0">
-                <a:latin typeface="Times New Roman" panose="02020603050405020304" pitchFamily="18" charset="0"/>
-                <a:ea typeface="Calibri" panose="020F0502020204030204" pitchFamily="34" charset="0"/>
-                <a:cs typeface="Times New Roman" panose="02020603050405020304" pitchFamily="18" charset="0"/>
-              </a:rPr>
-              <a:t>- </a:t>
-            </a:r>
-            <a:r>
-              <a:rPr lang="en-US" sz="2274" dirty="0">
-                <a:latin typeface="Times New Roman" panose="02020603050405020304" pitchFamily="18" charset="0"/>
-                <a:cs typeface="Times New Roman" panose="02020603050405020304" pitchFamily="18" charset="0"/>
-              </a:rPr>
-              <a:t>= 10</a:t>
-            </a:r>
-          </a:p>
-          <a:p>
-            <a:r>
-              <a:rPr lang="el-GR" sz="2273" dirty="0">
-                <a:latin typeface="Times New Roman" panose="02020603050405020304" pitchFamily="18" charset="0"/>
-                <a:ea typeface="Calibri" panose="020F0502020204030204" pitchFamily="34" charset="0"/>
-                <a:cs typeface="Times New Roman" panose="02020603050405020304" pitchFamily="18" charset="0"/>
-              </a:rPr>
-              <a:t>ρ</a:t>
-            </a:r>
-            <a:r>
-              <a:rPr lang="en-US" sz="2273" baseline="-25000" dirty="0">
-                <a:latin typeface="Times New Roman" panose="02020603050405020304" pitchFamily="18" charset="0"/>
-                <a:ea typeface="Calibri" panose="020F0502020204030204" pitchFamily="34" charset="0"/>
-                <a:cs typeface="Times New Roman" panose="02020603050405020304" pitchFamily="18" charset="0"/>
-              </a:rPr>
-              <a:t>i </a:t>
-            </a:r>
-            <a:r>
-              <a:rPr lang="el-GR" sz="2400" dirty="0">
-                <a:solidFill>
-                  <a:srgbClr val="202124"/>
-                </a:solidFill>
-                <a:latin typeface="Times New Roman" panose="02020603050405020304" pitchFamily="18" charset="0"/>
-                <a:cs typeface="Times New Roman" panose="02020603050405020304" pitchFamily="18" charset="0"/>
-              </a:rPr>
-              <a:t> </a:t>
-            </a:r>
-            <a:r>
-              <a:rPr lang="en-US" sz="2274" dirty="0">
-                <a:latin typeface="Times New Roman" panose="02020603050405020304" pitchFamily="18" charset="0"/>
-                <a:cs typeface="Times New Roman" panose="02020603050405020304" pitchFamily="18" charset="0"/>
-              </a:rPr>
-              <a:t>= 0.76</a:t>
-            </a:r>
-          </a:p>
-        </p:txBody>
-      </p:sp>
-      <p:sp>
-        <p:nvSpPr>
-          <p:cNvPr id="191" name="TextBox 190">
-            <a:extLst>
-              <a:ext uri="{FF2B5EF4-FFF2-40B4-BE49-F238E27FC236}">
-                <a16:creationId xmlns:a16="http://schemas.microsoft.com/office/drawing/2014/main" id="{104DD23C-3722-4C96-ACF5-0D412FB117D3}"/>
-              </a:ext>
-            </a:extLst>
-          </p:cNvPr>
-          <p:cNvSpPr txBox="1"/>
-          <p:nvPr/>
-        </p:nvSpPr>
-        <p:spPr>
-          <a:xfrm>
-            <a:off x="14707026" y="15345288"/>
-            <a:ext cx="1868613" cy="1207083"/>
-          </a:xfrm>
-          <a:prstGeom prst="rect">
-            <a:avLst/>
-          </a:prstGeom>
-          <a:noFill/>
-        </p:spPr>
-        <p:txBody>
-          <a:bodyPr wrap="square" rtlCol="0">
-            <a:spAutoFit/>
-          </a:bodyPr>
-          <a:lstStyle/>
-          <a:p>
-            <a:r>
-              <a:rPr lang="en-US" sz="2273" dirty="0">
-                <a:latin typeface="Times New Roman" panose="02020603050405020304" pitchFamily="18" charset="0"/>
-                <a:ea typeface="Calibri" panose="020F0502020204030204" pitchFamily="34" charset="0"/>
-                <a:cs typeface="Times New Roman" panose="02020603050405020304" pitchFamily="18" charset="0"/>
-              </a:rPr>
-              <a:t>k</a:t>
-            </a:r>
-            <a:r>
-              <a:rPr lang="en-US" sz="2273" baseline="-25000" dirty="0">
-                <a:latin typeface="Times New Roman" panose="02020603050405020304" pitchFamily="18" charset="0"/>
-                <a:ea typeface="Calibri" panose="020F0502020204030204" pitchFamily="34" charset="0"/>
-                <a:cs typeface="Times New Roman" panose="02020603050405020304" pitchFamily="18" charset="0"/>
-              </a:rPr>
-              <a:t>i</a:t>
-            </a:r>
-            <a:r>
-              <a:rPr lang="en-US" sz="2273" baseline="30000" dirty="0">
-                <a:latin typeface="Times New Roman" panose="02020603050405020304" pitchFamily="18" charset="0"/>
-                <a:ea typeface="Calibri" panose="020F0502020204030204" pitchFamily="34" charset="0"/>
-                <a:cs typeface="Times New Roman" panose="02020603050405020304" pitchFamily="18" charset="0"/>
-              </a:rPr>
-              <a:t>+ </a:t>
-            </a:r>
-            <a:r>
-              <a:rPr lang="en-US" sz="2273" dirty="0">
-                <a:latin typeface="Times New Roman" panose="02020603050405020304" pitchFamily="18" charset="0"/>
-                <a:cs typeface="Times New Roman" panose="02020603050405020304" pitchFamily="18" charset="0"/>
-              </a:rPr>
-              <a:t>= 9</a:t>
-            </a:r>
-            <a:endParaRPr lang="en-US" sz="2274" dirty="0">
-              <a:latin typeface="Times New Roman" panose="02020603050405020304" pitchFamily="18" charset="0"/>
-              <a:cs typeface="Times New Roman" panose="02020603050405020304" pitchFamily="18" charset="0"/>
-            </a:endParaRPr>
-          </a:p>
-          <a:p>
-            <a:r>
-              <a:rPr lang="en-US" sz="2273" dirty="0">
-                <a:latin typeface="Times New Roman" panose="02020603050405020304" pitchFamily="18" charset="0"/>
-                <a:ea typeface="Calibri" panose="020F0502020204030204" pitchFamily="34" charset="0"/>
-                <a:cs typeface="Times New Roman" panose="02020603050405020304" pitchFamily="18" charset="0"/>
-              </a:rPr>
-              <a:t>k</a:t>
-            </a:r>
-            <a:r>
-              <a:rPr lang="en-US" sz="2273" baseline="-25000" dirty="0">
-                <a:latin typeface="Times New Roman" panose="02020603050405020304" pitchFamily="18" charset="0"/>
-                <a:ea typeface="Calibri" panose="020F0502020204030204" pitchFamily="34" charset="0"/>
-                <a:cs typeface="Times New Roman" panose="02020603050405020304" pitchFamily="18" charset="0"/>
-              </a:rPr>
-              <a:t>i</a:t>
-            </a:r>
-            <a:r>
-              <a:rPr lang="en-US" sz="2273" baseline="30000" dirty="0">
-                <a:latin typeface="Times New Roman" panose="02020603050405020304" pitchFamily="18" charset="0"/>
-                <a:ea typeface="Calibri" panose="020F0502020204030204" pitchFamily="34" charset="0"/>
-                <a:cs typeface="Times New Roman" panose="02020603050405020304" pitchFamily="18" charset="0"/>
-              </a:rPr>
-              <a:t>- </a:t>
-            </a:r>
-            <a:r>
-              <a:rPr lang="en-US" sz="2274" dirty="0">
-                <a:latin typeface="Times New Roman" panose="02020603050405020304" pitchFamily="18" charset="0"/>
-                <a:cs typeface="Times New Roman" panose="02020603050405020304" pitchFamily="18" charset="0"/>
-              </a:rPr>
-              <a:t>= 2</a:t>
-            </a:r>
-          </a:p>
-          <a:p>
-            <a:r>
-              <a:rPr lang="el-GR" sz="2273" dirty="0">
-                <a:latin typeface="Times New Roman" panose="02020603050405020304" pitchFamily="18" charset="0"/>
-                <a:ea typeface="Calibri" panose="020F0502020204030204" pitchFamily="34" charset="0"/>
-                <a:cs typeface="Times New Roman" panose="02020603050405020304" pitchFamily="18" charset="0"/>
-              </a:rPr>
-              <a:t>ρ</a:t>
-            </a:r>
-            <a:r>
-              <a:rPr lang="en-US" sz="2273" baseline="-25000" dirty="0">
-                <a:latin typeface="Times New Roman" panose="02020603050405020304" pitchFamily="18" charset="0"/>
-                <a:ea typeface="Calibri" panose="020F0502020204030204" pitchFamily="34" charset="0"/>
-                <a:cs typeface="Times New Roman" panose="02020603050405020304" pitchFamily="18" charset="0"/>
-              </a:rPr>
-              <a:t>i </a:t>
-            </a:r>
-            <a:r>
-              <a:rPr lang="el-GR" sz="2400" dirty="0">
-                <a:solidFill>
-                  <a:srgbClr val="202124"/>
-                </a:solidFill>
-                <a:latin typeface="Times New Roman" panose="02020603050405020304" pitchFamily="18" charset="0"/>
-                <a:cs typeface="Times New Roman" panose="02020603050405020304" pitchFamily="18" charset="0"/>
-              </a:rPr>
-              <a:t> </a:t>
-            </a:r>
-            <a:r>
-              <a:rPr lang="en-US" sz="2274" dirty="0">
-                <a:latin typeface="Times New Roman" panose="02020603050405020304" pitchFamily="18" charset="0"/>
-                <a:cs typeface="Times New Roman" panose="02020603050405020304" pitchFamily="18" charset="0"/>
-              </a:rPr>
-              <a:t>= 0.82</a:t>
-            </a:r>
-          </a:p>
-        </p:txBody>
-      </p:sp>
-      <p:sp>
-        <p:nvSpPr>
-          <p:cNvPr id="192" name="TextBox 191">
-            <a:extLst>
-              <a:ext uri="{FF2B5EF4-FFF2-40B4-BE49-F238E27FC236}">
-                <a16:creationId xmlns:a16="http://schemas.microsoft.com/office/drawing/2014/main" id="{D63CF358-B807-4D04-89CE-334241CE33DE}"/>
-              </a:ext>
-            </a:extLst>
-          </p:cNvPr>
-          <p:cNvSpPr txBox="1"/>
-          <p:nvPr/>
-        </p:nvSpPr>
-        <p:spPr>
-          <a:xfrm>
-            <a:off x="18281924" y="15335372"/>
-            <a:ext cx="1868613" cy="1207083"/>
-          </a:xfrm>
-          <a:prstGeom prst="rect">
-            <a:avLst/>
-          </a:prstGeom>
-          <a:noFill/>
-        </p:spPr>
-        <p:txBody>
-          <a:bodyPr wrap="square" rtlCol="0">
-            <a:spAutoFit/>
-          </a:bodyPr>
-          <a:lstStyle/>
-          <a:p>
-            <a:r>
-              <a:rPr lang="en-US" sz="2273" dirty="0">
-                <a:latin typeface="Times New Roman" panose="02020603050405020304" pitchFamily="18" charset="0"/>
-                <a:ea typeface="Calibri" panose="020F0502020204030204" pitchFamily="34" charset="0"/>
-                <a:cs typeface="Times New Roman" panose="02020603050405020304" pitchFamily="18" charset="0"/>
-              </a:rPr>
-              <a:t>k</a:t>
-            </a:r>
-            <a:r>
-              <a:rPr lang="en-US" sz="2273" baseline="-25000" dirty="0">
-                <a:latin typeface="Times New Roman" panose="02020603050405020304" pitchFamily="18" charset="0"/>
-                <a:ea typeface="Calibri" panose="020F0502020204030204" pitchFamily="34" charset="0"/>
-                <a:cs typeface="Times New Roman" panose="02020603050405020304" pitchFamily="18" charset="0"/>
-              </a:rPr>
-              <a:t>i</a:t>
-            </a:r>
-            <a:r>
-              <a:rPr lang="en-US" sz="2273" baseline="30000" dirty="0">
-                <a:latin typeface="Times New Roman" panose="02020603050405020304" pitchFamily="18" charset="0"/>
-                <a:ea typeface="Calibri" panose="020F0502020204030204" pitchFamily="34" charset="0"/>
-                <a:cs typeface="Times New Roman" panose="02020603050405020304" pitchFamily="18" charset="0"/>
-              </a:rPr>
-              <a:t>+ </a:t>
-            </a:r>
-            <a:r>
-              <a:rPr lang="en-US" sz="2273" dirty="0">
-                <a:latin typeface="Times New Roman" panose="02020603050405020304" pitchFamily="18" charset="0"/>
-                <a:cs typeface="Times New Roman" panose="02020603050405020304" pitchFamily="18" charset="0"/>
-              </a:rPr>
-              <a:t>= 3</a:t>
-            </a:r>
-            <a:endParaRPr lang="en-US" sz="2274" dirty="0">
-              <a:latin typeface="Times New Roman" panose="02020603050405020304" pitchFamily="18" charset="0"/>
-              <a:cs typeface="Times New Roman" panose="02020603050405020304" pitchFamily="18" charset="0"/>
-            </a:endParaRPr>
-          </a:p>
-          <a:p>
-            <a:r>
-              <a:rPr lang="en-US" sz="2273" dirty="0">
-                <a:latin typeface="Times New Roman" panose="02020603050405020304" pitchFamily="18" charset="0"/>
-                <a:ea typeface="Calibri" panose="020F0502020204030204" pitchFamily="34" charset="0"/>
-                <a:cs typeface="Times New Roman" panose="02020603050405020304" pitchFamily="18" charset="0"/>
-              </a:rPr>
-              <a:t>k</a:t>
-            </a:r>
-            <a:r>
-              <a:rPr lang="en-US" sz="2273" baseline="-25000" dirty="0">
-                <a:latin typeface="Times New Roman" panose="02020603050405020304" pitchFamily="18" charset="0"/>
-                <a:ea typeface="Calibri" panose="020F0502020204030204" pitchFamily="34" charset="0"/>
-                <a:cs typeface="Times New Roman" panose="02020603050405020304" pitchFamily="18" charset="0"/>
-              </a:rPr>
-              <a:t>i</a:t>
-            </a:r>
-            <a:r>
-              <a:rPr lang="en-US" sz="2273" baseline="30000" dirty="0">
-                <a:latin typeface="Times New Roman" panose="02020603050405020304" pitchFamily="18" charset="0"/>
-                <a:ea typeface="Calibri" panose="020F0502020204030204" pitchFamily="34" charset="0"/>
-                <a:cs typeface="Times New Roman" panose="02020603050405020304" pitchFamily="18" charset="0"/>
-              </a:rPr>
-              <a:t>- </a:t>
-            </a:r>
-            <a:r>
-              <a:rPr lang="en-US" sz="2274" dirty="0">
-                <a:latin typeface="Times New Roman" panose="02020603050405020304" pitchFamily="18" charset="0"/>
-                <a:cs typeface="Times New Roman" panose="02020603050405020304" pitchFamily="18" charset="0"/>
-              </a:rPr>
-              <a:t>= 0</a:t>
-            </a:r>
-          </a:p>
-          <a:p>
-            <a:r>
-              <a:rPr lang="el-GR" sz="2273" dirty="0">
-                <a:latin typeface="Times New Roman" panose="02020603050405020304" pitchFamily="18" charset="0"/>
-                <a:ea typeface="Calibri" panose="020F0502020204030204" pitchFamily="34" charset="0"/>
-                <a:cs typeface="Times New Roman" panose="02020603050405020304" pitchFamily="18" charset="0"/>
-              </a:rPr>
-              <a:t>ρ</a:t>
-            </a:r>
-            <a:r>
-              <a:rPr lang="en-US" sz="2273" baseline="-25000" dirty="0">
-                <a:latin typeface="Times New Roman" panose="02020603050405020304" pitchFamily="18" charset="0"/>
-                <a:ea typeface="Calibri" panose="020F0502020204030204" pitchFamily="34" charset="0"/>
-                <a:cs typeface="Times New Roman" panose="02020603050405020304" pitchFamily="18" charset="0"/>
-              </a:rPr>
-              <a:t>i </a:t>
-            </a:r>
-            <a:r>
-              <a:rPr lang="el-GR" sz="2400" dirty="0">
-                <a:solidFill>
-                  <a:srgbClr val="202124"/>
-                </a:solidFill>
-                <a:latin typeface="Times New Roman" panose="02020603050405020304" pitchFamily="18" charset="0"/>
-                <a:cs typeface="Times New Roman" panose="02020603050405020304" pitchFamily="18" charset="0"/>
-              </a:rPr>
-              <a:t> </a:t>
-            </a:r>
-            <a:r>
-              <a:rPr lang="en-US" sz="2274" dirty="0">
-                <a:latin typeface="Times New Roman" panose="02020603050405020304" pitchFamily="18" charset="0"/>
-                <a:cs typeface="Times New Roman" panose="02020603050405020304" pitchFamily="18" charset="0"/>
-              </a:rPr>
-              <a:t>= 1.0</a:t>
-            </a:r>
-          </a:p>
-        </p:txBody>
-      </p:sp>
-      <p:pic>
-        <p:nvPicPr>
-          <p:cNvPr id="181" name="Picture 180">
-            <a:extLst>
-              <a:ext uri="{FF2B5EF4-FFF2-40B4-BE49-F238E27FC236}">
-                <a16:creationId xmlns:a16="http://schemas.microsoft.com/office/drawing/2014/main" id="{5F902BDB-7178-4DDB-A649-1C203A40FFB9}"/>
-              </a:ext>
-            </a:extLst>
-          </p:cNvPr>
-          <p:cNvPicPr>
-            <a:picLocks noChangeAspect="1"/>
-          </p:cNvPicPr>
-          <p:nvPr/>
-        </p:nvPicPr>
-        <p:blipFill>
-          <a:blip r:embed="rId5"/>
-          <a:stretch>
-            <a:fillRect/>
-          </a:stretch>
-        </p:blipFill>
-        <p:spPr>
-          <a:xfrm>
-            <a:off x="17713608" y="12489173"/>
-            <a:ext cx="2168166" cy="2379391"/>
-          </a:xfrm>
-          <a:prstGeom prst="rect">
-            <a:avLst/>
-          </a:prstGeom>
-        </p:spPr>
-      </p:pic>
-      <p:pic>
-        <p:nvPicPr>
-          <p:cNvPr id="182" name="Picture 181">
-            <a:extLst>
-              <a:ext uri="{FF2B5EF4-FFF2-40B4-BE49-F238E27FC236}">
-                <a16:creationId xmlns:a16="http://schemas.microsoft.com/office/drawing/2014/main" id="{D1FC9F41-4157-40BE-89D8-2AB5A89A6823}"/>
-              </a:ext>
-            </a:extLst>
-          </p:cNvPr>
-          <p:cNvPicPr>
-            <a:picLocks noChangeAspect="1"/>
-          </p:cNvPicPr>
-          <p:nvPr/>
-        </p:nvPicPr>
-        <p:blipFill>
-          <a:blip r:embed="rId6"/>
-          <a:stretch>
-            <a:fillRect/>
-          </a:stretch>
-        </p:blipFill>
-        <p:spPr>
-          <a:xfrm>
-            <a:off x="14573659" y="11970204"/>
-            <a:ext cx="1566665" cy="3365168"/>
-          </a:xfrm>
-          <a:prstGeom prst="rect">
-            <a:avLst/>
-          </a:prstGeom>
-        </p:spPr>
-      </p:pic>
-      <p:pic>
-        <p:nvPicPr>
-          <p:cNvPr id="183" name="Picture 182">
-            <a:extLst>
-              <a:ext uri="{FF2B5EF4-FFF2-40B4-BE49-F238E27FC236}">
-                <a16:creationId xmlns:a16="http://schemas.microsoft.com/office/drawing/2014/main" id="{C7E4E6EA-9A60-4BA7-A232-ED6C7D9A11B4}"/>
-              </a:ext>
-            </a:extLst>
-          </p:cNvPr>
-          <p:cNvPicPr>
-            <a:picLocks noChangeAspect="1"/>
-          </p:cNvPicPr>
-          <p:nvPr/>
-        </p:nvPicPr>
-        <p:blipFill>
-          <a:blip r:embed="rId7"/>
-          <a:stretch>
-            <a:fillRect/>
-          </a:stretch>
-        </p:blipFill>
-        <p:spPr>
-          <a:xfrm>
-            <a:off x="11075128" y="12295498"/>
-            <a:ext cx="1692367" cy="3039874"/>
-          </a:xfrm>
-          <a:prstGeom prst="rect">
-            <a:avLst/>
-          </a:prstGeom>
-        </p:spPr>
-      </p:pic>
-      <p:sp>
-        <p:nvSpPr>
-          <p:cNvPr id="193" name="Rectangle: Rounded Corners 192">
-            <a:extLst>
-              <a:ext uri="{FF2B5EF4-FFF2-40B4-BE49-F238E27FC236}">
-                <a16:creationId xmlns:a16="http://schemas.microsoft.com/office/drawing/2014/main" id="{0A1BF369-D205-48A3-BE3F-6C02DEE8CF9E}"/>
-              </a:ext>
-            </a:extLst>
-          </p:cNvPr>
-          <p:cNvSpPr/>
-          <p:nvPr/>
-        </p:nvSpPr>
-        <p:spPr>
-          <a:xfrm>
-            <a:off x="17170817" y="11437692"/>
-            <a:ext cx="3237594" cy="5421180"/>
-          </a:xfrm>
-          <a:prstGeom prst="roundRect">
-            <a:avLst/>
-          </a:prstGeom>
-          <a:noFill/>
-          <a:ln w="38100">
-            <a:solidFill>
-              <a:srgbClr val="F9D1D1"/>
-            </a:solidFill>
-          </a:ln>
-        </p:spPr>
-        <p:style>
-          <a:lnRef idx="2">
-            <a:schemeClr val="accent1">
-              <a:shade val="50000"/>
-            </a:schemeClr>
-          </a:lnRef>
-          <a:fillRef idx="1">
-            <a:schemeClr val="accent1"/>
-          </a:fillRef>
-          <a:effectRef idx="0">
-            <a:schemeClr val="accent1"/>
-          </a:effectRef>
-          <a:fontRef idx="minor">
-            <a:schemeClr val="lt1"/>
-          </a:fontRef>
-        </p:style>
-        <p:txBody>
-          <a:bodyPr rtlCol="0" anchor="ctr"/>
-          <a:lstStyle/>
-          <a:p>
-            <a:pPr algn="ctr"/>
-            <a:endParaRPr lang="en-US" sz="1350"/>
-          </a:p>
-        </p:txBody>
-      </p:sp>
-      <p:pic>
-        <p:nvPicPr>
-          <p:cNvPr id="1026" name="Picture 2">
-            <a:extLst>
-              <a:ext uri="{FF2B5EF4-FFF2-40B4-BE49-F238E27FC236}">
-                <a16:creationId xmlns:a16="http://schemas.microsoft.com/office/drawing/2014/main" id="{98B54965-0B61-4D59-89FC-DA748191CF65}"/>
-              </a:ext>
-            </a:extLst>
-          </p:cNvPr>
-          <p:cNvPicPr>
-            <a:picLocks noChangeAspect="1" noChangeArrowheads="1"/>
-          </p:cNvPicPr>
-          <p:nvPr/>
-        </p:nvPicPr>
-        <p:blipFill>
-          <a:blip r:embed="rId8">
-            <a:extLst>
-              <a:ext uri="{28A0092B-C50C-407E-A947-70E740481C1C}">
-                <a14:useLocalDpi xmlns:a14="http://schemas.microsoft.com/office/drawing/2010/main" val="0"/>
-              </a:ext>
-            </a:extLst>
-          </a:blip>
-          <a:srcRect/>
-          <a:stretch>
-            <a:fillRect/>
-          </a:stretch>
-        </p:blipFill>
-        <p:spPr bwMode="auto">
-          <a:xfrm>
-            <a:off x="1248669" y="831129"/>
+            <a:off x="1152372" y="811932"/>
             <a:ext cx="19690070" cy="9790895"/>
           </a:xfrm>
           <a:prstGeom prst="rect">
@@ -5115,7 +3677,7 @@
           </p:nvSpPr>
           <p:spPr>
             <a:xfrm rot="16200000">
-              <a:off x="857562" y="5159706"/>
+              <a:off x="826050" y="5250659"/>
               <a:ext cx="746721" cy="474117"/>
             </a:xfrm>
             <a:prstGeom prst="rect">
@@ -5789,7 +4351,7 @@
                 <p:nvPr/>
               </p:nvPicPr>
               <p:blipFill>
-                <a:blip r:embed="rId9"/>
+                <a:blip r:embed="rId4"/>
                 <a:stretch>
                   <a:fillRect/>
                 </a:stretch>
@@ -5819,7 +4381,7 @@
                 <p:nvPr/>
               </p:nvPicPr>
               <p:blipFill>
-                <a:blip r:embed="rId10"/>
+                <a:blip r:embed="rId5"/>
                 <a:stretch>
                   <a:fillRect/>
                 </a:stretch>
@@ -5849,7 +4411,7 @@
                 <p:nvPr/>
               </p:nvPicPr>
               <p:blipFill>
-                <a:blip r:embed="rId11"/>
+                <a:blip r:embed="rId6"/>
                 <a:stretch>
                   <a:fillRect/>
                 </a:stretch>
@@ -6234,7 +4796,7 @@
               <p:nvPr/>
             </p:nvPicPr>
             <p:blipFill>
-              <a:blip r:embed="rId12">
+              <a:blip r:embed="rId7">
                 <a:extLst>
                   <a:ext uri="{28A0092B-C50C-407E-A947-70E740481C1C}">
                     <a14:useLocalDpi xmlns:a14="http://schemas.microsoft.com/office/drawing/2010/main" val="0"/>
@@ -6382,6 +4944,1390 @@
           </p:sp>
         </p:grpSp>
       </p:grpSp>
+      <p:pic>
+        <p:nvPicPr>
+          <p:cNvPr id="2" name="Picture 2">
+            <a:extLst>
+              <a:ext uri="{FF2B5EF4-FFF2-40B4-BE49-F238E27FC236}">
+                <a16:creationId xmlns:a16="http://schemas.microsoft.com/office/drawing/2014/main" id="{72D4A294-CA8D-4EF7-810A-278FD63679F1}"/>
+              </a:ext>
+            </a:extLst>
+          </p:cNvPr>
+          <p:cNvPicPr>
+            <a:picLocks noChangeAspect="1" noChangeArrowheads="1"/>
+          </p:cNvPicPr>
+          <p:nvPr/>
+        </p:nvPicPr>
+        <p:blipFill>
+          <a:blip r:embed="rId8">
+            <a:extLst>
+              <a:ext uri="{28A0092B-C50C-407E-A947-70E740481C1C}">
+                <a14:useLocalDpi xmlns:a14="http://schemas.microsoft.com/office/drawing/2010/main" val="0"/>
+              </a:ext>
+            </a:extLst>
+          </a:blip>
+          <a:srcRect/>
+          <a:stretch>
+            <a:fillRect/>
+          </a:stretch>
+        </p:blipFill>
+        <p:spPr bwMode="auto">
+          <a:xfrm>
+            <a:off x="1127764" y="11027059"/>
+            <a:ext cx="19714677" cy="9790895"/>
+          </a:xfrm>
+          <a:prstGeom prst="rect">
+            <a:avLst/>
+          </a:prstGeom>
+          <a:noFill/>
+          <a:extLst>
+            <a:ext uri="{909E8E84-426E-40DD-AFC4-6F175D3DCCD1}">
+              <a14:hiddenFill xmlns:a14="http://schemas.microsoft.com/office/drawing/2010/main">
+                <a:solidFill>
+                  <a:srgbClr val="FFFFFF"/>
+                </a:solidFill>
+              </a14:hiddenFill>
+            </a:ext>
+          </a:extLst>
+        </p:spPr>
+      </p:pic>
+      <p:sp>
+        <p:nvSpPr>
+          <p:cNvPr id="61" name="TextBox 60">
+            <a:extLst>
+              <a:ext uri="{FF2B5EF4-FFF2-40B4-BE49-F238E27FC236}">
+                <a16:creationId xmlns:a16="http://schemas.microsoft.com/office/drawing/2014/main" id="{FFA1C490-DE35-46F2-A631-FD4F6D04B456}"/>
+              </a:ext>
+            </a:extLst>
+          </p:cNvPr>
+          <p:cNvSpPr txBox="1"/>
+          <p:nvPr/>
+        </p:nvSpPr>
+        <p:spPr>
+          <a:xfrm>
+            <a:off x="9943064" y="20403768"/>
+            <a:ext cx="2728233" cy="459828"/>
+          </a:xfrm>
+          <a:prstGeom prst="rect">
+            <a:avLst/>
+          </a:prstGeom>
+          <a:solidFill>
+            <a:schemeClr val="bg1"/>
+          </a:solidFill>
+        </p:spPr>
+        <p:txBody>
+          <a:bodyPr wrap="none" rtlCol="0">
+            <a:spAutoFit/>
+          </a:bodyPr>
+          <a:lstStyle/>
+          <a:p>
+            <a:r>
+              <a:rPr lang="en-US" sz="2275" dirty="0">
+                <a:latin typeface="Times New Roman" panose="02020603050405020304" pitchFamily="18" charset="0"/>
+                <a:cs typeface="Times New Roman" panose="02020603050405020304" pitchFamily="18" charset="0"/>
+              </a:rPr>
+              <a:t>Target Degree Ratio</a:t>
+            </a:r>
+          </a:p>
+        </p:txBody>
+      </p:sp>
+      <p:sp>
+        <p:nvSpPr>
+          <p:cNvPr id="64" name="TextBox 63">
+            <a:extLst>
+              <a:ext uri="{FF2B5EF4-FFF2-40B4-BE49-F238E27FC236}">
+                <a16:creationId xmlns:a16="http://schemas.microsoft.com/office/drawing/2014/main" id="{0526107F-E589-47AB-8D09-9B2B39B7213E}"/>
+              </a:ext>
+            </a:extLst>
+          </p:cNvPr>
+          <p:cNvSpPr txBox="1"/>
+          <p:nvPr/>
+        </p:nvSpPr>
+        <p:spPr>
+          <a:xfrm rot="16200000">
+            <a:off x="826051" y="15657552"/>
+            <a:ext cx="746721" cy="474117"/>
+          </a:xfrm>
+          <a:prstGeom prst="rect">
+            <a:avLst/>
+          </a:prstGeom>
+          <a:solidFill>
+            <a:schemeClr val="bg1"/>
+          </a:solidFill>
+        </p:spPr>
+        <p:txBody>
+          <a:bodyPr wrap="none" rtlCol="0">
+            <a:spAutoFit/>
+          </a:bodyPr>
+          <a:lstStyle/>
+          <a:p>
+            <a:r>
+              <a:rPr lang="en-US" sz="2275" dirty="0">
+                <a:latin typeface="Times New Roman" panose="02020603050405020304" pitchFamily="18" charset="0"/>
+                <a:cs typeface="Times New Roman" panose="02020603050405020304" pitchFamily="18" charset="0"/>
+              </a:rPr>
+              <a:t>PDF</a:t>
+            </a:r>
+          </a:p>
+        </p:txBody>
+      </p:sp>
+      <p:sp>
+        <p:nvSpPr>
+          <p:cNvPr id="65" name="Rectangle 64">
+            <a:extLst>
+              <a:ext uri="{FF2B5EF4-FFF2-40B4-BE49-F238E27FC236}">
+                <a16:creationId xmlns:a16="http://schemas.microsoft.com/office/drawing/2014/main" id="{3D21417B-9612-4E1F-BEDF-A4112DC4CFA3}"/>
+              </a:ext>
+            </a:extLst>
+          </p:cNvPr>
+          <p:cNvSpPr/>
+          <p:nvPr/>
+        </p:nvSpPr>
+        <p:spPr>
+          <a:xfrm>
+            <a:off x="3603908" y="11684891"/>
+            <a:ext cx="6729956" cy="4583080"/>
+          </a:xfrm>
+          <a:prstGeom prst="rect">
+            <a:avLst/>
+          </a:prstGeom>
+          <a:solidFill>
+            <a:schemeClr val="bg1"/>
+          </a:solidFill>
+          <a:ln>
+            <a:solidFill>
+              <a:schemeClr val="bg1"/>
+            </a:solidFill>
+          </a:ln>
+        </p:spPr>
+        <p:style>
+          <a:lnRef idx="2">
+            <a:schemeClr val="accent1">
+              <a:shade val="50000"/>
+            </a:schemeClr>
+          </a:lnRef>
+          <a:fillRef idx="1">
+            <a:schemeClr val="accent1"/>
+          </a:fillRef>
+          <a:effectRef idx="0">
+            <a:schemeClr val="accent1"/>
+          </a:effectRef>
+          <a:fontRef idx="minor">
+            <a:schemeClr val="lt1"/>
+          </a:fontRef>
+        </p:style>
+        <p:txBody>
+          <a:bodyPr rtlCol="0" anchor="ctr"/>
+          <a:lstStyle/>
+          <a:p>
+            <a:pPr algn="ctr"/>
+            <a:endParaRPr lang="en-US"/>
+          </a:p>
+        </p:txBody>
+      </p:sp>
+      <p:grpSp>
+        <p:nvGrpSpPr>
+          <p:cNvPr id="82" name="Group 81">
+            <a:extLst>
+              <a:ext uri="{FF2B5EF4-FFF2-40B4-BE49-F238E27FC236}">
+                <a16:creationId xmlns:a16="http://schemas.microsoft.com/office/drawing/2014/main" id="{BAC7A0D2-339C-42E7-BD64-C51776E44C31}"/>
+              </a:ext>
+            </a:extLst>
+          </p:cNvPr>
+          <p:cNvGrpSpPr/>
+          <p:nvPr/>
+        </p:nvGrpSpPr>
+        <p:grpSpPr>
+          <a:xfrm>
+            <a:off x="3557402" y="11575731"/>
+            <a:ext cx="6623471" cy="4463546"/>
+            <a:chOff x="3583115" y="11550254"/>
+            <a:chExt cx="6623471" cy="4463546"/>
+          </a:xfrm>
+        </p:grpSpPr>
+        <p:pic>
+          <p:nvPicPr>
+            <p:cNvPr id="83" name="Picture 8">
+              <a:extLst>
+                <a:ext uri="{FF2B5EF4-FFF2-40B4-BE49-F238E27FC236}">
+                  <a16:creationId xmlns:a16="http://schemas.microsoft.com/office/drawing/2014/main" id="{38B926AC-971A-4B7E-90E9-231582D246C9}"/>
+                </a:ext>
+              </a:extLst>
+            </p:cNvPr>
+            <p:cNvPicPr>
+              <a:picLocks noChangeAspect="1" noChangeArrowheads="1"/>
+            </p:cNvPicPr>
+            <p:nvPr/>
+          </p:nvPicPr>
+          <p:blipFill>
+            <a:blip r:embed="rId9">
+              <a:extLst>
+                <a:ext uri="{28A0092B-C50C-407E-A947-70E740481C1C}">
+                  <a14:useLocalDpi xmlns:a14="http://schemas.microsoft.com/office/drawing/2010/main" val="0"/>
+                </a:ext>
+              </a:extLst>
+            </a:blip>
+            <a:srcRect/>
+            <a:stretch>
+              <a:fillRect/>
+            </a:stretch>
+          </p:blipFill>
+          <p:spPr bwMode="auto">
+            <a:xfrm>
+              <a:off x="3603907" y="11550254"/>
+              <a:ext cx="6602679" cy="4463546"/>
+            </a:xfrm>
+            <a:prstGeom prst="rect">
+              <a:avLst/>
+            </a:prstGeom>
+            <a:noFill/>
+            <a:extLst>
+              <a:ext uri="{909E8E84-426E-40DD-AFC4-6F175D3DCCD1}">
+                <a14:hiddenFill xmlns:a14="http://schemas.microsoft.com/office/drawing/2010/main">
+                  <a:solidFill>
+                    <a:srgbClr val="FFFFFF"/>
+                  </a:solidFill>
+                </a14:hiddenFill>
+              </a:ext>
+            </a:extLst>
+          </p:spPr>
+        </p:pic>
+        <p:sp>
+          <p:nvSpPr>
+            <p:cNvPr id="84" name="TextBox 83">
+              <a:extLst>
+                <a:ext uri="{FF2B5EF4-FFF2-40B4-BE49-F238E27FC236}">
+                  <a16:creationId xmlns:a16="http://schemas.microsoft.com/office/drawing/2014/main" id="{57C22510-0223-4BB2-BA00-048FECDC2E9B}"/>
+                </a:ext>
+              </a:extLst>
+            </p:cNvPr>
+            <p:cNvSpPr txBox="1"/>
+            <p:nvPr/>
+          </p:nvSpPr>
+          <p:spPr>
+            <a:xfrm rot="16200000">
+              <a:off x="2615583" y="13288596"/>
+              <a:ext cx="2281376" cy="346311"/>
+            </a:xfrm>
+            <a:prstGeom prst="rect">
+              <a:avLst/>
+            </a:prstGeom>
+            <a:solidFill>
+              <a:schemeClr val="bg1"/>
+            </a:solidFill>
+          </p:spPr>
+          <p:txBody>
+            <a:bodyPr wrap="square" rtlCol="0">
+              <a:spAutoFit/>
+            </a:bodyPr>
+            <a:lstStyle/>
+            <a:p>
+              <a:r>
+                <a:rPr lang="en-US" sz="1500" dirty="0">
+                  <a:solidFill>
+                    <a:srgbClr val="202124"/>
+                  </a:solidFill>
+                  <a:latin typeface="Times New Roman" panose="02020603050405020304" pitchFamily="18" charset="0"/>
+                  <a:cs typeface="Times New Roman" panose="02020603050405020304" pitchFamily="18" charset="0"/>
+                </a:rPr>
+                <a:t>DeepPurpose Prediction</a:t>
+              </a:r>
+              <a:endParaRPr lang="en-US" sz="1500" dirty="0">
+                <a:latin typeface="Times New Roman" panose="02020603050405020304" pitchFamily="18" charset="0"/>
+                <a:cs typeface="Times New Roman" panose="02020603050405020304" pitchFamily="18" charset="0"/>
+              </a:endParaRPr>
+            </a:p>
+          </p:txBody>
+        </p:sp>
+        <p:sp>
+          <p:nvSpPr>
+            <p:cNvPr id="85" name="TextBox 84">
+              <a:extLst>
+                <a:ext uri="{FF2B5EF4-FFF2-40B4-BE49-F238E27FC236}">
+                  <a16:creationId xmlns:a16="http://schemas.microsoft.com/office/drawing/2014/main" id="{BA9ED53A-8CB7-496C-8A94-7F9BCB709AF5}"/>
+                </a:ext>
+              </a:extLst>
+            </p:cNvPr>
+            <p:cNvSpPr txBox="1"/>
+            <p:nvPr/>
+          </p:nvSpPr>
+          <p:spPr>
+            <a:xfrm>
+              <a:off x="6214834" y="15665932"/>
+              <a:ext cx="2036338" cy="335874"/>
+            </a:xfrm>
+            <a:prstGeom prst="rect">
+              <a:avLst/>
+            </a:prstGeom>
+            <a:solidFill>
+              <a:schemeClr val="bg1"/>
+            </a:solidFill>
+          </p:spPr>
+          <p:txBody>
+            <a:bodyPr wrap="square" rtlCol="0">
+              <a:spAutoFit/>
+            </a:bodyPr>
+            <a:lstStyle/>
+            <a:p>
+              <a:r>
+                <a:rPr lang="en-US" sz="1500" dirty="0">
+                  <a:solidFill>
+                    <a:srgbClr val="202124"/>
+                  </a:solidFill>
+                  <a:latin typeface="Times New Roman" panose="02020603050405020304" pitchFamily="18" charset="0"/>
+                  <a:cs typeface="Times New Roman" panose="02020603050405020304" pitchFamily="18" charset="0"/>
+                </a:rPr>
+                <a:t>Target degree ratio (</a:t>
+              </a:r>
+              <a:r>
+                <a:rPr lang="el-GR" sz="1500" dirty="0">
+                  <a:solidFill>
+                    <a:srgbClr val="202124"/>
+                  </a:solidFill>
+                  <a:latin typeface="Times New Roman" panose="02020603050405020304" pitchFamily="18" charset="0"/>
+                  <a:cs typeface="Times New Roman" panose="02020603050405020304" pitchFamily="18" charset="0"/>
+                </a:rPr>
+                <a:t>ρ</a:t>
+              </a:r>
+              <a:r>
+                <a:rPr lang="en-US" sz="1500" dirty="0">
+                  <a:solidFill>
+                    <a:srgbClr val="202124"/>
+                  </a:solidFill>
+                  <a:latin typeface="Times New Roman" panose="02020603050405020304" pitchFamily="18" charset="0"/>
+                  <a:cs typeface="Times New Roman" panose="02020603050405020304" pitchFamily="18" charset="0"/>
+                </a:rPr>
+                <a:t>)</a:t>
+              </a:r>
+              <a:endParaRPr lang="en-US" sz="1500" dirty="0">
+                <a:latin typeface="Times New Roman" panose="02020603050405020304" pitchFamily="18" charset="0"/>
+                <a:cs typeface="Times New Roman" panose="02020603050405020304" pitchFamily="18" charset="0"/>
+              </a:endParaRPr>
+            </a:p>
+          </p:txBody>
+        </p:sp>
+      </p:grpSp>
+      <p:sp>
+        <p:nvSpPr>
+          <p:cNvPr id="87" name="Rectangle 86">
+            <a:extLst>
+              <a:ext uri="{FF2B5EF4-FFF2-40B4-BE49-F238E27FC236}">
+                <a16:creationId xmlns:a16="http://schemas.microsoft.com/office/drawing/2014/main" id="{4767036A-1696-4C66-8AD2-168DD266E0DD}"/>
+              </a:ext>
+            </a:extLst>
+          </p:cNvPr>
+          <p:cNvSpPr/>
+          <p:nvPr/>
+        </p:nvSpPr>
+        <p:spPr>
+          <a:xfrm>
+            <a:off x="6348718" y="16569295"/>
+            <a:ext cx="2689128" cy="857250"/>
+          </a:xfrm>
+          <a:prstGeom prst="rect">
+            <a:avLst/>
+          </a:prstGeom>
+          <a:solidFill>
+            <a:schemeClr val="bg1"/>
+          </a:solidFill>
+          <a:ln>
+            <a:solidFill>
+              <a:schemeClr val="bg1"/>
+            </a:solidFill>
+          </a:ln>
+        </p:spPr>
+        <p:style>
+          <a:lnRef idx="2">
+            <a:schemeClr val="accent1">
+              <a:shade val="50000"/>
+            </a:schemeClr>
+          </a:lnRef>
+          <a:fillRef idx="1">
+            <a:schemeClr val="accent1"/>
+          </a:fillRef>
+          <a:effectRef idx="0">
+            <a:schemeClr val="accent1"/>
+          </a:effectRef>
+          <a:fontRef idx="minor">
+            <a:schemeClr val="lt1"/>
+          </a:fontRef>
+        </p:style>
+        <p:txBody>
+          <a:bodyPr rtlCol="0" anchor="ctr"/>
+          <a:lstStyle/>
+          <a:p>
+            <a:pPr algn="ctr"/>
+            <a:endParaRPr lang="en-US"/>
+          </a:p>
+        </p:txBody>
+      </p:sp>
+      <p:grpSp>
+        <p:nvGrpSpPr>
+          <p:cNvPr id="88" name="Group 87">
+            <a:extLst>
+              <a:ext uri="{FF2B5EF4-FFF2-40B4-BE49-F238E27FC236}">
+                <a16:creationId xmlns:a16="http://schemas.microsoft.com/office/drawing/2014/main" id="{3C0E0F4B-76B2-4931-BBB9-429650E19DC0}"/>
+              </a:ext>
+            </a:extLst>
+          </p:cNvPr>
+          <p:cNvGrpSpPr/>
+          <p:nvPr/>
+        </p:nvGrpSpPr>
+        <p:grpSpPr>
+          <a:xfrm>
+            <a:off x="5677592" y="17348679"/>
+            <a:ext cx="2589746" cy="647759"/>
+            <a:chOff x="21483123" y="6219785"/>
+            <a:chExt cx="3222211" cy="830998"/>
+          </a:xfrm>
+        </p:grpSpPr>
+        <p:sp>
+          <p:nvSpPr>
+            <p:cNvPr id="89" name="TextBox 88">
+              <a:extLst>
+                <a:ext uri="{FF2B5EF4-FFF2-40B4-BE49-F238E27FC236}">
+                  <a16:creationId xmlns:a16="http://schemas.microsoft.com/office/drawing/2014/main" id="{011F93EB-AB69-4978-9852-BFA6A17A2A63}"/>
+                </a:ext>
+              </a:extLst>
+            </p:cNvPr>
+            <p:cNvSpPr txBox="1"/>
+            <p:nvPr/>
+          </p:nvSpPr>
+          <p:spPr>
+            <a:xfrm>
+              <a:off x="22115703" y="6219785"/>
+              <a:ext cx="2589631" cy="430887"/>
+            </a:xfrm>
+            <a:prstGeom prst="rect">
+              <a:avLst/>
+            </a:prstGeom>
+            <a:solidFill>
+              <a:schemeClr val="bg1"/>
+            </a:solidFill>
+          </p:spPr>
+          <p:txBody>
+            <a:bodyPr wrap="square" rtlCol="0">
+              <a:spAutoFit/>
+            </a:bodyPr>
+            <a:lstStyle/>
+            <a:p>
+              <a:r>
+                <a:rPr lang="en-US" sz="1500" dirty="0">
+                  <a:solidFill>
+                    <a:srgbClr val="202124"/>
+                  </a:solidFill>
+                  <a:latin typeface="Times New Roman" panose="02020603050405020304" pitchFamily="18" charset="0"/>
+                  <a:cs typeface="Times New Roman" panose="02020603050405020304" pitchFamily="18" charset="0"/>
+                </a:rPr>
+                <a:t>Whole BindingDB</a:t>
+              </a:r>
+            </a:p>
+          </p:txBody>
+        </p:sp>
+        <p:sp>
+          <p:nvSpPr>
+            <p:cNvPr id="98" name="Rectangle 97">
+              <a:extLst>
+                <a:ext uri="{FF2B5EF4-FFF2-40B4-BE49-F238E27FC236}">
+                  <a16:creationId xmlns:a16="http://schemas.microsoft.com/office/drawing/2014/main" id="{0F385D80-2FF7-4E4B-8C8D-349C620E2519}"/>
+                </a:ext>
+              </a:extLst>
+            </p:cNvPr>
+            <p:cNvSpPr/>
+            <p:nvPr/>
+          </p:nvSpPr>
+          <p:spPr>
+            <a:xfrm>
+              <a:off x="21483123" y="6296644"/>
+              <a:ext cx="440857" cy="247772"/>
+            </a:xfrm>
+            <a:prstGeom prst="rect">
+              <a:avLst/>
+            </a:prstGeom>
+            <a:solidFill>
+              <a:srgbClr val="D6E5F0"/>
+            </a:solidFill>
+          </p:spPr>
+          <p:style>
+            <a:lnRef idx="2">
+              <a:schemeClr val="accent1">
+                <a:shade val="50000"/>
+              </a:schemeClr>
+            </a:lnRef>
+            <a:fillRef idx="1">
+              <a:schemeClr val="accent1"/>
+            </a:fillRef>
+            <a:effectRef idx="0">
+              <a:schemeClr val="accent1"/>
+            </a:effectRef>
+            <a:fontRef idx="minor">
+              <a:schemeClr val="lt1"/>
+            </a:fontRef>
+          </p:style>
+          <p:txBody>
+            <a:bodyPr rtlCol="0" anchor="ctr"/>
+            <a:lstStyle/>
+            <a:p>
+              <a:pPr algn="ctr"/>
+              <a:endParaRPr lang="en-US" sz="1350"/>
+            </a:p>
+          </p:txBody>
+        </p:sp>
+        <p:sp>
+          <p:nvSpPr>
+            <p:cNvPr id="99" name="Rectangle 98">
+              <a:extLst>
+                <a:ext uri="{FF2B5EF4-FFF2-40B4-BE49-F238E27FC236}">
+                  <a16:creationId xmlns:a16="http://schemas.microsoft.com/office/drawing/2014/main" id="{6AECB5A2-96CD-48A5-8E2D-6C20F5CAA894}"/>
+                </a:ext>
+              </a:extLst>
+            </p:cNvPr>
+            <p:cNvSpPr/>
+            <p:nvPr/>
+          </p:nvSpPr>
+          <p:spPr>
+            <a:xfrm>
+              <a:off x="21483123" y="6721369"/>
+              <a:ext cx="440857" cy="247772"/>
+            </a:xfrm>
+            <a:prstGeom prst="rect">
+              <a:avLst/>
+            </a:prstGeom>
+            <a:solidFill>
+              <a:srgbClr val="F9D0D0"/>
+            </a:solidFill>
+          </p:spPr>
+          <p:style>
+            <a:lnRef idx="2">
+              <a:schemeClr val="accent1">
+                <a:shade val="50000"/>
+              </a:schemeClr>
+            </a:lnRef>
+            <a:fillRef idx="1">
+              <a:schemeClr val="accent1"/>
+            </a:fillRef>
+            <a:effectRef idx="0">
+              <a:schemeClr val="accent1"/>
+            </a:effectRef>
+            <a:fontRef idx="minor">
+              <a:schemeClr val="lt1"/>
+            </a:fontRef>
+          </p:style>
+          <p:txBody>
+            <a:bodyPr rtlCol="0" anchor="ctr"/>
+            <a:lstStyle/>
+            <a:p>
+              <a:pPr algn="ctr"/>
+              <a:endParaRPr lang="en-US" sz="1350"/>
+            </a:p>
+          </p:txBody>
+        </p:sp>
+        <p:sp>
+          <p:nvSpPr>
+            <p:cNvPr id="100" name="TextBox 99">
+              <a:extLst>
+                <a:ext uri="{FF2B5EF4-FFF2-40B4-BE49-F238E27FC236}">
+                  <a16:creationId xmlns:a16="http://schemas.microsoft.com/office/drawing/2014/main" id="{8697859E-AF1F-4FC0-BAD8-1F6EF070B421}"/>
+                </a:ext>
+              </a:extLst>
+            </p:cNvPr>
+            <p:cNvSpPr txBox="1"/>
+            <p:nvPr/>
+          </p:nvSpPr>
+          <p:spPr>
+            <a:xfrm>
+              <a:off x="22108850" y="6619896"/>
+              <a:ext cx="2589631" cy="430887"/>
+            </a:xfrm>
+            <a:prstGeom prst="rect">
+              <a:avLst/>
+            </a:prstGeom>
+            <a:solidFill>
+              <a:schemeClr val="bg1"/>
+            </a:solidFill>
+          </p:spPr>
+          <p:txBody>
+            <a:bodyPr wrap="square" rtlCol="0">
+              <a:spAutoFit/>
+            </a:bodyPr>
+            <a:lstStyle/>
+            <a:p>
+              <a:r>
+                <a:rPr lang="en-US" sz="1500" dirty="0">
+                  <a:solidFill>
+                    <a:srgbClr val="202124"/>
+                  </a:solidFill>
+                  <a:latin typeface="Times New Roman" panose="02020603050405020304" pitchFamily="18" charset="0"/>
+                  <a:cs typeface="Times New Roman" panose="02020603050405020304" pitchFamily="18" charset="0"/>
+                </a:rPr>
+                <a:t>False Positives</a:t>
+              </a:r>
+            </a:p>
+          </p:txBody>
+        </p:sp>
+      </p:grpSp>
+      <p:sp>
+        <p:nvSpPr>
+          <p:cNvPr id="101" name="TextBox 100">
+            <a:extLst>
+              <a:ext uri="{FF2B5EF4-FFF2-40B4-BE49-F238E27FC236}">
+                <a16:creationId xmlns:a16="http://schemas.microsoft.com/office/drawing/2014/main" id="{84AA623C-0CA0-4ACA-BAA5-3400DDE79FB1}"/>
+              </a:ext>
+            </a:extLst>
+          </p:cNvPr>
+          <p:cNvSpPr txBox="1"/>
+          <p:nvPr/>
+        </p:nvSpPr>
+        <p:spPr>
+          <a:xfrm>
+            <a:off x="14953374" y="11574011"/>
+            <a:ext cx="1143132" cy="459696"/>
+          </a:xfrm>
+          <a:prstGeom prst="rect">
+            <a:avLst/>
+          </a:prstGeom>
+          <a:noFill/>
+        </p:spPr>
+        <p:txBody>
+          <a:bodyPr wrap="square" rtlCol="0">
+            <a:spAutoFit/>
+          </a:bodyPr>
+          <a:lstStyle/>
+          <a:p>
+            <a:r>
+              <a:rPr lang="en-US" sz="2274" dirty="0">
+                <a:latin typeface="Times New Roman" panose="02020603050405020304" pitchFamily="18" charset="0"/>
+                <a:cs typeface="Times New Roman" panose="02020603050405020304" pitchFamily="18" charset="0"/>
+              </a:rPr>
+              <a:t>DAO</a:t>
+            </a:r>
+          </a:p>
+        </p:txBody>
+      </p:sp>
+      <p:sp>
+        <p:nvSpPr>
+          <p:cNvPr id="102" name="TextBox 101">
+            <a:extLst>
+              <a:ext uri="{FF2B5EF4-FFF2-40B4-BE49-F238E27FC236}">
+                <a16:creationId xmlns:a16="http://schemas.microsoft.com/office/drawing/2014/main" id="{D930BE1F-4D3C-4DA3-AABD-BC05CCF5CAA9}"/>
+              </a:ext>
+            </a:extLst>
+          </p:cNvPr>
+          <p:cNvSpPr txBox="1"/>
+          <p:nvPr/>
+        </p:nvSpPr>
+        <p:spPr>
+          <a:xfrm>
+            <a:off x="11116132" y="11575731"/>
+            <a:ext cx="1428215" cy="459696"/>
+          </a:xfrm>
+          <a:prstGeom prst="rect">
+            <a:avLst/>
+          </a:prstGeom>
+          <a:noFill/>
+        </p:spPr>
+        <p:txBody>
+          <a:bodyPr wrap="square" rtlCol="0">
+            <a:spAutoFit/>
+          </a:bodyPr>
+          <a:lstStyle/>
+          <a:p>
+            <a:r>
+              <a:rPr lang="en-US" sz="2274" dirty="0">
+                <a:latin typeface="Times New Roman" panose="02020603050405020304" pitchFamily="18" charset="0"/>
+                <a:cs typeface="Times New Roman" panose="02020603050405020304" pitchFamily="18" charset="0"/>
+              </a:rPr>
+              <a:t>AVPR1A</a:t>
+            </a:r>
+          </a:p>
+        </p:txBody>
+      </p:sp>
+      <p:sp>
+        <p:nvSpPr>
+          <p:cNvPr id="103" name="TextBox 102">
+            <a:extLst>
+              <a:ext uri="{FF2B5EF4-FFF2-40B4-BE49-F238E27FC236}">
+                <a16:creationId xmlns:a16="http://schemas.microsoft.com/office/drawing/2014/main" id="{12B3AEAF-5789-4B76-B49A-33409289C4DB}"/>
+              </a:ext>
+            </a:extLst>
+          </p:cNvPr>
+          <p:cNvSpPr txBox="1"/>
+          <p:nvPr/>
+        </p:nvSpPr>
+        <p:spPr>
+          <a:xfrm>
+            <a:off x="18340597" y="11566225"/>
+            <a:ext cx="959280" cy="459696"/>
+          </a:xfrm>
+          <a:prstGeom prst="rect">
+            <a:avLst/>
+          </a:prstGeom>
+          <a:noFill/>
+        </p:spPr>
+        <p:txBody>
+          <a:bodyPr wrap="square" rtlCol="0">
+            <a:spAutoFit/>
+          </a:bodyPr>
+          <a:lstStyle/>
+          <a:p>
+            <a:r>
+              <a:rPr lang="en-US" sz="2274" dirty="0">
+                <a:latin typeface="Times New Roman" panose="02020603050405020304" pitchFamily="18" charset="0"/>
+                <a:cs typeface="Times New Roman" panose="02020603050405020304" pitchFamily="18" charset="0"/>
+              </a:rPr>
+              <a:t>TOP1</a:t>
+            </a:r>
+          </a:p>
+        </p:txBody>
+      </p:sp>
+      <p:sp>
+        <p:nvSpPr>
+          <p:cNvPr id="104" name="Rectangle: Rounded Corners 103">
+            <a:extLst>
+              <a:ext uri="{FF2B5EF4-FFF2-40B4-BE49-F238E27FC236}">
+                <a16:creationId xmlns:a16="http://schemas.microsoft.com/office/drawing/2014/main" id="{BCF7D8C5-6E4C-4DB8-8EE7-941C8C29FB9C}"/>
+              </a:ext>
+            </a:extLst>
+          </p:cNvPr>
+          <p:cNvSpPr/>
+          <p:nvPr/>
+        </p:nvSpPr>
+        <p:spPr>
+          <a:xfrm>
+            <a:off x="10211443" y="11427540"/>
+            <a:ext cx="3237594" cy="5391544"/>
+          </a:xfrm>
+          <a:prstGeom prst="roundRect">
+            <a:avLst/>
+          </a:prstGeom>
+          <a:noFill/>
+          <a:ln w="38100">
+            <a:solidFill>
+              <a:srgbClr val="F9D1D1"/>
+            </a:solidFill>
+          </a:ln>
+        </p:spPr>
+        <p:style>
+          <a:lnRef idx="2">
+            <a:schemeClr val="accent1">
+              <a:shade val="50000"/>
+            </a:schemeClr>
+          </a:lnRef>
+          <a:fillRef idx="1">
+            <a:schemeClr val="accent1"/>
+          </a:fillRef>
+          <a:effectRef idx="0">
+            <a:schemeClr val="accent1"/>
+          </a:effectRef>
+          <a:fontRef idx="minor">
+            <a:schemeClr val="lt1"/>
+          </a:fontRef>
+        </p:style>
+        <p:txBody>
+          <a:bodyPr rtlCol="0" anchor="ctr"/>
+          <a:lstStyle/>
+          <a:p>
+            <a:pPr algn="ctr"/>
+            <a:endParaRPr lang="en-US" sz="1350"/>
+          </a:p>
+        </p:txBody>
+      </p:sp>
+      <p:sp>
+        <p:nvSpPr>
+          <p:cNvPr id="105" name="Rectangle: Rounded Corners 104">
+            <a:extLst>
+              <a:ext uri="{FF2B5EF4-FFF2-40B4-BE49-F238E27FC236}">
+                <a16:creationId xmlns:a16="http://schemas.microsoft.com/office/drawing/2014/main" id="{3151FA7A-096F-433F-909D-4E04C01DBEFF}"/>
+              </a:ext>
+            </a:extLst>
+          </p:cNvPr>
+          <p:cNvSpPr/>
+          <p:nvPr/>
+        </p:nvSpPr>
+        <p:spPr>
+          <a:xfrm>
+            <a:off x="13657356" y="11426644"/>
+            <a:ext cx="3335672" cy="5421180"/>
+          </a:xfrm>
+          <a:prstGeom prst="roundRect">
+            <a:avLst/>
+          </a:prstGeom>
+          <a:noFill/>
+          <a:ln w="38100">
+            <a:solidFill>
+              <a:srgbClr val="F9D1D1"/>
+            </a:solidFill>
+          </a:ln>
+        </p:spPr>
+        <p:style>
+          <a:lnRef idx="2">
+            <a:schemeClr val="accent1">
+              <a:shade val="50000"/>
+            </a:schemeClr>
+          </a:lnRef>
+          <a:fillRef idx="1">
+            <a:schemeClr val="accent1"/>
+          </a:fillRef>
+          <a:effectRef idx="0">
+            <a:schemeClr val="accent1"/>
+          </a:effectRef>
+          <a:fontRef idx="minor">
+            <a:schemeClr val="lt1"/>
+          </a:fontRef>
+        </p:style>
+        <p:txBody>
+          <a:bodyPr rtlCol="0" anchor="ctr"/>
+          <a:lstStyle/>
+          <a:p>
+            <a:pPr algn="ctr"/>
+            <a:endParaRPr lang="en-US" sz="1350"/>
+          </a:p>
+        </p:txBody>
+      </p:sp>
+      <p:sp>
+        <p:nvSpPr>
+          <p:cNvPr id="106" name="TextBox 105">
+            <a:extLst>
+              <a:ext uri="{FF2B5EF4-FFF2-40B4-BE49-F238E27FC236}">
+                <a16:creationId xmlns:a16="http://schemas.microsoft.com/office/drawing/2014/main" id="{0ADC8EB7-4CFA-459F-837B-583940627D3D}"/>
+              </a:ext>
+            </a:extLst>
+          </p:cNvPr>
+          <p:cNvSpPr txBox="1"/>
+          <p:nvPr/>
+        </p:nvSpPr>
+        <p:spPr>
+          <a:xfrm>
+            <a:off x="11198750" y="15345289"/>
+            <a:ext cx="1868613" cy="1207083"/>
+          </a:xfrm>
+          <a:prstGeom prst="rect">
+            <a:avLst/>
+          </a:prstGeom>
+          <a:noFill/>
+        </p:spPr>
+        <p:txBody>
+          <a:bodyPr wrap="square" rtlCol="0">
+            <a:spAutoFit/>
+          </a:bodyPr>
+          <a:lstStyle/>
+          <a:p>
+            <a:r>
+              <a:rPr lang="en-US" sz="2273" dirty="0">
+                <a:latin typeface="Times New Roman" panose="02020603050405020304" pitchFamily="18" charset="0"/>
+                <a:ea typeface="Calibri" panose="020F0502020204030204" pitchFamily="34" charset="0"/>
+                <a:cs typeface="Times New Roman" panose="02020603050405020304" pitchFamily="18" charset="0"/>
+              </a:rPr>
+              <a:t>k</a:t>
+            </a:r>
+            <a:r>
+              <a:rPr lang="en-US" sz="2273" baseline="-25000" dirty="0">
+                <a:latin typeface="Times New Roman" panose="02020603050405020304" pitchFamily="18" charset="0"/>
+                <a:ea typeface="Calibri" panose="020F0502020204030204" pitchFamily="34" charset="0"/>
+                <a:cs typeface="Times New Roman" panose="02020603050405020304" pitchFamily="18" charset="0"/>
+              </a:rPr>
+              <a:t>i</a:t>
+            </a:r>
+            <a:r>
+              <a:rPr lang="en-US" sz="2273" baseline="30000" dirty="0">
+                <a:latin typeface="Times New Roman" panose="02020603050405020304" pitchFamily="18" charset="0"/>
+                <a:ea typeface="Calibri" panose="020F0502020204030204" pitchFamily="34" charset="0"/>
+                <a:cs typeface="Times New Roman" panose="02020603050405020304" pitchFamily="18" charset="0"/>
+              </a:rPr>
+              <a:t>+ </a:t>
+            </a:r>
+            <a:r>
+              <a:rPr lang="en-US" sz="2273" dirty="0">
+                <a:latin typeface="Times New Roman" panose="02020603050405020304" pitchFamily="18" charset="0"/>
+                <a:cs typeface="Times New Roman" panose="02020603050405020304" pitchFamily="18" charset="0"/>
+              </a:rPr>
+              <a:t>= 32</a:t>
+            </a:r>
+            <a:endParaRPr lang="en-US" sz="2274" dirty="0">
+              <a:latin typeface="Times New Roman" panose="02020603050405020304" pitchFamily="18" charset="0"/>
+              <a:cs typeface="Times New Roman" panose="02020603050405020304" pitchFamily="18" charset="0"/>
+            </a:endParaRPr>
+          </a:p>
+          <a:p>
+            <a:r>
+              <a:rPr lang="en-US" sz="2273" dirty="0">
+                <a:latin typeface="Times New Roman" panose="02020603050405020304" pitchFamily="18" charset="0"/>
+                <a:ea typeface="Calibri" panose="020F0502020204030204" pitchFamily="34" charset="0"/>
+                <a:cs typeface="Times New Roman" panose="02020603050405020304" pitchFamily="18" charset="0"/>
+              </a:rPr>
+              <a:t>k</a:t>
+            </a:r>
+            <a:r>
+              <a:rPr lang="en-US" sz="2273" baseline="-25000" dirty="0">
+                <a:latin typeface="Times New Roman" panose="02020603050405020304" pitchFamily="18" charset="0"/>
+                <a:ea typeface="Calibri" panose="020F0502020204030204" pitchFamily="34" charset="0"/>
+                <a:cs typeface="Times New Roman" panose="02020603050405020304" pitchFamily="18" charset="0"/>
+              </a:rPr>
+              <a:t>i</a:t>
+            </a:r>
+            <a:r>
+              <a:rPr lang="en-US" sz="2273" baseline="30000" dirty="0">
+                <a:latin typeface="Times New Roman" panose="02020603050405020304" pitchFamily="18" charset="0"/>
+                <a:ea typeface="Calibri" panose="020F0502020204030204" pitchFamily="34" charset="0"/>
+                <a:cs typeface="Times New Roman" panose="02020603050405020304" pitchFamily="18" charset="0"/>
+              </a:rPr>
+              <a:t>- </a:t>
+            </a:r>
+            <a:r>
+              <a:rPr lang="en-US" sz="2274" dirty="0">
+                <a:latin typeface="Times New Roman" panose="02020603050405020304" pitchFamily="18" charset="0"/>
+                <a:cs typeface="Times New Roman" panose="02020603050405020304" pitchFamily="18" charset="0"/>
+              </a:rPr>
+              <a:t>= 10</a:t>
+            </a:r>
+          </a:p>
+          <a:p>
+            <a:r>
+              <a:rPr lang="el-GR" sz="2273" dirty="0">
+                <a:latin typeface="Times New Roman" panose="02020603050405020304" pitchFamily="18" charset="0"/>
+                <a:ea typeface="Calibri" panose="020F0502020204030204" pitchFamily="34" charset="0"/>
+                <a:cs typeface="Times New Roman" panose="02020603050405020304" pitchFamily="18" charset="0"/>
+              </a:rPr>
+              <a:t>ρ</a:t>
+            </a:r>
+            <a:r>
+              <a:rPr lang="en-US" sz="2273" baseline="-25000" dirty="0">
+                <a:latin typeface="Times New Roman" panose="02020603050405020304" pitchFamily="18" charset="0"/>
+                <a:ea typeface="Calibri" panose="020F0502020204030204" pitchFamily="34" charset="0"/>
+                <a:cs typeface="Times New Roman" panose="02020603050405020304" pitchFamily="18" charset="0"/>
+              </a:rPr>
+              <a:t>i </a:t>
+            </a:r>
+            <a:r>
+              <a:rPr lang="el-GR" sz="2400" dirty="0">
+                <a:solidFill>
+                  <a:srgbClr val="202124"/>
+                </a:solidFill>
+                <a:latin typeface="Times New Roman" panose="02020603050405020304" pitchFamily="18" charset="0"/>
+                <a:cs typeface="Times New Roman" panose="02020603050405020304" pitchFamily="18" charset="0"/>
+              </a:rPr>
+              <a:t> </a:t>
+            </a:r>
+            <a:r>
+              <a:rPr lang="en-US" sz="2274" dirty="0">
+                <a:latin typeface="Times New Roman" panose="02020603050405020304" pitchFamily="18" charset="0"/>
+                <a:cs typeface="Times New Roman" panose="02020603050405020304" pitchFamily="18" charset="0"/>
+              </a:rPr>
+              <a:t>= 0.76</a:t>
+            </a:r>
+          </a:p>
+        </p:txBody>
+      </p:sp>
+      <p:sp>
+        <p:nvSpPr>
+          <p:cNvPr id="107" name="TextBox 106">
+            <a:extLst>
+              <a:ext uri="{FF2B5EF4-FFF2-40B4-BE49-F238E27FC236}">
+                <a16:creationId xmlns:a16="http://schemas.microsoft.com/office/drawing/2014/main" id="{33A10475-181A-421A-9DD8-7AF21DEDFA93}"/>
+              </a:ext>
+            </a:extLst>
+          </p:cNvPr>
+          <p:cNvSpPr txBox="1"/>
+          <p:nvPr/>
+        </p:nvSpPr>
+        <p:spPr>
+          <a:xfrm>
+            <a:off x="14707026" y="15345288"/>
+            <a:ext cx="1868613" cy="1207083"/>
+          </a:xfrm>
+          <a:prstGeom prst="rect">
+            <a:avLst/>
+          </a:prstGeom>
+          <a:noFill/>
+        </p:spPr>
+        <p:txBody>
+          <a:bodyPr wrap="square" rtlCol="0">
+            <a:spAutoFit/>
+          </a:bodyPr>
+          <a:lstStyle/>
+          <a:p>
+            <a:r>
+              <a:rPr lang="en-US" sz="2273" dirty="0">
+                <a:latin typeface="Times New Roman" panose="02020603050405020304" pitchFamily="18" charset="0"/>
+                <a:ea typeface="Calibri" panose="020F0502020204030204" pitchFamily="34" charset="0"/>
+                <a:cs typeface="Times New Roman" panose="02020603050405020304" pitchFamily="18" charset="0"/>
+              </a:rPr>
+              <a:t>k</a:t>
+            </a:r>
+            <a:r>
+              <a:rPr lang="en-US" sz="2273" baseline="-25000" dirty="0">
+                <a:latin typeface="Times New Roman" panose="02020603050405020304" pitchFamily="18" charset="0"/>
+                <a:ea typeface="Calibri" panose="020F0502020204030204" pitchFamily="34" charset="0"/>
+                <a:cs typeface="Times New Roman" panose="02020603050405020304" pitchFamily="18" charset="0"/>
+              </a:rPr>
+              <a:t>i</a:t>
+            </a:r>
+            <a:r>
+              <a:rPr lang="en-US" sz="2273" baseline="30000" dirty="0">
+                <a:latin typeface="Times New Roman" panose="02020603050405020304" pitchFamily="18" charset="0"/>
+                <a:ea typeface="Calibri" panose="020F0502020204030204" pitchFamily="34" charset="0"/>
+                <a:cs typeface="Times New Roman" panose="02020603050405020304" pitchFamily="18" charset="0"/>
+              </a:rPr>
+              <a:t>+ </a:t>
+            </a:r>
+            <a:r>
+              <a:rPr lang="en-US" sz="2273" dirty="0">
+                <a:latin typeface="Times New Roman" panose="02020603050405020304" pitchFamily="18" charset="0"/>
+                <a:cs typeface="Times New Roman" panose="02020603050405020304" pitchFamily="18" charset="0"/>
+              </a:rPr>
+              <a:t>= 9</a:t>
+            </a:r>
+            <a:endParaRPr lang="en-US" sz="2274" dirty="0">
+              <a:latin typeface="Times New Roman" panose="02020603050405020304" pitchFamily="18" charset="0"/>
+              <a:cs typeface="Times New Roman" panose="02020603050405020304" pitchFamily="18" charset="0"/>
+            </a:endParaRPr>
+          </a:p>
+          <a:p>
+            <a:r>
+              <a:rPr lang="en-US" sz="2273" dirty="0">
+                <a:latin typeface="Times New Roman" panose="02020603050405020304" pitchFamily="18" charset="0"/>
+                <a:ea typeface="Calibri" panose="020F0502020204030204" pitchFamily="34" charset="0"/>
+                <a:cs typeface="Times New Roman" panose="02020603050405020304" pitchFamily="18" charset="0"/>
+              </a:rPr>
+              <a:t>k</a:t>
+            </a:r>
+            <a:r>
+              <a:rPr lang="en-US" sz="2273" baseline="-25000" dirty="0">
+                <a:latin typeface="Times New Roman" panose="02020603050405020304" pitchFamily="18" charset="0"/>
+                <a:ea typeface="Calibri" panose="020F0502020204030204" pitchFamily="34" charset="0"/>
+                <a:cs typeface="Times New Roman" panose="02020603050405020304" pitchFamily="18" charset="0"/>
+              </a:rPr>
+              <a:t>i</a:t>
+            </a:r>
+            <a:r>
+              <a:rPr lang="en-US" sz="2273" baseline="30000" dirty="0">
+                <a:latin typeface="Times New Roman" panose="02020603050405020304" pitchFamily="18" charset="0"/>
+                <a:ea typeface="Calibri" panose="020F0502020204030204" pitchFamily="34" charset="0"/>
+                <a:cs typeface="Times New Roman" panose="02020603050405020304" pitchFamily="18" charset="0"/>
+              </a:rPr>
+              <a:t>- </a:t>
+            </a:r>
+            <a:r>
+              <a:rPr lang="en-US" sz="2274" dirty="0">
+                <a:latin typeface="Times New Roman" panose="02020603050405020304" pitchFamily="18" charset="0"/>
+                <a:cs typeface="Times New Roman" panose="02020603050405020304" pitchFamily="18" charset="0"/>
+              </a:rPr>
+              <a:t>= 2</a:t>
+            </a:r>
+          </a:p>
+          <a:p>
+            <a:r>
+              <a:rPr lang="el-GR" sz="2273" dirty="0">
+                <a:latin typeface="Times New Roman" panose="02020603050405020304" pitchFamily="18" charset="0"/>
+                <a:ea typeface="Calibri" panose="020F0502020204030204" pitchFamily="34" charset="0"/>
+                <a:cs typeface="Times New Roman" panose="02020603050405020304" pitchFamily="18" charset="0"/>
+              </a:rPr>
+              <a:t>ρ</a:t>
+            </a:r>
+            <a:r>
+              <a:rPr lang="en-US" sz="2273" baseline="-25000" dirty="0">
+                <a:latin typeface="Times New Roman" panose="02020603050405020304" pitchFamily="18" charset="0"/>
+                <a:ea typeface="Calibri" panose="020F0502020204030204" pitchFamily="34" charset="0"/>
+                <a:cs typeface="Times New Roman" panose="02020603050405020304" pitchFamily="18" charset="0"/>
+              </a:rPr>
+              <a:t>i </a:t>
+            </a:r>
+            <a:r>
+              <a:rPr lang="el-GR" sz="2400" dirty="0">
+                <a:solidFill>
+                  <a:srgbClr val="202124"/>
+                </a:solidFill>
+                <a:latin typeface="Times New Roman" panose="02020603050405020304" pitchFamily="18" charset="0"/>
+                <a:cs typeface="Times New Roman" panose="02020603050405020304" pitchFamily="18" charset="0"/>
+              </a:rPr>
+              <a:t> </a:t>
+            </a:r>
+            <a:r>
+              <a:rPr lang="en-US" sz="2274" dirty="0">
+                <a:latin typeface="Times New Roman" panose="02020603050405020304" pitchFamily="18" charset="0"/>
+                <a:cs typeface="Times New Roman" panose="02020603050405020304" pitchFamily="18" charset="0"/>
+              </a:rPr>
+              <a:t>= 0.82</a:t>
+            </a:r>
+          </a:p>
+        </p:txBody>
+      </p:sp>
+      <p:sp>
+        <p:nvSpPr>
+          <p:cNvPr id="108" name="TextBox 107">
+            <a:extLst>
+              <a:ext uri="{FF2B5EF4-FFF2-40B4-BE49-F238E27FC236}">
+                <a16:creationId xmlns:a16="http://schemas.microsoft.com/office/drawing/2014/main" id="{8D6A87E1-F55C-4AB0-A234-D2232FB503E5}"/>
+              </a:ext>
+            </a:extLst>
+          </p:cNvPr>
+          <p:cNvSpPr txBox="1"/>
+          <p:nvPr/>
+        </p:nvSpPr>
+        <p:spPr>
+          <a:xfrm>
+            <a:off x="18281924" y="15335372"/>
+            <a:ext cx="1868613" cy="1207083"/>
+          </a:xfrm>
+          <a:prstGeom prst="rect">
+            <a:avLst/>
+          </a:prstGeom>
+          <a:noFill/>
+        </p:spPr>
+        <p:txBody>
+          <a:bodyPr wrap="square" rtlCol="0">
+            <a:spAutoFit/>
+          </a:bodyPr>
+          <a:lstStyle/>
+          <a:p>
+            <a:r>
+              <a:rPr lang="en-US" sz="2273" dirty="0">
+                <a:latin typeface="Times New Roman" panose="02020603050405020304" pitchFamily="18" charset="0"/>
+                <a:ea typeface="Calibri" panose="020F0502020204030204" pitchFamily="34" charset="0"/>
+                <a:cs typeface="Times New Roman" panose="02020603050405020304" pitchFamily="18" charset="0"/>
+              </a:rPr>
+              <a:t>k</a:t>
+            </a:r>
+            <a:r>
+              <a:rPr lang="en-US" sz="2273" baseline="-25000" dirty="0">
+                <a:latin typeface="Times New Roman" panose="02020603050405020304" pitchFamily="18" charset="0"/>
+                <a:ea typeface="Calibri" panose="020F0502020204030204" pitchFamily="34" charset="0"/>
+                <a:cs typeface="Times New Roman" panose="02020603050405020304" pitchFamily="18" charset="0"/>
+              </a:rPr>
+              <a:t>i</a:t>
+            </a:r>
+            <a:r>
+              <a:rPr lang="en-US" sz="2273" baseline="30000" dirty="0">
+                <a:latin typeface="Times New Roman" panose="02020603050405020304" pitchFamily="18" charset="0"/>
+                <a:ea typeface="Calibri" panose="020F0502020204030204" pitchFamily="34" charset="0"/>
+                <a:cs typeface="Times New Roman" panose="02020603050405020304" pitchFamily="18" charset="0"/>
+              </a:rPr>
+              <a:t>+ </a:t>
+            </a:r>
+            <a:r>
+              <a:rPr lang="en-US" sz="2273" dirty="0">
+                <a:latin typeface="Times New Roman" panose="02020603050405020304" pitchFamily="18" charset="0"/>
+                <a:cs typeface="Times New Roman" panose="02020603050405020304" pitchFamily="18" charset="0"/>
+              </a:rPr>
+              <a:t>= 3</a:t>
+            </a:r>
+            <a:endParaRPr lang="en-US" sz="2274" dirty="0">
+              <a:latin typeface="Times New Roman" panose="02020603050405020304" pitchFamily="18" charset="0"/>
+              <a:cs typeface="Times New Roman" panose="02020603050405020304" pitchFamily="18" charset="0"/>
+            </a:endParaRPr>
+          </a:p>
+          <a:p>
+            <a:r>
+              <a:rPr lang="en-US" sz="2273" dirty="0">
+                <a:latin typeface="Times New Roman" panose="02020603050405020304" pitchFamily="18" charset="0"/>
+                <a:ea typeface="Calibri" panose="020F0502020204030204" pitchFamily="34" charset="0"/>
+                <a:cs typeface="Times New Roman" panose="02020603050405020304" pitchFamily="18" charset="0"/>
+              </a:rPr>
+              <a:t>k</a:t>
+            </a:r>
+            <a:r>
+              <a:rPr lang="en-US" sz="2273" baseline="-25000" dirty="0">
+                <a:latin typeface="Times New Roman" panose="02020603050405020304" pitchFamily="18" charset="0"/>
+                <a:ea typeface="Calibri" panose="020F0502020204030204" pitchFamily="34" charset="0"/>
+                <a:cs typeface="Times New Roman" panose="02020603050405020304" pitchFamily="18" charset="0"/>
+              </a:rPr>
+              <a:t>i</a:t>
+            </a:r>
+            <a:r>
+              <a:rPr lang="en-US" sz="2273" baseline="30000" dirty="0">
+                <a:latin typeface="Times New Roman" panose="02020603050405020304" pitchFamily="18" charset="0"/>
+                <a:ea typeface="Calibri" panose="020F0502020204030204" pitchFamily="34" charset="0"/>
+                <a:cs typeface="Times New Roman" panose="02020603050405020304" pitchFamily="18" charset="0"/>
+              </a:rPr>
+              <a:t>- </a:t>
+            </a:r>
+            <a:r>
+              <a:rPr lang="en-US" sz="2274" dirty="0">
+                <a:latin typeface="Times New Roman" panose="02020603050405020304" pitchFamily="18" charset="0"/>
+                <a:cs typeface="Times New Roman" panose="02020603050405020304" pitchFamily="18" charset="0"/>
+              </a:rPr>
+              <a:t>= 0</a:t>
+            </a:r>
+          </a:p>
+          <a:p>
+            <a:r>
+              <a:rPr lang="el-GR" sz="2273" dirty="0">
+                <a:latin typeface="Times New Roman" panose="02020603050405020304" pitchFamily="18" charset="0"/>
+                <a:ea typeface="Calibri" panose="020F0502020204030204" pitchFamily="34" charset="0"/>
+                <a:cs typeface="Times New Roman" panose="02020603050405020304" pitchFamily="18" charset="0"/>
+              </a:rPr>
+              <a:t>ρ</a:t>
+            </a:r>
+            <a:r>
+              <a:rPr lang="en-US" sz="2273" baseline="-25000" dirty="0">
+                <a:latin typeface="Times New Roman" panose="02020603050405020304" pitchFamily="18" charset="0"/>
+                <a:ea typeface="Calibri" panose="020F0502020204030204" pitchFamily="34" charset="0"/>
+                <a:cs typeface="Times New Roman" panose="02020603050405020304" pitchFamily="18" charset="0"/>
+              </a:rPr>
+              <a:t>i </a:t>
+            </a:r>
+            <a:r>
+              <a:rPr lang="el-GR" sz="2400" dirty="0">
+                <a:solidFill>
+                  <a:srgbClr val="202124"/>
+                </a:solidFill>
+                <a:latin typeface="Times New Roman" panose="02020603050405020304" pitchFamily="18" charset="0"/>
+                <a:cs typeface="Times New Roman" panose="02020603050405020304" pitchFamily="18" charset="0"/>
+              </a:rPr>
+              <a:t> </a:t>
+            </a:r>
+            <a:r>
+              <a:rPr lang="en-US" sz="2274" dirty="0">
+                <a:latin typeface="Times New Roman" panose="02020603050405020304" pitchFamily="18" charset="0"/>
+                <a:cs typeface="Times New Roman" panose="02020603050405020304" pitchFamily="18" charset="0"/>
+              </a:rPr>
+              <a:t>= 1.0</a:t>
+            </a:r>
+          </a:p>
+        </p:txBody>
+      </p:sp>
+      <p:pic>
+        <p:nvPicPr>
+          <p:cNvPr id="109" name="Picture 108">
+            <a:extLst>
+              <a:ext uri="{FF2B5EF4-FFF2-40B4-BE49-F238E27FC236}">
+                <a16:creationId xmlns:a16="http://schemas.microsoft.com/office/drawing/2014/main" id="{DEB60A45-21D7-4002-BE62-860F7899B523}"/>
+              </a:ext>
+            </a:extLst>
+          </p:cNvPr>
+          <p:cNvPicPr>
+            <a:picLocks noChangeAspect="1"/>
+          </p:cNvPicPr>
+          <p:nvPr/>
+        </p:nvPicPr>
+        <p:blipFill>
+          <a:blip r:embed="rId10"/>
+          <a:stretch>
+            <a:fillRect/>
+          </a:stretch>
+        </p:blipFill>
+        <p:spPr>
+          <a:xfrm>
+            <a:off x="17713608" y="12489173"/>
+            <a:ext cx="2168166" cy="2379391"/>
+          </a:xfrm>
+          <a:prstGeom prst="rect">
+            <a:avLst/>
+          </a:prstGeom>
+        </p:spPr>
+      </p:pic>
+      <p:pic>
+        <p:nvPicPr>
+          <p:cNvPr id="110" name="Picture 109">
+            <a:extLst>
+              <a:ext uri="{FF2B5EF4-FFF2-40B4-BE49-F238E27FC236}">
+                <a16:creationId xmlns:a16="http://schemas.microsoft.com/office/drawing/2014/main" id="{2C67A3A9-2D0F-407B-BD07-0EC226371629}"/>
+              </a:ext>
+            </a:extLst>
+          </p:cNvPr>
+          <p:cNvPicPr>
+            <a:picLocks noChangeAspect="1"/>
+          </p:cNvPicPr>
+          <p:nvPr/>
+        </p:nvPicPr>
+        <p:blipFill>
+          <a:blip r:embed="rId11"/>
+          <a:stretch>
+            <a:fillRect/>
+          </a:stretch>
+        </p:blipFill>
+        <p:spPr>
+          <a:xfrm>
+            <a:off x="14573659" y="11970204"/>
+            <a:ext cx="1566665" cy="3365168"/>
+          </a:xfrm>
+          <a:prstGeom prst="rect">
+            <a:avLst/>
+          </a:prstGeom>
+        </p:spPr>
+      </p:pic>
+      <p:pic>
+        <p:nvPicPr>
+          <p:cNvPr id="111" name="Picture 110">
+            <a:extLst>
+              <a:ext uri="{FF2B5EF4-FFF2-40B4-BE49-F238E27FC236}">
+                <a16:creationId xmlns:a16="http://schemas.microsoft.com/office/drawing/2014/main" id="{04CF9A25-C91A-479B-A09A-9B047B46F55C}"/>
+              </a:ext>
+            </a:extLst>
+          </p:cNvPr>
+          <p:cNvPicPr>
+            <a:picLocks noChangeAspect="1"/>
+          </p:cNvPicPr>
+          <p:nvPr/>
+        </p:nvPicPr>
+        <p:blipFill>
+          <a:blip r:embed="rId12"/>
+          <a:stretch>
+            <a:fillRect/>
+          </a:stretch>
+        </p:blipFill>
+        <p:spPr>
+          <a:xfrm>
+            <a:off x="11075128" y="12295498"/>
+            <a:ext cx="1692367" cy="3039874"/>
+          </a:xfrm>
+          <a:prstGeom prst="rect">
+            <a:avLst/>
+          </a:prstGeom>
+        </p:spPr>
+      </p:pic>
+      <p:sp>
+        <p:nvSpPr>
+          <p:cNvPr id="112" name="Rectangle: Rounded Corners 111">
+            <a:extLst>
+              <a:ext uri="{FF2B5EF4-FFF2-40B4-BE49-F238E27FC236}">
+                <a16:creationId xmlns:a16="http://schemas.microsoft.com/office/drawing/2014/main" id="{BEF6B4AD-D0B9-4A81-9BEF-7F402BFD358D}"/>
+              </a:ext>
+            </a:extLst>
+          </p:cNvPr>
+          <p:cNvSpPr/>
+          <p:nvPr/>
+        </p:nvSpPr>
+        <p:spPr>
+          <a:xfrm>
+            <a:off x="17170817" y="11437692"/>
+            <a:ext cx="3237594" cy="5421180"/>
+          </a:xfrm>
+          <a:prstGeom prst="roundRect">
+            <a:avLst/>
+          </a:prstGeom>
+          <a:noFill/>
+          <a:ln w="38100">
+            <a:solidFill>
+              <a:srgbClr val="F9D1D1"/>
+            </a:solidFill>
+          </a:ln>
+        </p:spPr>
+        <p:style>
+          <a:lnRef idx="2">
+            <a:schemeClr val="accent1">
+              <a:shade val="50000"/>
+            </a:schemeClr>
+          </a:lnRef>
+          <a:fillRef idx="1">
+            <a:schemeClr val="accent1"/>
+          </a:fillRef>
+          <a:effectRef idx="0">
+            <a:schemeClr val="accent1"/>
+          </a:effectRef>
+          <a:fontRef idx="minor">
+            <a:schemeClr val="lt1"/>
+          </a:fontRef>
+        </p:style>
+        <p:txBody>
+          <a:bodyPr rtlCol="0" anchor="ctr"/>
+          <a:lstStyle/>
+          <a:p>
+            <a:pPr algn="ctr"/>
+            <a:endParaRPr lang="en-US" sz="1350"/>
+          </a:p>
+        </p:txBody>
+      </p:sp>
     </p:spTree>
     <p:extLst>
       <p:ext uri="{BB962C8B-B14F-4D97-AF65-F5344CB8AC3E}">

</xml_diff>